<commit_message>
Maj présentation : présentation CEA
</commit_message>
<xml_diff>
--- a/Présentation.pptx
+++ b/Présentation.pptx
@@ -22,13 +22,14 @@
     <p:sldId id="261" r:id="rId15"/>
     <p:sldId id="262" r:id="rId16"/>
     <p:sldId id="263" r:id="rId17"/>
+    <p:sldId id="264" r:id="rId18"/>
   </p:sldIdLst>
   <p:sldSz cx="6858000" cy="5143500"/>
   <p:notesSz cx="7559675" cy="10691812"/>
 </p:presentation>
 </file>
 
-<file path=ppt/charts/chart1.xml><?xml version="1.0" encoding="utf-8"?>
+<file path=ppt/charts/chart2.xml><?xml version="1.0" encoding="utf-8"?>
 <c:chartSpace xmlns:c="http://schemas.openxmlformats.org/drawingml/2006/chart" xmlns:a="http://schemas.openxmlformats.org/drawingml/2006/main" xmlns:r="http://schemas.openxmlformats.org/officeDocument/2006/relationships">
   <c:lang val="en-US"/>
   <c:roundedCorners val="0"/>
@@ -519,7 +520,7 @@
           <a:bodyPr lIns="0" rIns="0" tIns="0" bIns="0" anchor="b"/>
           <a:p>
             <a:pPr algn="r"/>
-            <a:fld id="{0890BD08-A414-41FA-8D77-4D8D135A3F59}" type="slidenum">
+            <a:fld id="{78BF4941-7676-4002-986E-BD53ED57259C}" type="slidenum">
               <a:rPr b="0" lang="fr-FR" sz="1400" spc="-1" strike="noStrike">
                 <a:solidFill>
                   <a:srgbClr val="000000"/>
@@ -572,7 +573,7 @@
       </p:grpSpPr>
       <p:sp>
         <p:nvSpPr>
-          <p:cNvPr id="381" name="PlaceHolder 1"/>
+          <p:cNvPr id="386" name="PlaceHolder 1"/>
           <p:cNvSpPr>
             <a:spLocks noGrp="1"/>
           </p:cNvSpPr>
@@ -12702,7 +12703,91 @@
                 </a:uFill>
                 <a:latin typeface="Arial Narrow"/>
               </a:rPr>
-              <a:t>Cliquez pour éditer le format du texte-titre</a:t>
+              <a:t>Cliquez </a:t>
+            </a:r>
+            <a:r>
+              <a:rPr b="0" lang="en-US" sz="1800" spc="-1" strike="noStrike">
+                <a:solidFill>
+                  <a:srgbClr val="3f3f3f"/>
+                </a:solidFill>
+                <a:uFill>
+                  <a:solidFill>
+                    <a:srgbClr val="ffffff"/>
+                  </a:solidFill>
+                </a:uFill>
+                <a:latin typeface="Arial Narrow"/>
+              </a:rPr>
+              <a:t>pour </a:t>
+            </a:r>
+            <a:r>
+              <a:rPr b="0" lang="en-US" sz="1800" spc="-1" strike="noStrike">
+                <a:solidFill>
+                  <a:srgbClr val="3f3f3f"/>
+                </a:solidFill>
+                <a:uFill>
+                  <a:solidFill>
+                    <a:srgbClr val="ffffff"/>
+                  </a:solidFill>
+                </a:uFill>
+                <a:latin typeface="Arial Narrow"/>
+              </a:rPr>
+              <a:t>éditer le </a:t>
+            </a:r>
+            <a:r>
+              <a:rPr b="0" lang="en-US" sz="1800" spc="-1" strike="noStrike">
+                <a:solidFill>
+                  <a:srgbClr val="3f3f3f"/>
+                </a:solidFill>
+                <a:uFill>
+                  <a:solidFill>
+                    <a:srgbClr val="ffffff"/>
+                  </a:solidFill>
+                </a:uFill>
+                <a:latin typeface="Arial Narrow"/>
+              </a:rPr>
+              <a:t>format </a:t>
+            </a:r>
+            <a:r>
+              <a:rPr b="0" lang="en-US" sz="1800" spc="-1" strike="noStrike">
+                <a:solidFill>
+                  <a:srgbClr val="3f3f3f"/>
+                </a:solidFill>
+                <a:uFill>
+                  <a:solidFill>
+                    <a:srgbClr val="ffffff"/>
+                  </a:solidFill>
+                </a:uFill>
+                <a:latin typeface="Arial Narrow"/>
+              </a:rPr>
+              <a:t>du </a:t>
+            </a:r>
+            <a:r>
+              <a:rPr b="0" lang="en-US" sz="1800" spc="-1" strike="noStrike">
+                <a:solidFill>
+                  <a:srgbClr val="3f3f3f"/>
+                </a:solidFill>
+                <a:uFill>
+                  <a:solidFill>
+                    <a:srgbClr val="ffffff"/>
+                  </a:solidFill>
+                </a:uFill>
+                <a:latin typeface="Arial Narrow"/>
+              </a:rPr>
+              <a:t>texte-</a:t>
+            </a:r>
+            <a:r>
+              <a:rPr b="0" lang="en-US" sz="1800" spc="-1" strike="noStrike">
+                <a:solidFill>
+                  <a:srgbClr val="3f3f3f"/>
+                </a:solidFill>
+                <a:uFill>
+                  <a:solidFill>
+                    <a:srgbClr val="ffffff"/>
+                  </a:solidFill>
+                </a:uFill>
+                <a:latin typeface="Arial Narrow"/>
+              </a:rPr>
+              <a:t>titre</a:t>
             </a:r>
             <a:endParaRPr b="0" lang="en-US" sz="1800" spc="-1" strike="noStrike">
               <a:solidFill>
@@ -14109,7 +14194,7 @@
                 <a:spcPct val="100000"/>
               </a:lnSpc>
             </a:pPr>
-            <a:fld id="{463578CD-F398-4D82-B079-E8801080E7A3}" type="slidenum">
+            <a:fld id="{6C6F367A-6CE8-4C76-86CB-A2F79585FDE0}" type="slidenum">
               <a:rPr b="0" lang="fr-FR" sz="700" spc="-1" strike="noStrike">
                 <a:solidFill>
                   <a:srgbClr val="ffffff"/>
@@ -14122,7 +14207,7 @@
                 <a:latin typeface="Arial"/>
                 <a:ea typeface="Arial"/>
               </a:rPr>
-              <a:t>&lt;numéro&gt;</a:t>
+              <a:t>1</a:t>
             </a:fld>
             <a:endParaRPr b="0" lang="fr-FR" sz="700" spc="-1" strike="noStrike">
               <a:solidFill>
@@ -14863,7 +14948,7 @@
                 <a:spcPct val="100000"/>
               </a:lnSpc>
             </a:pPr>
-            <a:fld id="{9BCA9BEC-42E1-435C-8224-57771661A047}" type="slidenum">
+            <a:fld id="{B3C1BD85-978D-4994-B7C3-1D8FD8C352C0}" type="slidenum">
               <a:rPr b="0" lang="fr-FR" sz="700" spc="-1" strike="noStrike">
                 <a:solidFill>
                   <a:srgbClr val="ffffff"/>
@@ -14876,7 +14961,7 @@
                 <a:latin typeface="Arial"/>
                 <a:ea typeface="Arial"/>
               </a:rPr>
-              <a:t>&lt;numéro&gt;</a:t>
+              <a:t>1</a:t>
             </a:fld>
             <a:endParaRPr b="0" lang="fr-FR" sz="700" spc="-1" strike="noStrike">
               <a:solidFill>
@@ -15688,7 +15773,7 @@
                 <a:spcPct val="100000"/>
               </a:lnSpc>
             </a:pPr>
-            <a:fld id="{97848B02-4042-4887-9FA4-65C69964B90B}" type="slidenum">
+            <a:fld id="{569E0575-257D-422F-A7FC-7B01B9409244}" type="slidenum">
               <a:rPr b="0" lang="fr-FR" sz="700" spc="-1" strike="noStrike">
                 <a:solidFill>
                   <a:srgbClr val="ffffff"/>
@@ -15701,7 +15786,7 @@
                 <a:latin typeface="Arial"/>
                 <a:ea typeface="Arial"/>
               </a:rPr>
-              <a:t>&lt;numéro&gt;</a:t>
+              <a:t>1</a:t>
             </a:fld>
             <a:endParaRPr b="0" lang="fr-FR" sz="700" spc="-1" strike="noStrike">
               <a:solidFill>
@@ -18077,7 +18162,7 @@
                 <a:spcPct val="100000"/>
               </a:lnSpc>
             </a:pPr>
-            <a:fld id="{121A2FA2-1A6C-4472-B16C-3B8E976B4945}" type="slidenum">
+            <a:fld id="{B3AEDCB4-2D59-49C9-802E-2D31E9FBF401}" type="slidenum">
               <a:rPr b="0" lang="fr-FR" sz="700" spc="-1" strike="noStrike">
                 <a:solidFill>
                   <a:srgbClr val="ffffff"/>
@@ -18464,16 +18549,49 @@
         <p:txBody>
           <a:bodyPr tIns="36000" bIns="36000" anchor="ctr"/>
           <a:p>
-            <a:endParaRPr b="0" lang="en-US" sz="1800" spc="-1" strike="noStrike">
-              <a:solidFill>
-                <a:srgbClr val="3f3f3f"/>
-              </a:solidFill>
-              <a:uFill>
-                <a:solidFill>
-                  <a:srgbClr val="ffffff"/>
-                </a:solidFill>
-              </a:uFill>
-              <a:latin typeface="Arial Narrow"/>
+            <a:pPr>
+              <a:lnSpc>
+                <a:spcPct val="100000"/>
+              </a:lnSpc>
+            </a:pPr>
+            <a:r>
+              <a:rPr b="1" lang="en-US" sz="1600" spc="-1" strike="noStrike" cap="all">
+                <a:solidFill>
+                  <a:srgbClr val="767171"/>
+                </a:solidFill>
+                <a:uFill>
+                  <a:solidFill>
+                    <a:srgbClr val="ffffff"/>
+                  </a:solidFill>
+                </a:uFill>
+                <a:latin typeface="Calibri"/>
+              </a:rPr>
+              <a:t>Présentati</a:t>
+            </a:r>
+            <a:r>
+              <a:rPr b="1" lang="en-US" sz="1600" spc="-1" strike="noStrike" cap="all">
+                <a:solidFill>
+                  <a:srgbClr val="767171"/>
+                </a:solidFill>
+                <a:uFill>
+                  <a:solidFill>
+                    <a:srgbClr val="ffffff"/>
+                  </a:solidFill>
+                </a:uFill>
+                <a:latin typeface="Calibri"/>
+              </a:rPr>
+              <a:t>on CEa</a:t>
+            </a:r>
+            <a:endParaRPr b="1" lang="en-US" sz="1600" spc="-1" strike="noStrike" cap="all">
+              <a:solidFill>
+                <a:srgbClr val="767171"/>
+              </a:solidFill>
+              <a:uFill>
+                <a:solidFill>
+                  <a:srgbClr val="ffffff"/>
+                </a:solidFill>
+              </a:uFill>
+              <a:latin typeface="Calibri"/>
             </a:endParaRPr>
           </a:p>
         </p:txBody>
@@ -18505,7 +18623,7 @@
                 <a:spcPct val="100000"/>
               </a:lnSpc>
             </a:pPr>
-            <a:fld id="{CF5525D9-5C8B-460B-A150-4BCA90A9DA88}" type="slidenum">
+            <a:fld id="{B170CF8F-2C59-4D39-B244-6B06DE63EB9F}" type="slidenum">
               <a:rPr b="0" lang="fr-FR" sz="700" spc="-1" strike="noStrike">
                 <a:solidFill>
                   <a:srgbClr val="ffffff"/>
@@ -18534,9 +18652,442 @@
           </a:p>
         </p:txBody>
       </p:sp>
+      <p:sp>
+        <p:nvSpPr>
+          <p:cNvPr id="365" name="TextShape 3"/>
+          <p:cNvSpPr txBox="1"/>
+          <p:nvPr/>
+        </p:nvSpPr>
+        <p:spPr>
+          <a:xfrm>
+            <a:off x="495720" y="1419480"/>
+            <a:ext cx="5914800" cy="1432800"/>
+          </a:xfrm>
+          <a:prstGeom prst="rect">
+            <a:avLst/>
+          </a:prstGeom>
+          <a:noFill/>
+          <a:ln>
+            <a:noFill/>
+          </a:ln>
+        </p:spPr>
+        <p:txBody>
+          <a:bodyPr/>
+          <a:p>
+            <a:pPr marL="432000" indent="-324000">
+              <a:spcBef>
+                <a:spcPts val="1417"/>
+              </a:spcBef>
+              <a:buClr>
+                <a:srgbClr val="000000"/>
+              </a:buClr>
+              <a:buSzPct val="45000"/>
+              <a:buFont typeface="Wingdings" charset="2"/>
+              <a:buChar char=""/>
+            </a:pPr>
+            <a:r>
+              <a:rPr b="0" lang="en-US" sz="2000" spc="-1" strike="noStrike">
+                <a:solidFill>
+                  <a:srgbClr val="767171"/>
+                </a:solidFill>
+                <a:uFill>
+                  <a:solidFill>
+                    <a:srgbClr val="ffffff"/>
+                  </a:solidFill>
+                </a:uFill>
+                <a:latin typeface="Calibri"/>
+              </a:rPr>
+              <a:t>4 domaines : </a:t>
+            </a:r>
+            <a:endParaRPr b="0" lang="en-US" sz="2000" spc="-1" strike="noStrike">
+              <a:solidFill>
+                <a:srgbClr val="767171"/>
+              </a:solidFill>
+              <a:uFill>
+                <a:solidFill>
+                  <a:srgbClr val="ffffff"/>
+                </a:solidFill>
+              </a:uFill>
+              <a:latin typeface="Calibri"/>
+            </a:endParaRPr>
+          </a:p>
+          <a:p>
+            <a:pPr marL="432000" indent="-324000">
+              <a:spcBef>
+                <a:spcPts val="1417"/>
+              </a:spcBef>
+              <a:buClr>
+                <a:srgbClr val="000000"/>
+              </a:buClr>
+              <a:buSzPct val="45000"/>
+              <a:buFont typeface="Wingdings" charset="2"/>
+              <a:buChar char=""/>
+            </a:pPr>
+            <a:r>
+              <a:rPr b="0" lang="en-US" sz="1600" spc="-1" strike="noStrike">
+                <a:solidFill>
+                  <a:srgbClr val="767171"/>
+                </a:solidFill>
+                <a:uFill>
+                  <a:solidFill>
+                    <a:srgbClr val="ffffff"/>
+                  </a:solidFill>
+                </a:uFill>
+                <a:latin typeface="Calibri"/>
+              </a:rPr>
+              <a:t>Défense et sécurité</a:t>
+            </a:r>
+            <a:endParaRPr b="0" lang="en-US" sz="1600" spc="-1" strike="noStrike">
+              <a:solidFill>
+                <a:srgbClr val="767171"/>
+              </a:solidFill>
+              <a:uFill>
+                <a:solidFill>
+                  <a:srgbClr val="ffffff"/>
+                </a:solidFill>
+              </a:uFill>
+              <a:latin typeface="Calibri"/>
+            </a:endParaRPr>
+          </a:p>
+          <a:p>
+            <a:pPr marL="432000" indent="-324000">
+              <a:spcBef>
+                <a:spcPts val="1417"/>
+              </a:spcBef>
+              <a:buClr>
+                <a:srgbClr val="000000"/>
+              </a:buClr>
+              <a:buSzPct val="45000"/>
+              <a:buFont typeface="Wingdings" charset="2"/>
+              <a:buChar char=""/>
+            </a:pPr>
+            <a:r>
+              <a:rPr b="0" lang="en-US" sz="1600" spc="-1" strike="noStrike">
+                <a:solidFill>
+                  <a:srgbClr val="767171"/>
+                </a:solidFill>
+                <a:uFill>
+                  <a:solidFill>
+                    <a:srgbClr val="ffffff"/>
+                  </a:solidFill>
+                </a:uFill>
+                <a:latin typeface="Calibri"/>
+              </a:rPr>
+              <a:t>Energies bas carbone</a:t>
+            </a:r>
+            <a:endParaRPr b="0" lang="en-US" sz="1600" spc="-1" strike="noStrike">
+              <a:solidFill>
+                <a:srgbClr val="767171"/>
+              </a:solidFill>
+              <a:uFill>
+                <a:solidFill>
+                  <a:srgbClr val="ffffff"/>
+                </a:solidFill>
+              </a:uFill>
+              <a:latin typeface="Calibri"/>
+            </a:endParaRPr>
+          </a:p>
+          <a:p>
+            <a:pPr marL="432000" indent="-324000">
+              <a:spcBef>
+                <a:spcPts val="1417"/>
+              </a:spcBef>
+              <a:buClr>
+                <a:srgbClr val="000000"/>
+              </a:buClr>
+              <a:buSzPct val="45000"/>
+              <a:buFont typeface="Wingdings" charset="2"/>
+              <a:buChar char=""/>
+            </a:pPr>
+            <a:r>
+              <a:rPr b="0" lang="en-US" sz="1600" spc="-1" strike="noStrike">
+                <a:solidFill>
+                  <a:srgbClr val="767171"/>
+                </a:solidFill>
+                <a:uFill>
+                  <a:solidFill>
+                    <a:srgbClr val="ffffff"/>
+                  </a:solidFill>
+                </a:uFill>
+                <a:latin typeface="Calibri"/>
+              </a:rPr>
+              <a:t>Recherche technologiques pour l’industrie</a:t>
+            </a:r>
+            <a:endParaRPr b="0" lang="en-US" sz="1600" spc="-1" strike="noStrike">
+              <a:solidFill>
+                <a:srgbClr val="767171"/>
+              </a:solidFill>
+              <a:uFill>
+                <a:solidFill>
+                  <a:srgbClr val="ffffff"/>
+                </a:solidFill>
+              </a:uFill>
+              <a:latin typeface="Calibri"/>
+            </a:endParaRPr>
+          </a:p>
+          <a:p>
+            <a:pPr marL="432000" indent="-324000">
+              <a:spcBef>
+                <a:spcPts val="1417"/>
+              </a:spcBef>
+              <a:buClr>
+                <a:srgbClr val="000000"/>
+              </a:buClr>
+              <a:buSzPct val="45000"/>
+              <a:buFont typeface="Wingdings" charset="2"/>
+              <a:buChar char=""/>
+            </a:pPr>
+            <a:r>
+              <a:rPr b="0" lang="en-US" sz="1600" spc="-1" strike="noStrike">
+                <a:solidFill>
+                  <a:srgbClr val="767171"/>
+                </a:solidFill>
+                <a:uFill>
+                  <a:solidFill>
+                    <a:srgbClr val="ffffff"/>
+                  </a:solidFill>
+                </a:uFill>
+                <a:latin typeface="Calibri"/>
+              </a:rPr>
+              <a:t>Recherche fondamentale</a:t>
+            </a:r>
+            <a:endParaRPr b="0" lang="en-US" sz="1600" spc="-1" strike="noStrike">
+              <a:solidFill>
+                <a:srgbClr val="767171"/>
+              </a:solidFill>
+              <a:uFill>
+                <a:solidFill>
+                  <a:srgbClr val="ffffff"/>
+                </a:solidFill>
+              </a:uFill>
+              <a:latin typeface="Calibri"/>
+            </a:endParaRPr>
+          </a:p>
+        </p:txBody>
+      </p:sp>
+      <p:sp>
+        <p:nvSpPr>
+          <p:cNvPr id="366" name="TextShape 4"/>
+          <p:cNvSpPr txBox="1"/>
+          <p:nvPr/>
+        </p:nvSpPr>
+        <p:spPr>
+          <a:xfrm>
+            <a:off x="495720" y="800640"/>
+            <a:ext cx="6128280" cy="382680"/>
+          </a:xfrm>
+          <a:prstGeom prst="rect">
+            <a:avLst/>
+          </a:prstGeom>
+          <a:noFill/>
+          <a:ln>
+            <a:noFill/>
+          </a:ln>
+        </p:spPr>
+        <p:txBody>
+          <a:bodyPr/>
+          <a:p>
+            <a:pPr algn="just">
+              <a:spcAft>
+                <a:spcPts val="601"/>
+              </a:spcAft>
+            </a:pPr>
+            <a:r>
+              <a:rPr b="0" lang="fr-FR" sz="1500" spc="-1" strike="noStrike">
+                <a:solidFill>
+                  <a:srgbClr val="767171"/>
+                </a:solidFill>
+                <a:uFill>
+                  <a:solidFill>
+                    <a:srgbClr val="ffffff"/>
+                  </a:solidFill>
+                </a:uFill>
+                <a:latin typeface="Arial"/>
+                <a:ea typeface="Lucida Sans Unicode"/>
+              </a:rPr>
+              <a:t>Acteur majeur de la recherche, du développement et de l'innovation</a:t>
+            </a:r>
+            <a:endParaRPr b="0" lang="fr-FR" sz="1500" spc="-1" strike="noStrike">
+              <a:solidFill>
+                <a:srgbClr val="767171"/>
+              </a:solidFill>
+              <a:uFill>
+                <a:solidFill>
+                  <a:srgbClr val="ffffff"/>
+                </a:solidFill>
+              </a:uFill>
+              <a:latin typeface="Arial"/>
+            </a:endParaRPr>
+          </a:p>
+        </p:txBody>
+      </p:sp>
+      <p:pic>
+        <p:nvPicPr>
+          <p:cNvPr id="367" name="" descr=""/>
+          <p:cNvPicPr/>
+          <p:nvPr/>
+        </p:nvPicPr>
+        <p:blipFill>
+          <a:blip r:embed="rId1"/>
+          <a:stretch/>
+        </p:blipFill>
+        <p:spPr>
+          <a:xfrm>
+            <a:off x="3456000" y="3024000"/>
+            <a:ext cx="3149280" cy="1717560"/>
+          </a:xfrm>
+          <a:prstGeom prst="rect">
+            <a:avLst/>
+          </a:prstGeom>
+          <a:ln>
+            <a:noFill/>
+          </a:ln>
+        </p:spPr>
+      </p:pic>
+    </p:spTree>
+  </p:cSld>
+  <p:timing>
+    <p:tnLst>
+      <p:par>
+        <p:cTn id="5" dur="indefinite" restart="never" nodeType="tmRoot">
+          <p:childTnLst>
+            <p:seq>
+              <p:cTn id="6" nodeType="mainSeq"/>
+              <p:prevCondLst>
+                <p:cond delay="0" evt="onPrev">
+                  <p:tgtEl>
+                    <p:sldTgt/>
+                  </p:tgtEl>
+                </p:cond>
+              </p:prevCondLst>
+              <p:nextCondLst>
+                <p:cond delay="0" evt="onNext">
+                  <p:tgtEl>
+                    <p:sldTgt/>
+                  </p:tgtEl>
+                </p:cond>
+              </p:nextCondLst>
+            </p:seq>
+          </p:childTnLst>
+        </p:cTn>
+      </p:par>
+    </p:tnLst>
+  </p:timing>
+</p:sld>
+</file>
+
+<file path=ppt/slides/slide4.xml><?xml version="1.0" encoding="utf-8"?>
+<p:sld xmlns:a="http://schemas.openxmlformats.org/drawingml/2006/main" xmlns:p="http://schemas.openxmlformats.org/presentationml/2006/main" xmlns:r="http://schemas.openxmlformats.org/officeDocument/2006/relationships" xmlns:p14="http://schemas.microsoft.com/office/powerpoint/2010/main" xmlns:p15="http://schemas.microsoft.com/office/powerpoint/2012/main" xmlns:mc="http://schemas.openxmlformats.org/markup-compatibility/2006">
+  <p:cSld>
+    <p:spTree>
+      <p:nvGrpSpPr>
+        <p:cNvPr id="1" name=""/>
+        <p:cNvGrpSpPr/>
+        <p:nvPr/>
+      </p:nvGrpSpPr>
+      <p:grpSpPr>
+        <a:xfrm>
+          <a:off x="0" y="0"/>
+          <a:ext cx="0" cy="0"/>
+          <a:chOff x="0" y="0"/>
+          <a:chExt cx="0" cy="0"/>
+        </a:xfrm>
+      </p:grpSpPr>
+      <p:sp>
+        <p:nvSpPr>
+          <p:cNvPr id="368" name="TextShape 1"/>
+          <p:cNvSpPr txBox="1"/>
+          <p:nvPr/>
+        </p:nvSpPr>
+        <p:spPr>
+          <a:xfrm>
+            <a:off x="830520" y="150480"/>
+            <a:ext cx="6171840" cy="277560"/>
+          </a:xfrm>
+          <a:prstGeom prst="rect">
+            <a:avLst/>
+          </a:prstGeom>
+          <a:noFill/>
+          <a:ln>
+            <a:noFill/>
+          </a:ln>
+        </p:spPr>
+        <p:txBody>
+          <a:bodyPr tIns="36000" bIns="36000" anchor="ctr"/>
+          <a:p>
+            <a:endParaRPr b="0" lang="en-US" sz="1800" spc="-1" strike="noStrike">
+              <a:solidFill>
+                <a:srgbClr val="3f3f3f"/>
+              </a:solidFill>
+              <a:uFill>
+                <a:solidFill>
+                  <a:srgbClr val="ffffff"/>
+                </a:solidFill>
+              </a:uFill>
+              <a:latin typeface="Arial Narrow"/>
+            </a:endParaRPr>
+          </a:p>
+        </p:txBody>
+      </p:sp>
+      <p:sp>
+        <p:nvSpPr>
+          <p:cNvPr id="369" name="TextShape 2"/>
+          <p:cNvSpPr txBox="1"/>
+          <p:nvPr/>
+        </p:nvSpPr>
+        <p:spPr>
+          <a:xfrm>
+            <a:off x="6275880" y="5005080"/>
+            <a:ext cx="470520" cy="107280"/>
+          </a:xfrm>
+          <a:prstGeom prst="rect">
+            <a:avLst/>
+          </a:prstGeom>
+          <a:noFill/>
+          <a:ln>
+            <a:noFill/>
+          </a:ln>
+        </p:spPr>
+        <p:txBody>
+          <a:bodyPr lIns="90000" rIns="90000" tIns="0" bIns="0"/>
+          <a:p>
+            <a:pPr algn="ctr">
+              <a:lnSpc>
+                <a:spcPct val="100000"/>
+              </a:lnSpc>
+            </a:pPr>
+            <a:fld id="{E7FB1FB6-D375-4BDD-B194-D6D22AFE2DDB}" type="slidenum">
+              <a:rPr b="0" lang="fr-FR" sz="700" spc="-1" strike="noStrike">
+                <a:solidFill>
+                  <a:srgbClr val="ffffff"/>
+                </a:solidFill>
+                <a:uFill>
+                  <a:solidFill>
+                    <a:srgbClr val="ffffff"/>
+                  </a:solidFill>
+                </a:uFill>
+                <a:latin typeface="Arial"/>
+                <a:ea typeface="Arial"/>
+              </a:rPr>
+              <a:t>&lt;numéro&gt;</a:t>
+            </a:fld>
+            <a:endParaRPr b="0" lang="fr-FR" sz="700" spc="-1" strike="noStrike">
+              <a:solidFill>
+                <a:srgbClr val="000000"/>
+              </a:solidFill>
+              <a:uFill>
+                <a:solidFill>
+                  <a:srgbClr val="ffffff"/>
+                </a:solidFill>
+              </a:uFill>
+              <a:latin typeface="Times New Roman"/>
+            </a:endParaRPr>
+          </a:p>
+        </p:txBody>
+      </p:sp>
       <p:graphicFrame>
         <p:nvGraphicFramePr>
-          <p:cNvPr id="365" name="Table 3"/>
+          <p:cNvPr id="370" name="Table 3"/>
           <p:cNvGraphicFramePr/>
           <p:nvPr/>
         </p:nvGraphicFramePr>
@@ -19246,200 +19797,7 @@
       </p:graphicFrame>
       <p:sp>
         <p:nvSpPr>
-          <p:cNvPr id="366" name="TextShape 4"/>
-          <p:cNvSpPr txBox="1"/>
-          <p:nvPr/>
-        </p:nvSpPr>
-        <p:spPr>
-          <a:xfrm>
-            <a:off x="495720" y="800640"/>
-            <a:ext cx="5942880" cy="382680"/>
-          </a:xfrm>
-          <a:prstGeom prst="rect">
-            <a:avLst/>
-          </a:prstGeom>
-          <a:noFill/>
-          <a:ln>
-            <a:noFill/>
-          </a:ln>
-        </p:spPr>
-        <p:txBody>
-          <a:bodyPr/>
-          <a:p>
-            <a:endParaRPr b="0" lang="en-US" sz="2000" spc="-1" strike="noStrike">
-              <a:solidFill>
-                <a:srgbClr val="767171"/>
-              </a:solidFill>
-              <a:uFill>
-                <a:solidFill>
-                  <a:srgbClr val="ffffff"/>
-                </a:solidFill>
-              </a:uFill>
-              <a:latin typeface="Calibri"/>
-            </a:endParaRPr>
-          </a:p>
-        </p:txBody>
-      </p:sp>
-    </p:spTree>
-  </p:cSld>
-  <p:timing>
-    <p:tnLst>
-      <p:par>
-        <p:cTn id="5" dur="indefinite" restart="never" nodeType="tmRoot">
-          <p:childTnLst>
-            <p:seq>
-              <p:cTn id="6" nodeType="mainSeq"/>
-              <p:prevCondLst>
-                <p:cond delay="0" evt="onPrev">
-                  <p:tgtEl>
-                    <p:sldTgt/>
-                  </p:tgtEl>
-                </p:cond>
-              </p:prevCondLst>
-              <p:nextCondLst>
-                <p:cond delay="0" evt="onNext">
-                  <p:tgtEl>
-                    <p:sldTgt/>
-                  </p:tgtEl>
-                </p:cond>
-              </p:nextCondLst>
-            </p:seq>
-          </p:childTnLst>
-        </p:cTn>
-      </p:par>
-    </p:tnLst>
-  </p:timing>
-</p:sld>
-</file>
-
-<file path=ppt/slides/slide4.xml><?xml version="1.0" encoding="utf-8"?>
-<p:sld xmlns:a="http://schemas.openxmlformats.org/drawingml/2006/main" xmlns:p="http://schemas.openxmlformats.org/presentationml/2006/main" xmlns:r="http://schemas.openxmlformats.org/officeDocument/2006/relationships" xmlns:p14="http://schemas.microsoft.com/office/powerpoint/2010/main" xmlns:p15="http://schemas.microsoft.com/office/powerpoint/2012/main" xmlns:mc="http://schemas.openxmlformats.org/markup-compatibility/2006">
-  <p:cSld>
-    <p:spTree>
-      <p:nvGrpSpPr>
-        <p:cNvPr id="1" name=""/>
-        <p:cNvGrpSpPr/>
-        <p:nvPr/>
-      </p:nvGrpSpPr>
-      <p:grpSpPr>
-        <a:xfrm>
-          <a:off x="0" y="0"/>
-          <a:ext cx="0" cy="0"/>
-          <a:chOff x="0" y="0"/>
-          <a:chExt cx="0" cy="0"/>
-        </a:xfrm>
-      </p:grpSpPr>
-      <p:sp>
-        <p:nvSpPr>
-          <p:cNvPr id="367" name="TextShape 1"/>
-          <p:cNvSpPr txBox="1"/>
-          <p:nvPr/>
-        </p:nvSpPr>
-        <p:spPr>
-          <a:xfrm>
-            <a:off x="830520" y="150480"/>
-            <a:ext cx="6171840" cy="277560"/>
-          </a:xfrm>
-          <a:prstGeom prst="rect">
-            <a:avLst/>
-          </a:prstGeom>
-          <a:noFill/>
-          <a:ln>
-            <a:noFill/>
-          </a:ln>
-        </p:spPr>
-        <p:txBody>
-          <a:bodyPr tIns="36000" bIns="36000" anchor="ctr"/>
-          <a:p>
-            <a:endParaRPr b="0" lang="en-US" sz="1800" spc="-1" strike="noStrike">
-              <a:solidFill>
-                <a:srgbClr val="3f3f3f"/>
-              </a:solidFill>
-              <a:uFill>
-                <a:solidFill>
-                  <a:srgbClr val="ffffff"/>
-                </a:solidFill>
-              </a:uFill>
-              <a:latin typeface="Arial Narrow"/>
-            </a:endParaRPr>
-          </a:p>
-        </p:txBody>
-      </p:sp>
-      <p:sp>
-        <p:nvSpPr>
-          <p:cNvPr id="368" name="TextShape 2"/>
-          <p:cNvSpPr txBox="1"/>
-          <p:nvPr/>
-        </p:nvSpPr>
-        <p:spPr>
-          <a:xfrm>
-            <a:off x="6275880" y="5005080"/>
-            <a:ext cx="470520" cy="107280"/>
-          </a:xfrm>
-          <a:prstGeom prst="rect">
-            <a:avLst/>
-          </a:prstGeom>
-          <a:noFill/>
-          <a:ln>
-            <a:noFill/>
-          </a:ln>
-        </p:spPr>
-        <p:txBody>
-          <a:bodyPr lIns="90000" rIns="90000" tIns="0" bIns="0"/>
-          <a:p>
-            <a:pPr algn="ctr">
-              <a:lnSpc>
-                <a:spcPct val="100000"/>
-              </a:lnSpc>
-            </a:pPr>
-            <a:fld id="{0C359F89-EA47-4163-93AD-B1BC4BDF0588}" type="slidenum">
-              <a:rPr b="0" lang="fr-FR" sz="700" spc="-1" strike="noStrike">
-                <a:solidFill>
-                  <a:srgbClr val="ffffff"/>
-                </a:solidFill>
-                <a:uFill>
-                  <a:solidFill>
-                    <a:srgbClr val="ffffff"/>
-                  </a:solidFill>
-                </a:uFill>
-                <a:latin typeface="Arial"/>
-                <a:ea typeface="Arial"/>
-              </a:rPr>
-              <a:t>&lt;numéro&gt;</a:t>
-            </a:fld>
-            <a:endParaRPr b="0" lang="fr-FR" sz="700" spc="-1" strike="noStrike">
-              <a:solidFill>
-                <a:srgbClr val="000000"/>
-              </a:solidFill>
-              <a:uFill>
-                <a:solidFill>
-                  <a:srgbClr val="ffffff"/>
-                </a:solidFill>
-              </a:uFill>
-              <a:latin typeface="Times New Roman"/>
-            </a:endParaRPr>
-          </a:p>
-        </p:txBody>
-      </p:sp>
-      <p:graphicFrame>
-        <p:nvGraphicFramePr>
-          <p:cNvPr id="369" name="Espace réservé du contenu 1"/>
-          <p:cNvGraphicFramePr/>
-          <p:nvPr/>
-        </p:nvGraphicFramePr>
-        <p:xfrm>
-          <a:off x="1873800" y="1595160"/>
-          <a:ext cx="2845440" cy="2041200"/>
-        </p:xfrm>
-        <a:graphic>
-          <a:graphicData uri="http://schemas.openxmlformats.org/drawingml/2006/chart">
-            <c:chart xmlns:c="http://schemas.openxmlformats.org/drawingml/2006/chart" xmlns:r="http://schemas.openxmlformats.org/officeDocument/2006/relationships" r:id="rId1"/>
-          </a:graphicData>
-        </a:graphic>
-      </p:graphicFrame>
-      <p:sp>
-        <p:nvSpPr>
-          <p:cNvPr id="370" name="TextShape 3"/>
+          <p:cNvPr id="371" name="TextShape 4"/>
           <p:cNvSpPr txBox="1"/>
           <p:nvPr/>
         </p:nvSpPr>
@@ -19524,7 +19882,43 @@
       </p:grpSpPr>
       <p:sp>
         <p:nvSpPr>
-          <p:cNvPr id="371" name="TextShape 1"/>
+          <p:cNvPr id="372" name="TextShape 1"/>
+          <p:cNvSpPr txBox="1"/>
+          <p:nvPr/>
+        </p:nvSpPr>
+        <p:spPr>
+          <a:xfrm>
+            <a:off x="830520" y="150480"/>
+            <a:ext cx="6171840" cy="277560"/>
+          </a:xfrm>
+          <a:prstGeom prst="rect">
+            <a:avLst/>
+          </a:prstGeom>
+          <a:noFill/>
+          <a:ln>
+            <a:noFill/>
+          </a:ln>
+        </p:spPr>
+        <p:txBody>
+          <a:bodyPr tIns="36000" bIns="36000" anchor="ctr"/>
+          <a:p>
+            <a:endParaRPr b="0" lang="en-US" sz="1800" spc="-1" strike="noStrike">
+              <a:solidFill>
+                <a:srgbClr val="3f3f3f"/>
+              </a:solidFill>
+              <a:uFill>
+                <a:solidFill>
+                  <a:srgbClr val="ffffff"/>
+                </a:solidFill>
+              </a:uFill>
+              <a:latin typeface="Arial Narrow"/>
+            </a:endParaRPr>
+          </a:p>
+        </p:txBody>
+      </p:sp>
+      <p:sp>
+        <p:nvSpPr>
+          <p:cNvPr id="373" name="TextShape 2"/>
           <p:cNvSpPr txBox="1"/>
           <p:nvPr/>
         </p:nvSpPr>
@@ -19549,7 +19943,7 @@
                 <a:spcPct val="100000"/>
               </a:lnSpc>
             </a:pPr>
-            <a:fld id="{33F63465-93F8-4F9B-90BF-699BB94ADC22}" type="slidenum">
+            <a:fld id="{9805B412-4E10-4C94-A084-C781A22139A2}" type="slidenum">
               <a:rPr b="0" lang="fr-FR" sz="700" spc="-1" strike="noStrike">
                 <a:solidFill>
                   <a:srgbClr val="ffffff"/>
@@ -19578,16 +19972,32 @@
           </a:p>
         </p:txBody>
       </p:sp>
-      <p:sp>
-        <p:nvSpPr>
-          <p:cNvPr id="372" name="TextShape 2"/>
+      <p:graphicFrame>
+        <p:nvGraphicFramePr>
+          <p:cNvPr id="374" name="Espace réservé du contenu 1"/>
+          <p:cNvGraphicFramePr/>
+          <p:nvPr/>
+        </p:nvGraphicFramePr>
+        <p:xfrm>
+          <a:off x="1873800" y="1595160"/>
+          <a:ext cx="2845440" cy="2041200"/>
+        </p:xfrm>
+        <a:graphic>
+          <a:graphicData uri="http://schemas.openxmlformats.org/drawingml/2006/chart">
+            <c:chart xmlns:c="http://schemas.openxmlformats.org/drawingml/2006/chart" xmlns:r="http://schemas.openxmlformats.org/officeDocument/2006/relationships" r:id="rId1"/>
+          </a:graphicData>
+        </a:graphic>
+      </p:graphicFrame>
+      <p:sp>
+        <p:nvSpPr>
+          <p:cNvPr id="375" name="TextShape 3"/>
           <p:cNvSpPr txBox="1"/>
           <p:nvPr/>
         </p:nvSpPr>
         <p:spPr>
           <a:xfrm>
-            <a:off x="634320" y="3601080"/>
-            <a:ext cx="1203120" cy="276480"/>
+            <a:off x="495720" y="800640"/>
+            <a:ext cx="5942880" cy="382680"/>
           </a:xfrm>
           <a:prstGeom prst="rect">
             <a:avLst/>
@@ -19598,7 +20008,7 @@
           </a:ln>
         </p:spPr>
         <p:txBody>
-          <a:bodyPr tIns="0" bIns="0"/>
+          <a:bodyPr/>
           <a:p>
             <a:endParaRPr b="0" lang="en-US" sz="2000" spc="-1" strike="noStrike">
               <a:solidFill>
@@ -19665,7 +20075,7 @@
       </p:grpSpPr>
       <p:sp>
         <p:nvSpPr>
-          <p:cNvPr id="373" name="TextShape 1"/>
+          <p:cNvPr id="376" name="TextShape 1"/>
           <p:cNvSpPr txBox="1"/>
           <p:nvPr/>
         </p:nvSpPr>
@@ -19690,7 +20100,7 @@
                 <a:spcPct val="100000"/>
               </a:lnSpc>
             </a:pPr>
-            <a:fld id="{28E06ACE-4D1A-431C-AC6B-AFDE79D5670B}" type="slidenum">
+            <a:fld id="{34B1B30C-726F-4B5A-AEFB-53C9868F2903}" type="slidenum">
               <a:rPr b="0" lang="fr-FR" sz="700" spc="-1" strike="noStrike">
                 <a:solidFill>
                   <a:srgbClr val="ffffff"/>
@@ -19721,14 +20131,14 @@
       </p:sp>
       <p:sp>
         <p:nvSpPr>
-          <p:cNvPr id="374" name="TextShape 2"/>
+          <p:cNvPr id="377" name="TextShape 2"/>
           <p:cNvSpPr txBox="1"/>
           <p:nvPr/>
         </p:nvSpPr>
         <p:spPr>
           <a:xfrm>
             <a:off x="634320" y="3601080"/>
-            <a:ext cx="1203120" cy="281880"/>
+            <a:ext cx="1203120" cy="276480"/>
           </a:xfrm>
           <a:prstGeom prst="rect">
             <a:avLst/>
@@ -19806,122 +20216,14 @@
       </p:grpSpPr>
       <p:sp>
         <p:nvSpPr>
-          <p:cNvPr id="375" name="TextShape 1"/>
+          <p:cNvPr id="378" name="TextShape 1"/>
           <p:cNvSpPr txBox="1"/>
           <p:nvPr/>
         </p:nvSpPr>
         <p:spPr>
           <a:xfrm>
-            <a:off x="2452320" y="1711440"/>
-            <a:ext cx="3574080" cy="461160"/>
-          </a:xfrm>
-          <a:prstGeom prst="rect">
-            <a:avLst/>
-          </a:prstGeom>
-          <a:noFill/>
-          <a:ln>
-            <a:noFill/>
-          </a:ln>
-        </p:spPr>
-        <p:txBody>
-          <a:bodyPr tIns="36000" bIns="36000" anchor="ctr"/>
-          <a:p>
-            <a:endParaRPr b="0" lang="en-US" sz="1800" spc="-1" strike="noStrike">
-              <a:solidFill>
-                <a:srgbClr val="3f3f3f"/>
-              </a:solidFill>
-              <a:uFill>
-                <a:solidFill>
-                  <a:srgbClr val="ffffff"/>
-                </a:solidFill>
-              </a:uFill>
-              <a:latin typeface="Arial Narrow"/>
-            </a:endParaRPr>
-          </a:p>
-        </p:txBody>
-      </p:sp>
-      <p:sp>
-        <p:nvSpPr>
-          <p:cNvPr id="376" name="TextShape 2"/>
-          <p:cNvSpPr txBox="1"/>
-          <p:nvPr/>
-        </p:nvSpPr>
-        <p:spPr>
-          <a:xfrm>
-            <a:off x="743760" y="3302640"/>
-            <a:ext cx="5135760" cy="189000"/>
-          </a:xfrm>
-          <a:prstGeom prst="rect">
-            <a:avLst/>
-          </a:prstGeom>
-          <a:noFill/>
-          <a:ln>
-            <a:noFill/>
-          </a:ln>
-        </p:spPr>
-        <p:txBody>
-          <a:bodyPr/>
-          <a:p>
-            <a:endParaRPr b="0" lang="en-US" sz="2000" spc="-1" strike="noStrike">
-              <a:solidFill>
-                <a:srgbClr val="767171"/>
-              </a:solidFill>
-              <a:uFill>
-                <a:solidFill>
-                  <a:srgbClr val="ffffff"/>
-                </a:solidFill>
-              </a:uFill>
-              <a:latin typeface="Calibri"/>
-            </a:endParaRPr>
-          </a:p>
-        </p:txBody>
-      </p:sp>
-      <p:sp>
-        <p:nvSpPr>
-          <p:cNvPr id="377" name="TextShape 3"/>
-          <p:cNvSpPr txBox="1"/>
-          <p:nvPr/>
-        </p:nvSpPr>
-        <p:spPr>
-          <a:xfrm>
-            <a:off x="2452320" y="2355120"/>
-            <a:ext cx="3535200" cy="285840"/>
-          </a:xfrm>
-          <a:prstGeom prst="rect">
-            <a:avLst/>
-          </a:prstGeom>
-          <a:noFill/>
-          <a:ln>
-            <a:noFill/>
-          </a:ln>
-        </p:spPr>
-        <p:txBody>
-          <a:bodyPr/>
-          <a:p>
-            <a:endParaRPr b="0" lang="en-US" sz="2000" spc="-1" strike="noStrike">
-              <a:solidFill>
-                <a:srgbClr val="767171"/>
-              </a:solidFill>
-              <a:uFill>
-                <a:solidFill>
-                  <a:srgbClr val="ffffff"/>
-                </a:solidFill>
-              </a:uFill>
-              <a:latin typeface="Calibri"/>
-            </a:endParaRPr>
-          </a:p>
-        </p:txBody>
-      </p:sp>
-      <p:sp>
-        <p:nvSpPr>
-          <p:cNvPr id="378" name="TextShape 4"/>
-          <p:cNvSpPr txBox="1"/>
-          <p:nvPr/>
-        </p:nvSpPr>
-        <p:spPr>
-          <a:xfrm>
-            <a:off x="6386400" y="5005440"/>
-            <a:ext cx="471240" cy="107640"/>
+            <a:off x="6275880" y="5005080"/>
+            <a:ext cx="470520" cy="107280"/>
           </a:xfrm>
           <a:prstGeom prst="rect">
             <a:avLst/>
@@ -19939,7 +20241,7 @@
                 <a:spcPct val="100000"/>
               </a:lnSpc>
             </a:pPr>
-            <a:fld id="{6F65106A-179A-430E-975C-A68954303F4B}" type="slidenum">
+            <a:fld id="{26375E3B-E85D-4EC2-938F-A6273B10A102}" type="slidenum">
               <a:rPr b="0" lang="fr-FR" sz="700" spc="-1" strike="noStrike">
                 <a:solidFill>
                   <a:srgbClr val="ffffff"/>
@@ -19964,6 +20266,42 @@
                 </a:solidFill>
               </a:uFill>
               <a:latin typeface="Times New Roman"/>
+            </a:endParaRPr>
+          </a:p>
+        </p:txBody>
+      </p:sp>
+      <p:sp>
+        <p:nvSpPr>
+          <p:cNvPr id="379" name="TextShape 2"/>
+          <p:cNvSpPr txBox="1"/>
+          <p:nvPr/>
+        </p:nvSpPr>
+        <p:spPr>
+          <a:xfrm>
+            <a:off x="634320" y="3601080"/>
+            <a:ext cx="1203120" cy="281880"/>
+          </a:xfrm>
+          <a:prstGeom prst="rect">
+            <a:avLst/>
+          </a:prstGeom>
+          <a:noFill/>
+          <a:ln>
+            <a:noFill/>
+          </a:ln>
+        </p:spPr>
+        <p:txBody>
+          <a:bodyPr tIns="0" bIns="0"/>
+          <a:p>
+            <a:endParaRPr b="0" lang="en-US" sz="2000" spc="-1" strike="noStrike">
+              <a:solidFill>
+                <a:srgbClr val="767171"/>
+              </a:solidFill>
+              <a:uFill>
+                <a:solidFill>
+                  <a:srgbClr val="ffffff"/>
+                </a:solidFill>
+              </a:uFill>
+              <a:latin typeface="Calibri"/>
             </a:endParaRPr>
           </a:p>
         </p:txBody>
@@ -20019,14 +20357,14 @@
       </p:grpSpPr>
       <p:sp>
         <p:nvSpPr>
-          <p:cNvPr id="379" name="TextShape 1"/>
+          <p:cNvPr id="380" name="TextShape 1"/>
           <p:cNvSpPr txBox="1"/>
           <p:nvPr/>
         </p:nvSpPr>
         <p:spPr>
           <a:xfrm>
-            <a:off x="632520" y="3345840"/>
-            <a:ext cx="4929120" cy="430560"/>
+            <a:off x="2452320" y="1711440"/>
+            <a:ext cx="3574080" cy="461160"/>
           </a:xfrm>
           <a:prstGeom prst="rect">
             <a:avLst/>
@@ -20037,32 +20375,32 @@
           </a:ln>
         </p:spPr>
         <p:txBody>
-          <a:bodyPr/>
-          <a:p>
-            <a:endParaRPr b="0" lang="en-US" sz="2000" spc="-1" strike="noStrike">
-              <a:solidFill>
-                <a:srgbClr val="767171"/>
-              </a:solidFill>
-              <a:uFill>
-                <a:solidFill>
-                  <a:srgbClr val="ffffff"/>
-                </a:solidFill>
-              </a:uFill>
-              <a:latin typeface="Calibri"/>
-            </a:endParaRPr>
-          </a:p>
-        </p:txBody>
-      </p:sp>
-      <p:sp>
-        <p:nvSpPr>
-          <p:cNvPr id="380" name="TextShape 2"/>
+          <a:bodyPr tIns="36000" bIns="36000" anchor="ctr"/>
+          <a:p>
+            <a:endParaRPr b="0" lang="en-US" sz="1800" spc="-1" strike="noStrike">
+              <a:solidFill>
+                <a:srgbClr val="3f3f3f"/>
+              </a:solidFill>
+              <a:uFill>
+                <a:solidFill>
+                  <a:srgbClr val="ffffff"/>
+                </a:solidFill>
+              </a:uFill>
+              <a:latin typeface="Arial Narrow"/>
+            </a:endParaRPr>
+          </a:p>
+        </p:txBody>
+      </p:sp>
+      <p:sp>
+        <p:nvSpPr>
+          <p:cNvPr id="381" name="TextShape 2"/>
           <p:cNvSpPr txBox="1"/>
           <p:nvPr/>
         </p:nvSpPr>
         <p:spPr>
           <a:xfrm>
-            <a:off x="632520" y="3841560"/>
-            <a:ext cx="2206080" cy="226080"/>
+            <a:off x="743760" y="3302640"/>
+            <a:ext cx="5135760" cy="189000"/>
           </a:xfrm>
           <a:prstGeom prst="rect">
             <a:avLst/>
@@ -20085,6 +20423,98 @@
                 </a:solidFill>
               </a:uFill>
               <a:latin typeface="Calibri"/>
+            </a:endParaRPr>
+          </a:p>
+        </p:txBody>
+      </p:sp>
+      <p:sp>
+        <p:nvSpPr>
+          <p:cNvPr id="382" name="TextShape 3"/>
+          <p:cNvSpPr txBox="1"/>
+          <p:nvPr/>
+        </p:nvSpPr>
+        <p:spPr>
+          <a:xfrm>
+            <a:off x="2452320" y="2355120"/>
+            <a:ext cx="3535200" cy="285840"/>
+          </a:xfrm>
+          <a:prstGeom prst="rect">
+            <a:avLst/>
+          </a:prstGeom>
+          <a:noFill/>
+          <a:ln>
+            <a:noFill/>
+          </a:ln>
+        </p:spPr>
+        <p:txBody>
+          <a:bodyPr/>
+          <a:p>
+            <a:endParaRPr b="0" lang="en-US" sz="2000" spc="-1" strike="noStrike">
+              <a:solidFill>
+                <a:srgbClr val="767171"/>
+              </a:solidFill>
+              <a:uFill>
+                <a:solidFill>
+                  <a:srgbClr val="ffffff"/>
+                </a:solidFill>
+              </a:uFill>
+              <a:latin typeface="Calibri"/>
+            </a:endParaRPr>
+          </a:p>
+        </p:txBody>
+      </p:sp>
+      <p:sp>
+        <p:nvSpPr>
+          <p:cNvPr id="383" name="TextShape 4"/>
+          <p:cNvSpPr txBox="1"/>
+          <p:nvPr/>
+        </p:nvSpPr>
+        <p:spPr>
+          <a:xfrm>
+            <a:off x="6386400" y="5005440"/>
+            <a:ext cx="471240" cy="107640"/>
+          </a:xfrm>
+          <a:prstGeom prst="rect">
+            <a:avLst/>
+          </a:prstGeom>
+          <a:noFill/>
+          <a:ln>
+            <a:noFill/>
+          </a:ln>
+        </p:spPr>
+        <p:txBody>
+          <a:bodyPr lIns="90000" rIns="90000" tIns="0" bIns="0"/>
+          <a:p>
+            <a:pPr algn="ctr">
+              <a:lnSpc>
+                <a:spcPct val="100000"/>
+              </a:lnSpc>
+            </a:pPr>
+            <a:fld id="{84E37F63-A198-4B32-BA28-06E5EE27F5FA}" type="slidenum">
+              <a:rPr b="0" lang="fr-FR" sz="700" spc="-1" strike="noStrike">
+                <a:solidFill>
+                  <a:srgbClr val="ffffff"/>
+                </a:solidFill>
+                <a:uFill>
+                  <a:solidFill>
+                    <a:srgbClr val="ffffff"/>
+                  </a:solidFill>
+                </a:uFill>
+                <a:latin typeface="Arial"/>
+                <a:ea typeface="Arial"/>
+              </a:rPr>
+              <a:t>&lt;numéro&gt;</a:t>
+            </a:fld>
+            <a:endParaRPr b="0" lang="fr-FR" sz="700" spc="-1" strike="noStrike">
+              <a:solidFill>
+                <a:srgbClr val="000000"/>
+              </a:solidFill>
+              <a:uFill>
+                <a:solidFill>
+                  <a:srgbClr val="ffffff"/>
+                </a:solidFill>
+              </a:uFill>
+              <a:latin typeface="Times New Roman"/>
             </a:endParaRPr>
           </a:p>
         </p:txBody>
@@ -20098,6 +20528,127 @@
           <p:childTnLst>
             <p:seq>
               <p:cTn id="16" nodeType="mainSeq"/>
+              <p:prevCondLst>
+                <p:cond delay="0" evt="onPrev">
+                  <p:tgtEl>
+                    <p:sldTgt/>
+                  </p:tgtEl>
+                </p:cond>
+              </p:prevCondLst>
+              <p:nextCondLst>
+                <p:cond delay="0" evt="onNext">
+                  <p:tgtEl>
+                    <p:sldTgt/>
+                  </p:tgtEl>
+                </p:cond>
+              </p:nextCondLst>
+            </p:seq>
+          </p:childTnLst>
+        </p:cTn>
+      </p:par>
+    </p:tnLst>
+  </p:timing>
+</p:sld>
+</file>
+
+<file path=ppt/slides/slide9.xml><?xml version="1.0" encoding="utf-8"?>
+<p:sld xmlns:a="http://schemas.openxmlformats.org/drawingml/2006/main" xmlns:p="http://schemas.openxmlformats.org/presentationml/2006/main" xmlns:r="http://schemas.openxmlformats.org/officeDocument/2006/relationships" xmlns:p14="http://schemas.microsoft.com/office/powerpoint/2010/main" xmlns:p15="http://schemas.microsoft.com/office/powerpoint/2012/main" xmlns:mc="http://schemas.openxmlformats.org/markup-compatibility/2006">
+  <p:cSld>
+    <p:spTree>
+      <p:nvGrpSpPr>
+        <p:cNvPr id="1" name=""/>
+        <p:cNvGrpSpPr/>
+        <p:nvPr/>
+      </p:nvGrpSpPr>
+      <p:grpSpPr>
+        <a:xfrm>
+          <a:off x="0" y="0"/>
+          <a:ext cx="0" cy="0"/>
+          <a:chOff x="0" y="0"/>
+          <a:chExt cx="0" cy="0"/>
+        </a:xfrm>
+      </p:grpSpPr>
+      <p:sp>
+        <p:nvSpPr>
+          <p:cNvPr id="384" name="TextShape 1"/>
+          <p:cNvSpPr txBox="1"/>
+          <p:nvPr/>
+        </p:nvSpPr>
+        <p:spPr>
+          <a:xfrm>
+            <a:off x="632520" y="3345840"/>
+            <a:ext cx="4929120" cy="430560"/>
+          </a:xfrm>
+          <a:prstGeom prst="rect">
+            <a:avLst/>
+          </a:prstGeom>
+          <a:noFill/>
+          <a:ln>
+            <a:noFill/>
+          </a:ln>
+        </p:spPr>
+        <p:txBody>
+          <a:bodyPr/>
+          <a:p>
+            <a:endParaRPr b="0" lang="en-US" sz="2000" spc="-1" strike="noStrike">
+              <a:solidFill>
+                <a:srgbClr val="767171"/>
+              </a:solidFill>
+              <a:uFill>
+                <a:solidFill>
+                  <a:srgbClr val="ffffff"/>
+                </a:solidFill>
+              </a:uFill>
+              <a:latin typeface="Calibri"/>
+            </a:endParaRPr>
+          </a:p>
+        </p:txBody>
+      </p:sp>
+      <p:sp>
+        <p:nvSpPr>
+          <p:cNvPr id="385" name="TextShape 2"/>
+          <p:cNvSpPr txBox="1"/>
+          <p:nvPr/>
+        </p:nvSpPr>
+        <p:spPr>
+          <a:xfrm>
+            <a:off x="632520" y="3841560"/>
+            <a:ext cx="2206080" cy="226080"/>
+          </a:xfrm>
+          <a:prstGeom prst="rect">
+            <a:avLst/>
+          </a:prstGeom>
+          <a:noFill/>
+          <a:ln>
+            <a:noFill/>
+          </a:ln>
+        </p:spPr>
+        <p:txBody>
+          <a:bodyPr/>
+          <a:p>
+            <a:endParaRPr b="0" lang="en-US" sz="2000" spc="-1" strike="noStrike">
+              <a:solidFill>
+                <a:srgbClr val="767171"/>
+              </a:solidFill>
+              <a:uFill>
+                <a:solidFill>
+                  <a:srgbClr val="ffffff"/>
+                </a:solidFill>
+              </a:uFill>
+              <a:latin typeface="Calibri"/>
+            </a:endParaRPr>
+          </a:p>
+        </p:txBody>
+      </p:sp>
+    </p:spTree>
+  </p:cSld>
+  <p:timing>
+    <p:tnLst>
+      <p:par>
+        <p:cTn id="17" dur="indefinite" restart="never" nodeType="tmRoot">
+          <p:childTnLst>
+            <p:seq>
+              <p:cTn id="18" nodeType="mainSeq"/>
               <p:prevCondLst>
                 <p:cond delay="0" evt="onPrev">
                   <p:tgtEl>

</xml_diff>

<commit_message>
Ajout slides dans la présentation, jusqu'aux études menées
</commit_message>
<xml_diff>
--- a/Présentation.pptx
+++ b/Présentation.pptx
@@ -23,13 +23,18 @@
     <p:sldId id="262" r:id="rId16"/>
     <p:sldId id="263" r:id="rId17"/>
     <p:sldId id="264" r:id="rId18"/>
+    <p:sldId id="265" r:id="rId19"/>
+    <p:sldId id="266" r:id="rId20"/>
+    <p:sldId id="267" r:id="rId21"/>
+    <p:sldId id="268" r:id="rId22"/>
+    <p:sldId id="269" r:id="rId23"/>
   </p:sldIdLst>
   <p:sldSz cx="6858000" cy="5143500"/>
   <p:notesSz cx="7559675" cy="10691812"/>
 </p:presentation>
 </file>
 
-<file path=ppt/charts/chart2.xml><?xml version="1.0" encoding="utf-8"?>
+<file path=ppt/charts/chart3.xml><?xml version="1.0" encoding="utf-8"?>
 <c:chartSpace xmlns:c="http://schemas.openxmlformats.org/drawingml/2006/chart" xmlns:a="http://schemas.openxmlformats.org/drawingml/2006/main" xmlns:r="http://schemas.openxmlformats.org/officeDocument/2006/relationships">
   <c:lang val="en-US"/>
   <c:roundedCorners val="0"/>
@@ -520,7 +525,7 @@
           <a:bodyPr lIns="0" rIns="0" tIns="0" bIns="0" anchor="b"/>
           <a:p>
             <a:pPr algn="r"/>
-            <a:fld id="{78BF4941-7676-4002-986E-BD53ED57259C}" type="slidenum">
+            <a:fld id="{00274813-EC20-49C2-AEC5-D75780F2C1A7}" type="slidenum">
               <a:rPr b="0" lang="fr-FR" sz="1400" spc="-1" strike="noStrike">
                 <a:solidFill>
                   <a:srgbClr val="000000"/>
@@ -573,7 +578,7 @@
       </p:grpSpPr>
       <p:sp>
         <p:nvSpPr>
-          <p:cNvPr id="386" name="PlaceHolder 1"/>
+          <p:cNvPr id="420" name="PlaceHolder 1"/>
           <p:cNvSpPr>
             <a:spLocks noGrp="1"/>
           </p:cNvSpPr>
@@ -12703,91 +12708,7 @@
                 </a:uFill>
                 <a:latin typeface="Arial Narrow"/>
               </a:rPr>
-              <a:t>Cliquez </a:t>
-            </a:r>
-            <a:r>
-              <a:rPr b="0" lang="en-US" sz="1800" spc="-1" strike="noStrike">
-                <a:solidFill>
-                  <a:srgbClr val="3f3f3f"/>
-                </a:solidFill>
-                <a:uFill>
-                  <a:solidFill>
-                    <a:srgbClr val="ffffff"/>
-                  </a:solidFill>
-                </a:uFill>
-                <a:latin typeface="Arial Narrow"/>
-              </a:rPr>
-              <a:t>pour </a:t>
-            </a:r>
-            <a:r>
-              <a:rPr b="0" lang="en-US" sz="1800" spc="-1" strike="noStrike">
-                <a:solidFill>
-                  <a:srgbClr val="3f3f3f"/>
-                </a:solidFill>
-                <a:uFill>
-                  <a:solidFill>
-                    <a:srgbClr val="ffffff"/>
-                  </a:solidFill>
-                </a:uFill>
-                <a:latin typeface="Arial Narrow"/>
-              </a:rPr>
-              <a:t>éditer le </a:t>
-            </a:r>
-            <a:r>
-              <a:rPr b="0" lang="en-US" sz="1800" spc="-1" strike="noStrike">
-                <a:solidFill>
-                  <a:srgbClr val="3f3f3f"/>
-                </a:solidFill>
-                <a:uFill>
-                  <a:solidFill>
-                    <a:srgbClr val="ffffff"/>
-                  </a:solidFill>
-                </a:uFill>
-                <a:latin typeface="Arial Narrow"/>
-              </a:rPr>
-              <a:t>format </a:t>
-            </a:r>
-            <a:r>
-              <a:rPr b="0" lang="en-US" sz="1800" spc="-1" strike="noStrike">
-                <a:solidFill>
-                  <a:srgbClr val="3f3f3f"/>
-                </a:solidFill>
-                <a:uFill>
-                  <a:solidFill>
-                    <a:srgbClr val="ffffff"/>
-                  </a:solidFill>
-                </a:uFill>
-                <a:latin typeface="Arial Narrow"/>
-              </a:rPr>
-              <a:t>du </a:t>
-            </a:r>
-            <a:r>
-              <a:rPr b="0" lang="en-US" sz="1800" spc="-1" strike="noStrike">
-                <a:solidFill>
-                  <a:srgbClr val="3f3f3f"/>
-                </a:solidFill>
-                <a:uFill>
-                  <a:solidFill>
-                    <a:srgbClr val="ffffff"/>
-                  </a:solidFill>
-                </a:uFill>
-                <a:latin typeface="Arial Narrow"/>
-              </a:rPr>
-              <a:t>texte-</a:t>
-            </a:r>
-            <a:r>
-              <a:rPr b="0" lang="en-US" sz="1800" spc="-1" strike="noStrike">
-                <a:solidFill>
-                  <a:srgbClr val="3f3f3f"/>
-                </a:solidFill>
-                <a:uFill>
-                  <a:solidFill>
-                    <a:srgbClr val="ffffff"/>
-                  </a:solidFill>
-                </a:uFill>
-                <a:latin typeface="Arial Narrow"/>
-              </a:rPr>
-              <a:t>titre</a:t>
+              <a:t>Cliquez pour éditer le format du texte-titre</a:t>
             </a:r>
             <a:endParaRPr b="0" lang="en-US" sz="1800" spc="-1" strike="noStrike">
               <a:solidFill>
@@ -14194,7 +14115,7 @@
                 <a:spcPct val="100000"/>
               </a:lnSpc>
             </a:pPr>
-            <a:fld id="{6C6F367A-6CE8-4C76-86CB-A2F79585FDE0}" type="slidenum">
+            <a:fld id="{3157AEEA-7983-493B-A930-0570A79961E8}" type="slidenum">
               <a:rPr b="0" lang="fr-FR" sz="700" spc="-1" strike="noStrike">
                 <a:solidFill>
                   <a:srgbClr val="ffffff"/>
@@ -14207,7 +14128,7 @@
                 <a:latin typeface="Arial"/>
                 <a:ea typeface="Arial"/>
               </a:rPr>
-              <a:t>1</a:t>
+              <a:t>&lt;numéro&gt;</a:t>
             </a:fld>
             <a:endParaRPr b="0" lang="fr-FR" sz="700" spc="-1" strike="noStrike">
               <a:solidFill>
@@ -14948,7 +14869,7 @@
                 <a:spcPct val="100000"/>
               </a:lnSpc>
             </a:pPr>
-            <a:fld id="{B3C1BD85-978D-4994-B7C3-1D8FD8C352C0}" type="slidenum">
+            <a:fld id="{D71082F0-42F5-4D29-9CF0-1EB6C9A1D588}" type="slidenum">
               <a:rPr b="0" lang="fr-FR" sz="700" spc="-1" strike="noStrike">
                 <a:solidFill>
                   <a:srgbClr val="ffffff"/>
@@ -14961,7 +14882,7 @@
                 <a:latin typeface="Arial"/>
                 <a:ea typeface="Arial"/>
               </a:rPr>
-              <a:t>1</a:t>
+              <a:t>&lt;numéro&gt;</a:t>
             </a:fld>
             <a:endParaRPr b="0" lang="fr-FR" sz="700" spc="-1" strike="noStrike">
               <a:solidFill>
@@ -15773,7 +15694,7 @@
                 <a:spcPct val="100000"/>
               </a:lnSpc>
             </a:pPr>
-            <a:fld id="{569E0575-257D-422F-A7FC-7B01B9409244}" type="slidenum">
+            <a:fld id="{757DD02D-42BC-47DF-A898-E11B297FD47F}" type="slidenum">
               <a:rPr b="0" lang="fr-FR" sz="700" spc="-1" strike="noStrike">
                 <a:solidFill>
                   <a:srgbClr val="ffffff"/>
@@ -15786,7 +15707,7 @@
                 <a:latin typeface="Arial"/>
                 <a:ea typeface="Arial"/>
               </a:rPr>
-              <a:t>1</a:t>
+              <a:t>&lt;numéro&gt;</a:t>
             </a:fld>
             <a:endParaRPr b="0" lang="fr-FR" sz="700" spc="-1" strike="noStrike">
               <a:solidFill>
@@ -17824,7 +17745,7 @@
               </a:spcBef>
             </a:pPr>
             <a:r>
-              <a:rPr b="1" lang="en-US" sz="1600" spc="-1" strike="noStrike" u="sng">
+              <a:rPr b="1" lang="fr-FR" sz="1600" spc="-1" strike="noStrike" u="sng">
                 <a:solidFill>
                   <a:srgbClr val="2e75b5"/>
                 </a:solidFill>
@@ -17838,7 +17759,7 @@
               </a:rPr>
               <a:t>Etude et évaluation de la structure de donnée SVDAG et ses variantes pour le RayTracing en visualisation </a:t>
             </a:r>
-            <a:endParaRPr b="0" lang="en-US" sz="1600" spc="-1" strike="noStrike">
+            <a:endParaRPr b="0" lang="fr-FR" sz="1600" spc="-1" strike="noStrike">
               <a:solidFill>
                 <a:srgbClr val="767171"/>
               </a:solidFill>
@@ -18040,6 +17961,815 @@
           <p:childTnLst>
             <p:seq>
               <p:cTn id="2" nodeType="mainSeq"/>
+              <p:prevCondLst>
+                <p:cond delay="0" evt="onPrev">
+                  <p:tgtEl>
+                    <p:sldTgt/>
+                  </p:tgtEl>
+                </p:cond>
+              </p:prevCondLst>
+              <p:nextCondLst>
+                <p:cond delay="0" evt="onNext">
+                  <p:tgtEl>
+                    <p:sldTgt/>
+                  </p:tgtEl>
+                </p:cond>
+              </p:nextCondLst>
+            </p:seq>
+          </p:childTnLst>
+        </p:cTn>
+      </p:par>
+    </p:tnLst>
+  </p:timing>
+</p:sld>
+</file>
+
+<file path=ppt/slides/slide10.xml><?xml version="1.0" encoding="utf-8"?>
+<p:sld xmlns:a="http://schemas.openxmlformats.org/drawingml/2006/main" xmlns:p="http://schemas.openxmlformats.org/presentationml/2006/main" xmlns:r="http://schemas.openxmlformats.org/officeDocument/2006/relationships" xmlns:p14="http://schemas.microsoft.com/office/powerpoint/2010/main" xmlns:p15="http://schemas.microsoft.com/office/powerpoint/2012/main" xmlns:mc="http://schemas.openxmlformats.org/markup-compatibility/2006">
+  <p:cSld>
+    <p:spTree>
+      <p:nvGrpSpPr>
+        <p:cNvPr id="1" name=""/>
+        <p:cNvGrpSpPr/>
+        <p:nvPr/>
+      </p:nvGrpSpPr>
+      <p:grpSpPr>
+        <a:xfrm>
+          <a:off x="0" y="0"/>
+          <a:ext cx="0" cy="0"/>
+          <a:chOff x="0" y="0"/>
+          <a:chExt cx="0" cy="0"/>
+        </a:xfrm>
+      </p:grpSpPr>
+      <p:sp>
+        <p:nvSpPr>
+          <p:cNvPr id="406" name="TextShape 1"/>
+          <p:cNvSpPr txBox="1"/>
+          <p:nvPr/>
+        </p:nvSpPr>
+        <p:spPr>
+          <a:xfrm>
+            <a:off x="830520" y="150480"/>
+            <a:ext cx="6171840" cy="277560"/>
+          </a:xfrm>
+          <a:prstGeom prst="rect">
+            <a:avLst/>
+          </a:prstGeom>
+          <a:noFill/>
+          <a:ln>
+            <a:noFill/>
+          </a:ln>
+        </p:spPr>
+        <p:txBody>
+          <a:bodyPr tIns="36000" bIns="36000" anchor="ctr"/>
+          <a:p>
+            <a:endParaRPr b="0" lang="en-US" sz="1800" spc="-1" strike="noStrike">
+              <a:solidFill>
+                <a:srgbClr val="3f3f3f"/>
+              </a:solidFill>
+              <a:uFill>
+                <a:solidFill>
+                  <a:srgbClr val="ffffff"/>
+                </a:solidFill>
+              </a:uFill>
+              <a:latin typeface="Arial Narrow"/>
+            </a:endParaRPr>
+          </a:p>
+        </p:txBody>
+      </p:sp>
+      <p:sp>
+        <p:nvSpPr>
+          <p:cNvPr id="407" name="TextShape 2"/>
+          <p:cNvSpPr txBox="1"/>
+          <p:nvPr/>
+        </p:nvSpPr>
+        <p:spPr>
+          <a:xfrm>
+            <a:off x="6275880" y="5005080"/>
+            <a:ext cx="470520" cy="107280"/>
+          </a:xfrm>
+          <a:prstGeom prst="rect">
+            <a:avLst/>
+          </a:prstGeom>
+          <a:noFill/>
+          <a:ln>
+            <a:noFill/>
+          </a:ln>
+        </p:spPr>
+        <p:txBody>
+          <a:bodyPr lIns="90000" rIns="90000" tIns="0" bIns="0"/>
+          <a:p>
+            <a:pPr algn="ctr">
+              <a:lnSpc>
+                <a:spcPct val="100000"/>
+              </a:lnSpc>
+            </a:pPr>
+            <a:fld id="{5EE333DF-F337-4DED-819B-8003D5820DFA}" type="slidenum">
+              <a:rPr b="0" lang="fr-FR" sz="700" spc="-1" strike="noStrike">
+                <a:solidFill>
+                  <a:srgbClr val="ffffff"/>
+                </a:solidFill>
+                <a:uFill>
+                  <a:solidFill>
+                    <a:srgbClr val="ffffff"/>
+                  </a:solidFill>
+                </a:uFill>
+                <a:latin typeface="Arial"/>
+                <a:ea typeface="Arial"/>
+              </a:rPr>
+              <a:t>&lt;numéro&gt;</a:t>
+            </a:fld>
+            <a:endParaRPr b="0" lang="fr-FR" sz="700" spc="-1" strike="noStrike">
+              <a:solidFill>
+                <a:srgbClr val="000000"/>
+              </a:solidFill>
+              <a:uFill>
+                <a:solidFill>
+                  <a:srgbClr val="ffffff"/>
+                </a:solidFill>
+              </a:uFill>
+              <a:latin typeface="Times New Roman"/>
+            </a:endParaRPr>
+          </a:p>
+        </p:txBody>
+      </p:sp>
+      <p:graphicFrame>
+        <p:nvGraphicFramePr>
+          <p:cNvPr id="408" name="Espace réservé du contenu 1"/>
+          <p:cNvGraphicFramePr/>
+          <p:nvPr/>
+        </p:nvGraphicFramePr>
+        <p:xfrm>
+          <a:off x="1873800" y="1595160"/>
+          <a:ext cx="2845440" cy="2041200"/>
+        </p:xfrm>
+        <a:graphic>
+          <a:graphicData uri="http://schemas.openxmlformats.org/drawingml/2006/chart">
+            <c:chart xmlns:c="http://schemas.openxmlformats.org/drawingml/2006/chart" xmlns:r="http://schemas.openxmlformats.org/officeDocument/2006/relationships" r:id="rId1"/>
+          </a:graphicData>
+        </a:graphic>
+      </p:graphicFrame>
+      <p:sp>
+        <p:nvSpPr>
+          <p:cNvPr id="409" name="TextShape 3"/>
+          <p:cNvSpPr txBox="1"/>
+          <p:nvPr/>
+        </p:nvSpPr>
+        <p:spPr>
+          <a:xfrm>
+            <a:off x="495720" y="800640"/>
+            <a:ext cx="5942880" cy="382680"/>
+          </a:xfrm>
+          <a:prstGeom prst="rect">
+            <a:avLst/>
+          </a:prstGeom>
+          <a:noFill/>
+          <a:ln>
+            <a:noFill/>
+          </a:ln>
+        </p:spPr>
+        <p:txBody>
+          <a:bodyPr/>
+          <a:p>
+            <a:endParaRPr b="0" lang="en-US" sz="2000" spc="-1" strike="noStrike">
+              <a:solidFill>
+                <a:srgbClr val="767171"/>
+              </a:solidFill>
+              <a:uFill>
+                <a:solidFill>
+                  <a:srgbClr val="ffffff"/>
+                </a:solidFill>
+              </a:uFill>
+              <a:latin typeface="Calibri"/>
+            </a:endParaRPr>
+          </a:p>
+        </p:txBody>
+      </p:sp>
+    </p:spTree>
+  </p:cSld>
+  <p:timing>
+    <p:tnLst>
+      <p:par>
+        <p:cTn id="19" dur="indefinite" restart="never" nodeType="tmRoot">
+          <p:childTnLst>
+            <p:seq>
+              <p:cTn id="20" nodeType="mainSeq"/>
+              <p:prevCondLst>
+                <p:cond delay="0" evt="onPrev">
+                  <p:tgtEl>
+                    <p:sldTgt/>
+                  </p:tgtEl>
+                </p:cond>
+              </p:prevCondLst>
+              <p:nextCondLst>
+                <p:cond delay="0" evt="onNext">
+                  <p:tgtEl>
+                    <p:sldTgt/>
+                  </p:tgtEl>
+                </p:cond>
+              </p:nextCondLst>
+            </p:seq>
+          </p:childTnLst>
+        </p:cTn>
+      </p:par>
+    </p:tnLst>
+  </p:timing>
+</p:sld>
+</file>
+
+<file path=ppt/slides/slide11.xml><?xml version="1.0" encoding="utf-8"?>
+<p:sld xmlns:a="http://schemas.openxmlformats.org/drawingml/2006/main" xmlns:p="http://schemas.openxmlformats.org/presentationml/2006/main" xmlns:r="http://schemas.openxmlformats.org/officeDocument/2006/relationships" xmlns:p14="http://schemas.microsoft.com/office/powerpoint/2010/main" xmlns:p15="http://schemas.microsoft.com/office/powerpoint/2012/main" xmlns:mc="http://schemas.openxmlformats.org/markup-compatibility/2006">
+  <p:cSld>
+    <p:spTree>
+      <p:nvGrpSpPr>
+        <p:cNvPr id="1" name=""/>
+        <p:cNvGrpSpPr/>
+        <p:nvPr/>
+      </p:nvGrpSpPr>
+      <p:grpSpPr>
+        <a:xfrm>
+          <a:off x="0" y="0"/>
+          <a:ext cx="0" cy="0"/>
+          <a:chOff x="0" y="0"/>
+          <a:chExt cx="0" cy="0"/>
+        </a:xfrm>
+      </p:grpSpPr>
+      <p:sp>
+        <p:nvSpPr>
+          <p:cNvPr id="410" name="TextShape 1"/>
+          <p:cNvSpPr txBox="1"/>
+          <p:nvPr/>
+        </p:nvSpPr>
+        <p:spPr>
+          <a:xfrm>
+            <a:off x="6275880" y="5005080"/>
+            <a:ext cx="470520" cy="107280"/>
+          </a:xfrm>
+          <a:prstGeom prst="rect">
+            <a:avLst/>
+          </a:prstGeom>
+          <a:noFill/>
+          <a:ln>
+            <a:noFill/>
+          </a:ln>
+        </p:spPr>
+        <p:txBody>
+          <a:bodyPr lIns="90000" rIns="90000" tIns="0" bIns="0"/>
+          <a:p>
+            <a:pPr algn="ctr">
+              <a:lnSpc>
+                <a:spcPct val="100000"/>
+              </a:lnSpc>
+            </a:pPr>
+            <a:fld id="{7328B76B-52D4-4E0C-B8F1-631833B17DB3}" type="slidenum">
+              <a:rPr b="0" lang="fr-FR" sz="700" spc="-1" strike="noStrike">
+                <a:solidFill>
+                  <a:srgbClr val="ffffff"/>
+                </a:solidFill>
+                <a:uFill>
+                  <a:solidFill>
+                    <a:srgbClr val="ffffff"/>
+                  </a:solidFill>
+                </a:uFill>
+                <a:latin typeface="Arial"/>
+                <a:ea typeface="Arial"/>
+              </a:rPr>
+              <a:t>&lt;numéro&gt;</a:t>
+            </a:fld>
+            <a:endParaRPr b="0" lang="fr-FR" sz="700" spc="-1" strike="noStrike">
+              <a:solidFill>
+                <a:srgbClr val="000000"/>
+              </a:solidFill>
+              <a:uFill>
+                <a:solidFill>
+                  <a:srgbClr val="ffffff"/>
+                </a:solidFill>
+              </a:uFill>
+              <a:latin typeface="Times New Roman"/>
+            </a:endParaRPr>
+          </a:p>
+        </p:txBody>
+      </p:sp>
+      <p:sp>
+        <p:nvSpPr>
+          <p:cNvPr id="411" name="TextShape 2"/>
+          <p:cNvSpPr txBox="1"/>
+          <p:nvPr/>
+        </p:nvSpPr>
+        <p:spPr>
+          <a:xfrm>
+            <a:off x="634320" y="3601080"/>
+            <a:ext cx="1203120" cy="276480"/>
+          </a:xfrm>
+          <a:prstGeom prst="rect">
+            <a:avLst/>
+          </a:prstGeom>
+          <a:noFill/>
+          <a:ln>
+            <a:noFill/>
+          </a:ln>
+        </p:spPr>
+        <p:txBody>
+          <a:bodyPr tIns="0" bIns="0"/>
+          <a:p>
+            <a:endParaRPr b="0" lang="en-US" sz="2000" spc="-1" strike="noStrike">
+              <a:solidFill>
+                <a:srgbClr val="767171"/>
+              </a:solidFill>
+              <a:uFill>
+                <a:solidFill>
+                  <a:srgbClr val="ffffff"/>
+                </a:solidFill>
+              </a:uFill>
+              <a:latin typeface="Calibri"/>
+            </a:endParaRPr>
+          </a:p>
+        </p:txBody>
+      </p:sp>
+    </p:spTree>
+  </p:cSld>
+  <p:timing>
+    <p:tnLst>
+      <p:par>
+        <p:cTn id="21" dur="indefinite" restart="never" nodeType="tmRoot">
+          <p:childTnLst>
+            <p:seq>
+              <p:cTn id="22" nodeType="mainSeq"/>
+              <p:prevCondLst>
+                <p:cond delay="0" evt="onPrev">
+                  <p:tgtEl>
+                    <p:sldTgt/>
+                  </p:tgtEl>
+                </p:cond>
+              </p:prevCondLst>
+              <p:nextCondLst>
+                <p:cond delay="0" evt="onNext">
+                  <p:tgtEl>
+                    <p:sldTgt/>
+                  </p:tgtEl>
+                </p:cond>
+              </p:nextCondLst>
+            </p:seq>
+          </p:childTnLst>
+        </p:cTn>
+      </p:par>
+    </p:tnLst>
+  </p:timing>
+</p:sld>
+</file>
+
+<file path=ppt/slides/slide12.xml><?xml version="1.0" encoding="utf-8"?>
+<p:sld xmlns:a="http://schemas.openxmlformats.org/drawingml/2006/main" xmlns:p="http://schemas.openxmlformats.org/presentationml/2006/main" xmlns:r="http://schemas.openxmlformats.org/officeDocument/2006/relationships" xmlns:p14="http://schemas.microsoft.com/office/powerpoint/2010/main" xmlns:p15="http://schemas.microsoft.com/office/powerpoint/2012/main" xmlns:mc="http://schemas.openxmlformats.org/markup-compatibility/2006">
+  <p:cSld>
+    <p:spTree>
+      <p:nvGrpSpPr>
+        <p:cNvPr id="1" name=""/>
+        <p:cNvGrpSpPr/>
+        <p:nvPr/>
+      </p:nvGrpSpPr>
+      <p:grpSpPr>
+        <a:xfrm>
+          <a:off x="0" y="0"/>
+          <a:ext cx="0" cy="0"/>
+          <a:chOff x="0" y="0"/>
+          <a:chExt cx="0" cy="0"/>
+        </a:xfrm>
+      </p:grpSpPr>
+      <p:sp>
+        <p:nvSpPr>
+          <p:cNvPr id="412" name="TextShape 1"/>
+          <p:cNvSpPr txBox="1"/>
+          <p:nvPr/>
+        </p:nvSpPr>
+        <p:spPr>
+          <a:xfrm>
+            <a:off x="6275880" y="5005080"/>
+            <a:ext cx="470520" cy="107280"/>
+          </a:xfrm>
+          <a:prstGeom prst="rect">
+            <a:avLst/>
+          </a:prstGeom>
+          <a:noFill/>
+          <a:ln>
+            <a:noFill/>
+          </a:ln>
+        </p:spPr>
+        <p:txBody>
+          <a:bodyPr lIns="90000" rIns="90000" tIns="0" bIns="0"/>
+          <a:p>
+            <a:pPr algn="ctr">
+              <a:lnSpc>
+                <a:spcPct val="100000"/>
+              </a:lnSpc>
+            </a:pPr>
+            <a:fld id="{2B254598-0B1B-4972-B8FF-8C753F3D88A3}" type="slidenum">
+              <a:rPr b="0" lang="fr-FR" sz="700" spc="-1" strike="noStrike">
+                <a:solidFill>
+                  <a:srgbClr val="ffffff"/>
+                </a:solidFill>
+                <a:uFill>
+                  <a:solidFill>
+                    <a:srgbClr val="ffffff"/>
+                  </a:solidFill>
+                </a:uFill>
+                <a:latin typeface="Arial"/>
+                <a:ea typeface="Arial"/>
+              </a:rPr>
+              <a:t>&lt;numéro&gt;</a:t>
+            </a:fld>
+            <a:endParaRPr b="0" lang="fr-FR" sz="700" spc="-1" strike="noStrike">
+              <a:solidFill>
+                <a:srgbClr val="000000"/>
+              </a:solidFill>
+              <a:uFill>
+                <a:solidFill>
+                  <a:srgbClr val="ffffff"/>
+                </a:solidFill>
+              </a:uFill>
+              <a:latin typeface="Times New Roman"/>
+            </a:endParaRPr>
+          </a:p>
+        </p:txBody>
+      </p:sp>
+      <p:sp>
+        <p:nvSpPr>
+          <p:cNvPr id="413" name="TextShape 2"/>
+          <p:cNvSpPr txBox="1"/>
+          <p:nvPr/>
+        </p:nvSpPr>
+        <p:spPr>
+          <a:xfrm>
+            <a:off x="634320" y="3601080"/>
+            <a:ext cx="1203120" cy="281880"/>
+          </a:xfrm>
+          <a:prstGeom prst="rect">
+            <a:avLst/>
+          </a:prstGeom>
+          <a:noFill/>
+          <a:ln>
+            <a:noFill/>
+          </a:ln>
+        </p:spPr>
+        <p:txBody>
+          <a:bodyPr tIns="0" bIns="0"/>
+          <a:p>
+            <a:endParaRPr b="0" lang="en-US" sz="2000" spc="-1" strike="noStrike">
+              <a:solidFill>
+                <a:srgbClr val="767171"/>
+              </a:solidFill>
+              <a:uFill>
+                <a:solidFill>
+                  <a:srgbClr val="ffffff"/>
+                </a:solidFill>
+              </a:uFill>
+              <a:latin typeface="Calibri"/>
+            </a:endParaRPr>
+          </a:p>
+        </p:txBody>
+      </p:sp>
+    </p:spTree>
+  </p:cSld>
+  <p:timing>
+    <p:tnLst>
+      <p:par>
+        <p:cTn id="23" dur="indefinite" restart="never" nodeType="tmRoot">
+          <p:childTnLst>
+            <p:seq>
+              <p:cTn id="24" nodeType="mainSeq"/>
+              <p:prevCondLst>
+                <p:cond delay="0" evt="onPrev">
+                  <p:tgtEl>
+                    <p:sldTgt/>
+                  </p:tgtEl>
+                </p:cond>
+              </p:prevCondLst>
+              <p:nextCondLst>
+                <p:cond delay="0" evt="onNext">
+                  <p:tgtEl>
+                    <p:sldTgt/>
+                  </p:tgtEl>
+                </p:cond>
+              </p:nextCondLst>
+            </p:seq>
+          </p:childTnLst>
+        </p:cTn>
+      </p:par>
+    </p:tnLst>
+  </p:timing>
+</p:sld>
+</file>
+
+<file path=ppt/slides/slide13.xml><?xml version="1.0" encoding="utf-8"?>
+<p:sld xmlns:a="http://schemas.openxmlformats.org/drawingml/2006/main" xmlns:p="http://schemas.openxmlformats.org/presentationml/2006/main" xmlns:r="http://schemas.openxmlformats.org/officeDocument/2006/relationships" xmlns:p14="http://schemas.microsoft.com/office/powerpoint/2010/main" xmlns:p15="http://schemas.microsoft.com/office/powerpoint/2012/main" xmlns:mc="http://schemas.openxmlformats.org/markup-compatibility/2006">
+  <p:cSld>
+    <p:spTree>
+      <p:nvGrpSpPr>
+        <p:cNvPr id="1" name=""/>
+        <p:cNvGrpSpPr/>
+        <p:nvPr/>
+      </p:nvGrpSpPr>
+      <p:grpSpPr>
+        <a:xfrm>
+          <a:off x="0" y="0"/>
+          <a:ext cx="0" cy="0"/>
+          <a:chOff x="0" y="0"/>
+          <a:chExt cx="0" cy="0"/>
+        </a:xfrm>
+      </p:grpSpPr>
+      <p:sp>
+        <p:nvSpPr>
+          <p:cNvPr id="414" name="TextShape 1"/>
+          <p:cNvSpPr txBox="1"/>
+          <p:nvPr/>
+        </p:nvSpPr>
+        <p:spPr>
+          <a:xfrm>
+            <a:off x="2452320" y="1711440"/>
+            <a:ext cx="3574080" cy="461160"/>
+          </a:xfrm>
+          <a:prstGeom prst="rect">
+            <a:avLst/>
+          </a:prstGeom>
+          <a:noFill/>
+          <a:ln>
+            <a:noFill/>
+          </a:ln>
+        </p:spPr>
+        <p:txBody>
+          <a:bodyPr tIns="36000" bIns="36000" anchor="ctr"/>
+          <a:p>
+            <a:endParaRPr b="0" lang="en-US" sz="1800" spc="-1" strike="noStrike">
+              <a:solidFill>
+                <a:srgbClr val="3f3f3f"/>
+              </a:solidFill>
+              <a:uFill>
+                <a:solidFill>
+                  <a:srgbClr val="ffffff"/>
+                </a:solidFill>
+              </a:uFill>
+              <a:latin typeface="Arial Narrow"/>
+            </a:endParaRPr>
+          </a:p>
+        </p:txBody>
+      </p:sp>
+      <p:sp>
+        <p:nvSpPr>
+          <p:cNvPr id="415" name="TextShape 2"/>
+          <p:cNvSpPr txBox="1"/>
+          <p:nvPr/>
+        </p:nvSpPr>
+        <p:spPr>
+          <a:xfrm>
+            <a:off x="743760" y="3302640"/>
+            <a:ext cx="5135760" cy="189000"/>
+          </a:xfrm>
+          <a:prstGeom prst="rect">
+            <a:avLst/>
+          </a:prstGeom>
+          <a:noFill/>
+          <a:ln>
+            <a:noFill/>
+          </a:ln>
+        </p:spPr>
+        <p:txBody>
+          <a:bodyPr/>
+          <a:p>
+            <a:endParaRPr b="0" lang="en-US" sz="2000" spc="-1" strike="noStrike">
+              <a:solidFill>
+                <a:srgbClr val="767171"/>
+              </a:solidFill>
+              <a:uFill>
+                <a:solidFill>
+                  <a:srgbClr val="ffffff"/>
+                </a:solidFill>
+              </a:uFill>
+              <a:latin typeface="Calibri"/>
+            </a:endParaRPr>
+          </a:p>
+        </p:txBody>
+      </p:sp>
+      <p:sp>
+        <p:nvSpPr>
+          <p:cNvPr id="416" name="TextShape 3"/>
+          <p:cNvSpPr txBox="1"/>
+          <p:nvPr/>
+        </p:nvSpPr>
+        <p:spPr>
+          <a:xfrm>
+            <a:off x="2452320" y="2355120"/>
+            <a:ext cx="3535200" cy="285840"/>
+          </a:xfrm>
+          <a:prstGeom prst="rect">
+            <a:avLst/>
+          </a:prstGeom>
+          <a:noFill/>
+          <a:ln>
+            <a:noFill/>
+          </a:ln>
+        </p:spPr>
+        <p:txBody>
+          <a:bodyPr/>
+          <a:p>
+            <a:endParaRPr b="0" lang="en-US" sz="2000" spc="-1" strike="noStrike">
+              <a:solidFill>
+                <a:srgbClr val="767171"/>
+              </a:solidFill>
+              <a:uFill>
+                <a:solidFill>
+                  <a:srgbClr val="ffffff"/>
+                </a:solidFill>
+              </a:uFill>
+              <a:latin typeface="Calibri"/>
+            </a:endParaRPr>
+          </a:p>
+        </p:txBody>
+      </p:sp>
+      <p:sp>
+        <p:nvSpPr>
+          <p:cNvPr id="417" name="TextShape 4"/>
+          <p:cNvSpPr txBox="1"/>
+          <p:nvPr/>
+        </p:nvSpPr>
+        <p:spPr>
+          <a:xfrm>
+            <a:off x="6386400" y="5005440"/>
+            <a:ext cx="471240" cy="107640"/>
+          </a:xfrm>
+          <a:prstGeom prst="rect">
+            <a:avLst/>
+          </a:prstGeom>
+          <a:noFill/>
+          <a:ln>
+            <a:noFill/>
+          </a:ln>
+        </p:spPr>
+        <p:txBody>
+          <a:bodyPr lIns="90000" rIns="90000" tIns="0" bIns="0"/>
+          <a:p>
+            <a:pPr algn="ctr">
+              <a:lnSpc>
+                <a:spcPct val="100000"/>
+              </a:lnSpc>
+            </a:pPr>
+            <a:fld id="{ACE6C67A-B452-44DE-9142-A9A9F7AEB4FA}" type="slidenum">
+              <a:rPr b="0" lang="fr-FR" sz="700" spc="-1" strike="noStrike">
+                <a:solidFill>
+                  <a:srgbClr val="ffffff"/>
+                </a:solidFill>
+                <a:uFill>
+                  <a:solidFill>
+                    <a:srgbClr val="ffffff"/>
+                  </a:solidFill>
+                </a:uFill>
+                <a:latin typeface="Arial"/>
+                <a:ea typeface="Arial"/>
+              </a:rPr>
+              <a:t>&lt;numéro&gt;</a:t>
+            </a:fld>
+            <a:endParaRPr b="0" lang="fr-FR" sz="700" spc="-1" strike="noStrike">
+              <a:solidFill>
+                <a:srgbClr val="000000"/>
+              </a:solidFill>
+              <a:uFill>
+                <a:solidFill>
+                  <a:srgbClr val="ffffff"/>
+                </a:solidFill>
+              </a:uFill>
+              <a:latin typeface="Times New Roman"/>
+            </a:endParaRPr>
+          </a:p>
+        </p:txBody>
+      </p:sp>
+    </p:spTree>
+  </p:cSld>
+  <p:timing>
+    <p:tnLst>
+      <p:par>
+        <p:cTn id="25" dur="indefinite" restart="never" nodeType="tmRoot">
+          <p:childTnLst>
+            <p:seq>
+              <p:cTn id="26" nodeType="mainSeq"/>
+              <p:prevCondLst>
+                <p:cond delay="0" evt="onPrev">
+                  <p:tgtEl>
+                    <p:sldTgt/>
+                  </p:tgtEl>
+                </p:cond>
+              </p:prevCondLst>
+              <p:nextCondLst>
+                <p:cond delay="0" evt="onNext">
+                  <p:tgtEl>
+                    <p:sldTgt/>
+                  </p:tgtEl>
+                </p:cond>
+              </p:nextCondLst>
+            </p:seq>
+          </p:childTnLst>
+        </p:cTn>
+      </p:par>
+    </p:tnLst>
+  </p:timing>
+</p:sld>
+</file>
+
+<file path=ppt/slides/slide14.xml><?xml version="1.0" encoding="utf-8"?>
+<p:sld xmlns:a="http://schemas.openxmlformats.org/drawingml/2006/main" xmlns:p="http://schemas.openxmlformats.org/presentationml/2006/main" xmlns:r="http://schemas.openxmlformats.org/officeDocument/2006/relationships" xmlns:p14="http://schemas.microsoft.com/office/powerpoint/2010/main" xmlns:p15="http://schemas.microsoft.com/office/powerpoint/2012/main" xmlns:mc="http://schemas.openxmlformats.org/markup-compatibility/2006">
+  <p:cSld>
+    <p:spTree>
+      <p:nvGrpSpPr>
+        <p:cNvPr id="1" name=""/>
+        <p:cNvGrpSpPr/>
+        <p:nvPr/>
+      </p:nvGrpSpPr>
+      <p:grpSpPr>
+        <a:xfrm>
+          <a:off x="0" y="0"/>
+          <a:ext cx="0" cy="0"/>
+          <a:chOff x="0" y="0"/>
+          <a:chExt cx="0" cy="0"/>
+        </a:xfrm>
+      </p:grpSpPr>
+      <p:sp>
+        <p:nvSpPr>
+          <p:cNvPr id="418" name="TextShape 1"/>
+          <p:cNvSpPr txBox="1"/>
+          <p:nvPr/>
+        </p:nvSpPr>
+        <p:spPr>
+          <a:xfrm>
+            <a:off x="632520" y="3345840"/>
+            <a:ext cx="4929120" cy="430560"/>
+          </a:xfrm>
+          <a:prstGeom prst="rect">
+            <a:avLst/>
+          </a:prstGeom>
+          <a:noFill/>
+          <a:ln>
+            <a:noFill/>
+          </a:ln>
+        </p:spPr>
+        <p:txBody>
+          <a:bodyPr/>
+          <a:p>
+            <a:endParaRPr b="0" lang="en-US" sz="2000" spc="-1" strike="noStrike">
+              <a:solidFill>
+                <a:srgbClr val="767171"/>
+              </a:solidFill>
+              <a:uFill>
+                <a:solidFill>
+                  <a:srgbClr val="ffffff"/>
+                </a:solidFill>
+              </a:uFill>
+              <a:latin typeface="Calibri"/>
+            </a:endParaRPr>
+          </a:p>
+        </p:txBody>
+      </p:sp>
+      <p:sp>
+        <p:nvSpPr>
+          <p:cNvPr id="419" name="TextShape 2"/>
+          <p:cNvSpPr txBox="1"/>
+          <p:nvPr/>
+        </p:nvSpPr>
+        <p:spPr>
+          <a:xfrm>
+            <a:off x="632520" y="3841560"/>
+            <a:ext cx="2206080" cy="226080"/>
+          </a:xfrm>
+          <a:prstGeom prst="rect">
+            <a:avLst/>
+          </a:prstGeom>
+          <a:noFill/>
+          <a:ln>
+            <a:noFill/>
+          </a:ln>
+        </p:spPr>
+        <p:txBody>
+          <a:bodyPr/>
+          <a:p>
+            <a:endParaRPr b="0" lang="en-US" sz="2000" spc="-1" strike="noStrike">
+              <a:solidFill>
+                <a:srgbClr val="767171"/>
+              </a:solidFill>
+              <a:uFill>
+                <a:solidFill>
+                  <a:srgbClr val="ffffff"/>
+                </a:solidFill>
+              </a:uFill>
+              <a:latin typeface="Calibri"/>
+            </a:endParaRPr>
+          </a:p>
+        </p:txBody>
+      </p:sp>
+    </p:spTree>
+  </p:cSld>
+  <p:timing>
+    <p:tnLst>
+      <p:par>
+        <p:cTn id="27" dur="indefinite" restart="never" nodeType="tmRoot">
+          <p:childTnLst>
+            <p:seq>
+              <p:cTn id="28" nodeType="mainSeq"/>
               <p:prevCondLst>
                 <p:cond delay="0" evt="onPrev">
                   <p:tgtEl>
@@ -18108,7 +18838,7 @@
               </a:lnSpc>
             </a:pPr>
             <a:r>
-              <a:rPr b="1" lang="en-US" sz="1600" spc="-1" strike="noStrike" cap="all">
+              <a:rPr b="1" lang="fr-FR" sz="1600" spc="-1" strike="noStrike" cap="all">
                 <a:solidFill>
                   <a:srgbClr val="767171"/>
                 </a:solidFill>
@@ -18121,7 +18851,7 @@
               </a:rPr>
               <a:t>Sommaire</a:t>
             </a:r>
-            <a:endParaRPr b="1" lang="en-US" sz="1600" spc="-1" strike="noStrike" cap="all">
+            <a:endParaRPr b="1" lang="fr-FR" sz="1600" spc="-1" strike="noStrike" cap="all">
               <a:solidFill>
                 <a:srgbClr val="767171"/>
               </a:solidFill>
@@ -18162,7 +18892,7 @@
                 <a:spcPct val="100000"/>
               </a:lnSpc>
             </a:pPr>
-            <a:fld id="{B3AEDCB4-2D59-49C9-802E-2D31E9FBF401}" type="slidenum">
+            <a:fld id="{9C23513B-CCB5-4A54-B12C-D1D4F3BAFDF1}" type="slidenum">
               <a:rPr b="0" lang="fr-FR" sz="700" spc="-1" strike="noStrike">
                 <a:solidFill>
                   <a:srgbClr val="ffffff"/>
@@ -18225,7 +18955,7 @@
               <a:buChar char=""/>
             </a:pPr>
             <a:r>
-              <a:rPr b="0" lang="en-US" sz="2000" spc="-1" strike="noStrike">
+              <a:rPr b="0" lang="fr-FR" sz="2000" spc="-1" strike="noStrike">
                 <a:solidFill>
                   <a:srgbClr val="767171"/>
                 </a:solidFill>
@@ -18238,7 +18968,7 @@
               </a:rPr>
               <a:t>Présentation du CEA</a:t>
             </a:r>
-            <a:endParaRPr b="0" lang="en-US" sz="2000" spc="-1" strike="noStrike">
+            <a:endParaRPr b="0" lang="fr-FR" sz="2000" spc="-1" strike="noStrike">
               <a:solidFill>
                 <a:srgbClr val="767171"/>
               </a:solidFill>
@@ -18263,7 +18993,7 @@
               <a:buChar char=""/>
             </a:pPr>
             <a:r>
-              <a:rPr b="0" lang="en-US" sz="2000" spc="-1" strike="noStrike">
+              <a:rPr b="0" lang="fr-FR" sz="2000" spc="-1" strike="noStrike">
                 <a:solidFill>
                   <a:srgbClr val="767171"/>
                 </a:solidFill>
@@ -18276,7 +19006,7 @@
               </a:rPr>
               <a:t>Contexte du stage</a:t>
             </a:r>
-            <a:endParaRPr b="0" lang="en-US" sz="2000" spc="-1" strike="noStrike">
+            <a:endParaRPr b="0" lang="fr-FR" sz="2000" spc="-1" strike="noStrike">
               <a:solidFill>
                 <a:srgbClr val="767171"/>
               </a:solidFill>
@@ -18301,7 +19031,7 @@
               <a:buChar char=""/>
             </a:pPr>
             <a:r>
-              <a:rPr b="0" lang="en-US" sz="2000" spc="-1" strike="noStrike">
+              <a:rPr b="0" lang="fr-FR" sz="2000" spc="-1" strike="noStrike">
                 <a:solidFill>
                   <a:srgbClr val="767171"/>
                 </a:solidFill>
@@ -18314,7 +19044,7 @@
               </a:rPr>
               <a:t>Etudes menées</a:t>
             </a:r>
-            <a:endParaRPr b="0" lang="en-US" sz="2000" spc="-1" strike="noStrike">
+            <a:endParaRPr b="0" lang="fr-FR" sz="2000" spc="-1" strike="noStrike">
               <a:solidFill>
                 <a:srgbClr val="767171"/>
               </a:solidFill>
@@ -18339,7 +19069,7 @@
               <a:buChar char=""/>
             </a:pPr>
             <a:r>
-              <a:rPr b="0" lang="en-US" sz="2000" spc="-1" strike="noStrike">
+              <a:rPr b="0" lang="fr-FR" sz="2000" spc="-1" strike="noStrike">
                 <a:solidFill>
                   <a:srgbClr val="767171"/>
                 </a:solidFill>
@@ -18352,7 +19082,7 @@
               </a:rPr>
               <a:t>Travail réalisé</a:t>
             </a:r>
-            <a:endParaRPr b="0" lang="en-US" sz="2000" spc="-1" strike="noStrike">
+            <a:endParaRPr b="0" lang="fr-FR" sz="2000" spc="-1" strike="noStrike">
               <a:solidFill>
                 <a:srgbClr val="767171"/>
               </a:solidFill>
@@ -18377,7 +19107,7 @@
               <a:buChar char=""/>
             </a:pPr>
             <a:r>
-              <a:rPr b="0" lang="en-US" sz="2000" spc="-1" strike="noStrike">
+              <a:rPr b="0" lang="fr-FR" sz="2000" spc="-1" strike="noStrike">
                 <a:solidFill>
                   <a:srgbClr val="767171"/>
                 </a:solidFill>
@@ -18390,7 +19120,7 @@
               </a:rPr>
               <a:t>Expérience personnelle et professionnelle</a:t>
             </a:r>
-            <a:endParaRPr b="0" lang="en-US" sz="2000" spc="-1" strike="noStrike">
+            <a:endParaRPr b="0" lang="fr-FR" sz="2000" spc="-1" strike="noStrike">
               <a:solidFill>
                 <a:srgbClr val="767171"/>
               </a:solidFill>
@@ -18415,7 +19145,7 @@
               <a:buChar char=""/>
             </a:pPr>
             <a:r>
-              <a:rPr b="0" lang="en-US" sz="2000" spc="-1" strike="noStrike">
+              <a:rPr b="0" lang="fr-FR" sz="2000" spc="-1" strike="noStrike">
                 <a:solidFill>
                   <a:srgbClr val="767171"/>
                 </a:solidFill>
@@ -18428,7 +19158,7 @@
               </a:rPr>
               <a:t>Bibliographie</a:t>
             </a:r>
-            <a:endParaRPr b="0" lang="en-US" sz="2000" spc="-1" strike="noStrike">
+            <a:endParaRPr b="0" lang="fr-FR" sz="2000" spc="-1" strike="noStrike">
               <a:solidFill>
                 <a:srgbClr val="767171"/>
               </a:solidFill>
@@ -18555,7 +19285,7 @@
               </a:lnSpc>
             </a:pPr>
             <a:r>
-              <a:rPr b="1" lang="en-US" sz="1600" spc="-1" strike="noStrike" cap="all">
+              <a:rPr b="1" lang="fr-FR" sz="1600" spc="-1" strike="noStrike" cap="all">
                 <a:solidFill>
                   <a:srgbClr val="767171"/>
                 </a:solidFill>
@@ -18566,23 +19296,9 @@
                 </a:uFill>
                 <a:latin typeface="Calibri"/>
               </a:rPr>
-              <a:t>Présentati</a:t>
+              <a:t>Présentation CEa</a:t>
             </a:r>
-            <a:r>
-              <a:rPr b="1" lang="en-US" sz="1600" spc="-1" strike="noStrike" cap="all">
-                <a:solidFill>
-                  <a:srgbClr val="767171"/>
-                </a:solidFill>
-                <a:uFill>
-                  <a:solidFill>
-                    <a:srgbClr val="ffffff"/>
-                  </a:solidFill>
-                </a:uFill>
-                <a:latin typeface="Calibri"/>
-              </a:rPr>
-              <a:t>on CEa</a:t>
-            </a:r>
-            <a:endParaRPr b="1" lang="en-US" sz="1600" spc="-1" strike="noStrike" cap="all">
+            <a:endParaRPr b="1" lang="fr-FR" sz="1600" spc="-1" strike="noStrike" cap="all">
               <a:solidFill>
                 <a:srgbClr val="767171"/>
               </a:solidFill>
@@ -18623,7 +19339,7 @@
                 <a:spcPct val="100000"/>
               </a:lnSpc>
             </a:pPr>
-            <a:fld id="{B170CF8F-2C59-4D39-B244-6B06DE63EB9F}" type="slidenum">
+            <a:fld id="{14B8CD40-64FD-4A81-A8C9-33A98EC9E6EB}" type="slidenum">
               <a:rPr b="0" lang="fr-FR" sz="700" spc="-1" strike="noStrike">
                 <a:solidFill>
                   <a:srgbClr val="ffffff"/>
@@ -18686,7 +19402,7 @@
               <a:buChar char=""/>
             </a:pPr>
             <a:r>
-              <a:rPr b="0" lang="en-US" sz="2000" spc="-1" strike="noStrike">
+              <a:rPr b="0" lang="fr-FR" sz="2000" spc="-1" strike="noStrike">
                 <a:solidFill>
                   <a:srgbClr val="767171"/>
                 </a:solidFill>
@@ -18699,7 +19415,7 @@
               </a:rPr>
               <a:t>4 domaines : </a:t>
             </a:r>
-            <a:endParaRPr b="0" lang="en-US" sz="2000" spc="-1" strike="noStrike">
+            <a:endParaRPr b="0" lang="fr-FR" sz="2000" spc="-1" strike="noStrike">
               <a:solidFill>
                 <a:srgbClr val="767171"/>
               </a:solidFill>
@@ -18724,7 +19440,7 @@
               <a:buChar char=""/>
             </a:pPr>
             <a:r>
-              <a:rPr b="0" lang="en-US" sz="1600" spc="-1" strike="noStrike">
+              <a:rPr b="0" lang="fr-FR" sz="1600" spc="-1" strike="noStrike">
                 <a:solidFill>
                   <a:srgbClr val="767171"/>
                 </a:solidFill>
@@ -18737,7 +19453,7 @@
               </a:rPr>
               <a:t>Défense et sécurité</a:t>
             </a:r>
-            <a:endParaRPr b="0" lang="en-US" sz="1600" spc="-1" strike="noStrike">
+            <a:endParaRPr b="0" lang="fr-FR" sz="1600" spc="-1" strike="noStrike">
               <a:solidFill>
                 <a:srgbClr val="767171"/>
               </a:solidFill>
@@ -18762,7 +19478,7 @@
               <a:buChar char=""/>
             </a:pPr>
             <a:r>
-              <a:rPr b="0" lang="en-US" sz="1600" spc="-1" strike="noStrike">
+              <a:rPr b="0" lang="fr-FR" sz="1600" spc="-1" strike="noStrike">
                 <a:solidFill>
                   <a:srgbClr val="767171"/>
                 </a:solidFill>
@@ -18775,7 +19491,7 @@
               </a:rPr>
               <a:t>Energies bas carbone</a:t>
             </a:r>
-            <a:endParaRPr b="0" lang="en-US" sz="1600" spc="-1" strike="noStrike">
+            <a:endParaRPr b="0" lang="fr-FR" sz="1600" spc="-1" strike="noStrike">
               <a:solidFill>
                 <a:srgbClr val="767171"/>
               </a:solidFill>
@@ -18800,7 +19516,7 @@
               <a:buChar char=""/>
             </a:pPr>
             <a:r>
-              <a:rPr b="0" lang="en-US" sz="1600" spc="-1" strike="noStrike">
+              <a:rPr b="0" lang="fr-FR" sz="1600" spc="-1" strike="noStrike">
                 <a:solidFill>
                   <a:srgbClr val="767171"/>
                 </a:solidFill>
@@ -18813,7 +19529,7 @@
               </a:rPr>
               <a:t>Recherche technologiques pour l’industrie</a:t>
             </a:r>
-            <a:endParaRPr b="0" lang="en-US" sz="1600" spc="-1" strike="noStrike">
+            <a:endParaRPr b="0" lang="fr-FR" sz="1600" spc="-1" strike="noStrike">
               <a:solidFill>
                 <a:srgbClr val="767171"/>
               </a:solidFill>
@@ -18838,7 +19554,7 @@
               <a:buChar char=""/>
             </a:pPr>
             <a:r>
-              <a:rPr b="0" lang="en-US" sz="1600" spc="-1" strike="noStrike">
+              <a:rPr b="0" lang="fr-FR" sz="1600" spc="-1" strike="noStrike">
                 <a:solidFill>
                   <a:srgbClr val="767171"/>
                 </a:solidFill>
@@ -18851,7 +19567,7 @@
               </a:rPr>
               <a:t>Recherche fondamentale</a:t>
             </a:r>
-            <a:endParaRPr b="0" lang="en-US" sz="1600" spc="-1" strike="noStrike">
+            <a:endParaRPr b="0" lang="fr-FR" sz="1600" spc="-1" strike="noStrike">
               <a:solidFill>
                 <a:srgbClr val="767171"/>
               </a:solidFill>
@@ -19015,16 +19731,35 @@
         <p:txBody>
           <a:bodyPr tIns="36000" bIns="36000" anchor="ctr"/>
           <a:p>
-            <a:endParaRPr b="0" lang="en-US" sz="1800" spc="-1" strike="noStrike">
-              <a:solidFill>
-                <a:srgbClr val="3f3f3f"/>
-              </a:solidFill>
-              <a:uFill>
-                <a:solidFill>
-                  <a:srgbClr val="ffffff"/>
-                </a:solidFill>
-              </a:uFill>
-              <a:latin typeface="Arial Narrow"/>
+            <a:pPr>
+              <a:lnSpc>
+                <a:spcPct val="100000"/>
+              </a:lnSpc>
+            </a:pPr>
+            <a:r>
+              <a:rPr b="1" lang="fr-FR" sz="1600" spc="-1" strike="noStrike" cap="all">
+                <a:solidFill>
+                  <a:srgbClr val="767171"/>
+                </a:solidFill>
+                <a:uFill>
+                  <a:solidFill>
+                    <a:srgbClr val="ffffff"/>
+                  </a:solidFill>
+                </a:uFill>
+                <a:latin typeface="Calibri"/>
+              </a:rPr>
+              <a:t>Contexte du stage</a:t>
+            </a:r>
+            <a:endParaRPr b="1" lang="fr-FR" sz="1600" spc="-1" strike="noStrike" cap="all">
+              <a:solidFill>
+                <a:srgbClr val="767171"/>
+              </a:solidFill>
+              <a:uFill>
+                <a:solidFill>
+                  <a:srgbClr val="ffffff"/>
+                </a:solidFill>
+              </a:uFill>
+              <a:latin typeface="Calibri"/>
             </a:endParaRPr>
           </a:p>
         </p:txBody>
@@ -19056,7 +19791,7 @@
                 <a:spcPct val="100000"/>
               </a:lnSpc>
             </a:pPr>
-            <a:fld id="{E7FB1FB6-D375-4BDD-B194-D6D22AFE2DDB}" type="slidenum">
+            <a:fld id="{4F469CA6-A320-4A89-AB10-FFBDD270B1AA}" type="slidenum">
               <a:rPr b="0" lang="fr-FR" sz="700" spc="-1" strike="noStrike">
                 <a:solidFill>
                   <a:srgbClr val="ffffff"/>
@@ -19085,9 +19820,2324 @@
           </a:p>
         </p:txBody>
       </p:sp>
+      <p:sp>
+        <p:nvSpPr>
+          <p:cNvPr id="370" name="TextShape 3"/>
+          <p:cNvSpPr txBox="1"/>
+          <p:nvPr/>
+        </p:nvSpPr>
+        <p:spPr>
+          <a:xfrm>
+            <a:off x="3528000" y="1807200"/>
+            <a:ext cx="2952000" cy="1000800"/>
+          </a:xfrm>
+          <a:prstGeom prst="rect">
+            <a:avLst/>
+          </a:prstGeom>
+          <a:noFill/>
+          <a:ln>
+            <a:noFill/>
+          </a:ln>
+        </p:spPr>
+        <p:txBody>
+          <a:bodyPr/>
+          <a:p>
+            <a:pPr marL="432000" indent="-324000">
+              <a:spcBef>
+                <a:spcPts val="1417"/>
+              </a:spcBef>
+              <a:buClr>
+                <a:srgbClr val="000000"/>
+              </a:buClr>
+              <a:buSzPct val="45000"/>
+              <a:buFont typeface="Wingdings" charset="2"/>
+              <a:buChar char=""/>
+            </a:pPr>
+            <a:r>
+              <a:rPr b="0" lang="fr-FR" sz="2000" spc="-1" strike="noStrike">
+                <a:solidFill>
+                  <a:srgbClr val="767171"/>
+                </a:solidFill>
+                <a:uFill>
+                  <a:solidFill>
+                    <a:srgbClr val="ffffff"/>
+                  </a:solidFill>
+                </a:uFill>
+                <a:latin typeface="Calibri"/>
+              </a:rPr>
+              <a:t>V</a:t>
+            </a:r>
+            <a:r>
+              <a:rPr b="0" lang="fr-FR" sz="1500" spc="-1" strike="noStrike">
+                <a:solidFill>
+                  <a:srgbClr val="767171"/>
+                </a:solidFill>
+                <a:uFill>
+                  <a:solidFill>
+                    <a:srgbClr val="ffffff"/>
+                  </a:solidFill>
+                </a:uFill>
+                <a:latin typeface="Calibri"/>
+              </a:rPr>
+              <a:t>TK-AMR : Réduction du volume et du temps de rendu en affinant de manière locale</a:t>
+            </a:r>
+            <a:endParaRPr b="0" lang="fr-FR" sz="1500" spc="-1" strike="noStrike">
+              <a:solidFill>
+                <a:srgbClr val="767171"/>
+              </a:solidFill>
+              <a:uFill>
+                <a:solidFill>
+                  <a:srgbClr val="ffffff"/>
+                </a:solidFill>
+              </a:uFill>
+              <a:latin typeface="Calibri"/>
+            </a:endParaRPr>
+          </a:p>
+        </p:txBody>
+      </p:sp>
+      <p:sp>
+        <p:nvSpPr>
+          <p:cNvPr id="371" name="TextShape 4"/>
+          <p:cNvSpPr txBox="1"/>
+          <p:nvPr/>
+        </p:nvSpPr>
+        <p:spPr>
+          <a:xfrm>
+            <a:off x="495720" y="800640"/>
+            <a:ext cx="6128280" cy="382680"/>
+          </a:xfrm>
+          <a:prstGeom prst="rect">
+            <a:avLst/>
+          </a:prstGeom>
+          <a:noFill/>
+          <a:ln>
+            <a:noFill/>
+          </a:ln>
+        </p:spPr>
+        <p:txBody>
+          <a:bodyPr/>
+          <a:p>
+            <a:pPr marL="432000" indent="-324000">
+              <a:spcBef>
+                <a:spcPts val="1417"/>
+              </a:spcBef>
+              <a:buClr>
+                <a:srgbClr val="000000"/>
+              </a:buClr>
+              <a:buSzPct val="45000"/>
+              <a:buFont typeface="Wingdings" charset="2"/>
+              <a:buChar char=""/>
+            </a:pPr>
+            <a:r>
+              <a:rPr b="0" lang="fr-FR" sz="2000" spc="-1" strike="noStrike">
+                <a:solidFill>
+                  <a:srgbClr val="767171"/>
+                </a:solidFill>
+                <a:uFill>
+                  <a:solidFill>
+                    <a:srgbClr val="ffffff"/>
+                  </a:solidFill>
+                </a:uFill>
+                <a:latin typeface="Calibri"/>
+              </a:rPr>
+              <a:t>Appliquer des technologies du jeu vidéo sur de la visualisation scientifique</a:t>
+            </a:r>
+            <a:endParaRPr b="0" lang="fr-FR" sz="2000" spc="-1" strike="noStrike">
+              <a:solidFill>
+                <a:srgbClr val="767171"/>
+              </a:solidFill>
+              <a:uFill>
+                <a:solidFill>
+                  <a:srgbClr val="ffffff"/>
+                </a:solidFill>
+              </a:uFill>
+              <a:latin typeface="Calibri"/>
+            </a:endParaRPr>
+          </a:p>
+        </p:txBody>
+      </p:sp>
+      <p:pic>
+        <p:nvPicPr>
+          <p:cNvPr id="372" name="" descr=""/>
+          <p:cNvPicPr/>
+          <p:nvPr/>
+        </p:nvPicPr>
+        <p:blipFill>
+          <a:blip r:embed="rId1"/>
+          <a:stretch/>
+        </p:blipFill>
+        <p:spPr>
+          <a:xfrm>
+            <a:off x="288000" y="1512000"/>
+            <a:ext cx="3600000" cy="1510920"/>
+          </a:xfrm>
+          <a:prstGeom prst="rect">
+            <a:avLst/>
+          </a:prstGeom>
+          <a:ln>
+            <a:noFill/>
+          </a:ln>
+        </p:spPr>
+      </p:pic>
+      <p:pic>
+        <p:nvPicPr>
+          <p:cNvPr id="373" name="" descr=""/>
+          <p:cNvPicPr/>
+          <p:nvPr/>
+        </p:nvPicPr>
+        <p:blipFill>
+          <a:blip r:embed="rId2"/>
+          <a:stretch/>
+        </p:blipFill>
+        <p:spPr>
+          <a:xfrm>
+            <a:off x="2520000" y="3320640"/>
+            <a:ext cx="4180320" cy="927360"/>
+          </a:xfrm>
+          <a:prstGeom prst="rect">
+            <a:avLst/>
+          </a:prstGeom>
+          <a:ln>
+            <a:noFill/>
+          </a:ln>
+        </p:spPr>
+      </p:pic>
+      <p:sp>
+        <p:nvSpPr>
+          <p:cNvPr id="374" name="TextShape 5"/>
+          <p:cNvSpPr txBox="1"/>
+          <p:nvPr/>
+        </p:nvSpPr>
+        <p:spPr>
+          <a:xfrm>
+            <a:off x="432000" y="3450600"/>
+            <a:ext cx="1944000" cy="725400"/>
+          </a:xfrm>
+          <a:prstGeom prst="rect">
+            <a:avLst/>
+          </a:prstGeom>
+          <a:noFill/>
+          <a:ln>
+            <a:noFill/>
+          </a:ln>
+        </p:spPr>
+        <p:txBody>
+          <a:bodyPr lIns="90000" rIns="90000" tIns="45000" bIns="45000"/>
+          <a:p>
+            <a:pPr algn="r"/>
+            <a:r>
+              <a:rPr b="0" lang="fr-FR" sz="1500" spc="-1" strike="noStrike">
+                <a:solidFill>
+                  <a:srgbClr val="767171"/>
+                </a:solidFill>
+                <a:uFill>
+                  <a:solidFill>
+                    <a:srgbClr val="ffffff"/>
+                  </a:solidFill>
+                </a:uFill>
+                <a:latin typeface="Arial"/>
+              </a:rPr>
+              <a:t>SVDAG : Compression de scènes voxélisées</a:t>
+            </a:r>
+            <a:endParaRPr b="0" lang="fr-FR" sz="1500" spc="-1" strike="noStrike">
+              <a:solidFill>
+                <a:srgbClr val="767171"/>
+              </a:solidFill>
+              <a:uFill>
+                <a:solidFill>
+                  <a:srgbClr val="ffffff"/>
+                </a:solidFill>
+              </a:uFill>
+              <a:latin typeface="Arial"/>
+            </a:endParaRPr>
+          </a:p>
+        </p:txBody>
+      </p:sp>
+    </p:spTree>
+  </p:cSld>
+  <p:timing>
+    <p:tnLst>
+      <p:par>
+        <p:cTn id="7" dur="indefinite" restart="never" nodeType="tmRoot">
+          <p:childTnLst>
+            <p:seq>
+              <p:cTn id="8" nodeType="mainSeq"/>
+              <p:prevCondLst>
+                <p:cond delay="0" evt="onPrev">
+                  <p:tgtEl>
+                    <p:sldTgt/>
+                  </p:tgtEl>
+                </p:cond>
+              </p:prevCondLst>
+              <p:nextCondLst>
+                <p:cond delay="0" evt="onNext">
+                  <p:tgtEl>
+                    <p:sldTgt/>
+                  </p:tgtEl>
+                </p:cond>
+              </p:nextCondLst>
+            </p:seq>
+          </p:childTnLst>
+        </p:cTn>
+      </p:par>
+    </p:tnLst>
+  </p:timing>
+</p:sld>
+</file>
+
+<file path=ppt/slides/slide5.xml><?xml version="1.0" encoding="utf-8"?>
+<p:sld xmlns:a="http://schemas.openxmlformats.org/drawingml/2006/main" xmlns:p="http://schemas.openxmlformats.org/presentationml/2006/main" xmlns:r="http://schemas.openxmlformats.org/officeDocument/2006/relationships" xmlns:p14="http://schemas.microsoft.com/office/powerpoint/2010/main" xmlns:p15="http://schemas.microsoft.com/office/powerpoint/2012/main" xmlns:mc="http://schemas.openxmlformats.org/markup-compatibility/2006">
+  <p:cSld>
+    <p:spTree>
+      <p:nvGrpSpPr>
+        <p:cNvPr id="1" name=""/>
+        <p:cNvGrpSpPr/>
+        <p:nvPr/>
+      </p:nvGrpSpPr>
+      <p:grpSpPr>
+        <a:xfrm>
+          <a:off x="0" y="0"/>
+          <a:ext cx="0" cy="0"/>
+          <a:chOff x="0" y="0"/>
+          <a:chExt cx="0" cy="0"/>
+        </a:xfrm>
+      </p:grpSpPr>
+      <p:sp>
+        <p:nvSpPr>
+          <p:cNvPr id="375" name="TextShape 1"/>
+          <p:cNvSpPr txBox="1"/>
+          <p:nvPr/>
+        </p:nvSpPr>
+        <p:spPr>
+          <a:xfrm>
+            <a:off x="830520" y="150480"/>
+            <a:ext cx="6171840" cy="277560"/>
+          </a:xfrm>
+          <a:prstGeom prst="rect">
+            <a:avLst/>
+          </a:prstGeom>
+          <a:noFill/>
+          <a:ln>
+            <a:noFill/>
+          </a:ln>
+        </p:spPr>
+        <p:txBody>
+          <a:bodyPr tIns="36000" bIns="36000" anchor="ctr"/>
+          <a:p>
+            <a:pPr>
+              <a:lnSpc>
+                <a:spcPct val="100000"/>
+              </a:lnSpc>
+            </a:pPr>
+            <a:r>
+              <a:rPr b="1" lang="fr-FR" sz="1600" spc="-1" strike="noStrike" cap="all">
+                <a:solidFill>
+                  <a:srgbClr val="767171"/>
+                </a:solidFill>
+                <a:uFill>
+                  <a:solidFill>
+                    <a:srgbClr val="ffffff"/>
+                  </a:solidFill>
+                </a:uFill>
+                <a:latin typeface="Calibri"/>
+              </a:rPr>
+              <a:t>Contexte du stage</a:t>
+            </a:r>
+            <a:endParaRPr b="1" lang="fr-FR" sz="1600" spc="-1" strike="noStrike" cap="all">
+              <a:solidFill>
+                <a:srgbClr val="767171"/>
+              </a:solidFill>
+              <a:uFill>
+                <a:solidFill>
+                  <a:srgbClr val="ffffff"/>
+                </a:solidFill>
+              </a:uFill>
+              <a:latin typeface="Calibri"/>
+            </a:endParaRPr>
+          </a:p>
+        </p:txBody>
+      </p:sp>
+      <p:sp>
+        <p:nvSpPr>
+          <p:cNvPr id="376" name="TextShape 2"/>
+          <p:cNvSpPr txBox="1"/>
+          <p:nvPr/>
+        </p:nvSpPr>
+        <p:spPr>
+          <a:xfrm>
+            <a:off x="6275880" y="5005080"/>
+            <a:ext cx="470520" cy="107280"/>
+          </a:xfrm>
+          <a:prstGeom prst="rect">
+            <a:avLst/>
+          </a:prstGeom>
+          <a:noFill/>
+          <a:ln>
+            <a:noFill/>
+          </a:ln>
+        </p:spPr>
+        <p:txBody>
+          <a:bodyPr lIns="90000" rIns="90000" tIns="0" bIns="0"/>
+          <a:p>
+            <a:pPr algn="ctr">
+              <a:lnSpc>
+                <a:spcPct val="100000"/>
+              </a:lnSpc>
+            </a:pPr>
+            <a:fld id="{1BB6552F-6110-454B-B560-E463E555B6A5}" type="slidenum">
+              <a:rPr b="0" lang="fr-FR" sz="700" spc="-1" strike="noStrike">
+                <a:solidFill>
+                  <a:srgbClr val="ffffff"/>
+                </a:solidFill>
+                <a:uFill>
+                  <a:solidFill>
+                    <a:srgbClr val="ffffff"/>
+                  </a:solidFill>
+                </a:uFill>
+                <a:latin typeface="Arial"/>
+                <a:ea typeface="Arial"/>
+              </a:rPr>
+              <a:t>&lt;numéro&gt;</a:t>
+            </a:fld>
+            <a:endParaRPr b="0" lang="fr-FR" sz="700" spc="-1" strike="noStrike">
+              <a:solidFill>
+                <a:srgbClr val="000000"/>
+              </a:solidFill>
+              <a:uFill>
+                <a:solidFill>
+                  <a:srgbClr val="ffffff"/>
+                </a:solidFill>
+              </a:uFill>
+              <a:latin typeface="Times New Roman"/>
+            </a:endParaRPr>
+          </a:p>
+        </p:txBody>
+      </p:sp>
+      <p:sp>
+        <p:nvSpPr>
+          <p:cNvPr id="377" name="TextShape 3"/>
+          <p:cNvSpPr txBox="1"/>
+          <p:nvPr/>
+        </p:nvSpPr>
+        <p:spPr>
+          <a:xfrm>
+            <a:off x="792000" y="1800000"/>
+            <a:ext cx="5040000" cy="2115000"/>
+          </a:xfrm>
+          <a:prstGeom prst="rect">
+            <a:avLst/>
+          </a:prstGeom>
+          <a:noFill/>
+          <a:ln>
+            <a:noFill/>
+          </a:ln>
+        </p:spPr>
+        <p:txBody>
+          <a:bodyPr lIns="90000" rIns="90000" tIns="45000" bIns="45000"/>
+          <a:p>
+            <a:pPr marL="216000" indent="-216000">
+              <a:buClr>
+                <a:srgbClr val="000000"/>
+              </a:buClr>
+              <a:buSzPct val="45000"/>
+              <a:buFont typeface="Symbol" charset="2"/>
+              <a:buChar char=""/>
+            </a:pPr>
+            <a:r>
+              <a:rPr b="0" lang="fr-FR" sz="1800" spc="-1" strike="noStrike">
+                <a:solidFill>
+                  <a:srgbClr val="767171"/>
+                </a:solidFill>
+                <a:uFill>
+                  <a:solidFill>
+                    <a:srgbClr val="ffffff"/>
+                  </a:solidFill>
+                </a:uFill>
+                <a:latin typeface="Arial"/>
+              </a:rPr>
+              <a:t>Etude du SVO / SVDAG / SSVDAG</a:t>
+            </a:r>
+            <a:endParaRPr b="0" lang="fr-FR" sz="1800" spc="-1" strike="noStrike">
+              <a:solidFill>
+                <a:srgbClr val="767171"/>
+              </a:solidFill>
+              <a:uFill>
+                <a:solidFill>
+                  <a:srgbClr val="ffffff"/>
+                </a:solidFill>
+              </a:uFill>
+              <a:latin typeface="Arial"/>
+            </a:endParaRPr>
+          </a:p>
+          <a:p>
+            <a:pPr marL="216000" indent="-216000">
+              <a:buClr>
+                <a:srgbClr val="000000"/>
+              </a:buClr>
+              <a:buSzPct val="45000"/>
+              <a:buFont typeface="Symbol" charset="2"/>
+              <a:buChar char=""/>
+            </a:pPr>
+            <a:endParaRPr b="0" lang="fr-FR" sz="1800" spc="-1" strike="noStrike">
+              <a:solidFill>
+                <a:srgbClr val="767171"/>
+              </a:solidFill>
+              <a:uFill>
+                <a:solidFill>
+                  <a:srgbClr val="ffffff"/>
+                </a:solidFill>
+              </a:uFill>
+              <a:latin typeface="Arial"/>
+            </a:endParaRPr>
+          </a:p>
+          <a:p>
+            <a:pPr marL="216000" indent="-216000">
+              <a:buClr>
+                <a:srgbClr val="000000"/>
+              </a:buClr>
+              <a:buSzPct val="45000"/>
+              <a:buFont typeface="Symbol" charset="2"/>
+              <a:buChar char=""/>
+            </a:pPr>
+            <a:r>
+              <a:rPr b="0" lang="fr-FR" sz="1800" spc="-1" strike="noStrike">
+                <a:solidFill>
+                  <a:srgbClr val="767171"/>
+                </a:solidFill>
+                <a:uFill>
+                  <a:solidFill>
+                    <a:srgbClr val="ffffff"/>
+                  </a:solidFill>
+                </a:uFill>
+                <a:latin typeface="Arial"/>
+              </a:rPr>
+              <a:t>Maitrise de la construction AMR</a:t>
+            </a:r>
+            <a:endParaRPr b="0" lang="fr-FR" sz="1800" spc="-1" strike="noStrike">
+              <a:solidFill>
+                <a:srgbClr val="767171"/>
+              </a:solidFill>
+              <a:uFill>
+                <a:solidFill>
+                  <a:srgbClr val="ffffff"/>
+                </a:solidFill>
+              </a:uFill>
+              <a:latin typeface="Arial"/>
+            </a:endParaRPr>
+          </a:p>
+          <a:p>
+            <a:pPr marL="216000" indent="-216000">
+              <a:buClr>
+                <a:srgbClr val="000000"/>
+              </a:buClr>
+              <a:buSzPct val="45000"/>
+              <a:buFont typeface="Symbol" charset="2"/>
+              <a:buChar char=""/>
+            </a:pPr>
+            <a:endParaRPr b="0" lang="fr-FR" sz="1800" spc="-1" strike="noStrike">
+              <a:solidFill>
+                <a:srgbClr val="767171"/>
+              </a:solidFill>
+              <a:uFill>
+                <a:solidFill>
+                  <a:srgbClr val="ffffff"/>
+                </a:solidFill>
+              </a:uFill>
+              <a:latin typeface="Arial"/>
+            </a:endParaRPr>
+          </a:p>
+          <a:p>
+            <a:pPr marL="216000" indent="-216000">
+              <a:buClr>
+                <a:srgbClr val="000000"/>
+              </a:buClr>
+              <a:buSzPct val="45000"/>
+              <a:buFont typeface="Symbol" charset="2"/>
+              <a:buChar char=""/>
+            </a:pPr>
+            <a:r>
+              <a:rPr b="0" lang="fr-FR" sz="1800" spc="-1" strike="noStrike">
+                <a:solidFill>
+                  <a:srgbClr val="767171"/>
+                </a:solidFill>
+                <a:uFill>
+                  <a:solidFill>
+                    <a:srgbClr val="ffffff"/>
+                  </a:solidFill>
+                </a:uFill>
+                <a:latin typeface="Arial"/>
+              </a:rPr>
+              <a:t>Convertisseur AMR vers SVDAG / SSVDAG</a:t>
+            </a:r>
+            <a:endParaRPr b="0" lang="fr-FR" sz="1800" spc="-1" strike="noStrike">
+              <a:solidFill>
+                <a:srgbClr val="767171"/>
+              </a:solidFill>
+              <a:uFill>
+                <a:solidFill>
+                  <a:srgbClr val="ffffff"/>
+                </a:solidFill>
+              </a:uFill>
+              <a:latin typeface="Arial"/>
+            </a:endParaRPr>
+          </a:p>
+          <a:p>
+            <a:pPr marL="216000" indent="-216000">
+              <a:buClr>
+                <a:srgbClr val="000000"/>
+              </a:buClr>
+              <a:buSzPct val="45000"/>
+              <a:buFont typeface="Symbol" charset="2"/>
+              <a:buChar char=""/>
+            </a:pPr>
+            <a:endParaRPr b="0" lang="fr-FR" sz="1800" spc="-1" strike="noStrike">
+              <a:solidFill>
+                <a:srgbClr val="767171"/>
+              </a:solidFill>
+              <a:uFill>
+                <a:solidFill>
+                  <a:srgbClr val="ffffff"/>
+                </a:solidFill>
+              </a:uFill>
+              <a:latin typeface="Arial"/>
+            </a:endParaRPr>
+          </a:p>
+          <a:p>
+            <a:pPr marL="216000" indent="-216000">
+              <a:buClr>
+                <a:srgbClr val="000000"/>
+              </a:buClr>
+              <a:buSzPct val="45000"/>
+              <a:buFont typeface="Symbol" charset="2"/>
+              <a:buChar char=""/>
+            </a:pPr>
+            <a:r>
+              <a:rPr b="0" lang="fr-FR" sz="1800" spc="-1" strike="noStrike">
+                <a:solidFill>
+                  <a:srgbClr val="767171"/>
+                </a:solidFill>
+                <a:uFill>
+                  <a:solidFill>
+                    <a:srgbClr val="ffffff"/>
+                  </a:solidFill>
+                </a:uFill>
+                <a:latin typeface="Arial"/>
+              </a:rPr>
+              <a:t>Application de rendus SVDAG sur des données AMR</a:t>
+            </a:r>
+            <a:endParaRPr b="0" lang="fr-FR" sz="1800" spc="-1" strike="noStrike">
+              <a:solidFill>
+                <a:srgbClr val="767171"/>
+              </a:solidFill>
+              <a:uFill>
+                <a:solidFill>
+                  <a:srgbClr val="ffffff"/>
+                </a:solidFill>
+              </a:uFill>
+              <a:latin typeface="Arial"/>
+            </a:endParaRPr>
+          </a:p>
+        </p:txBody>
+      </p:sp>
+      <p:sp>
+        <p:nvSpPr>
+          <p:cNvPr id="378" name="TextShape 4"/>
+          <p:cNvSpPr txBox="1"/>
+          <p:nvPr/>
+        </p:nvSpPr>
+        <p:spPr>
+          <a:xfrm>
+            <a:off x="936000" y="982080"/>
+            <a:ext cx="4392000" cy="385920"/>
+          </a:xfrm>
+          <a:prstGeom prst="rect">
+            <a:avLst/>
+          </a:prstGeom>
+          <a:noFill/>
+          <a:ln>
+            <a:noFill/>
+          </a:ln>
+        </p:spPr>
+        <p:txBody>
+          <a:bodyPr lIns="90000" rIns="90000" tIns="45000" bIns="45000"/>
+          <a:p>
+            <a:r>
+              <a:rPr b="0" lang="fr-FR" sz="2000" spc="-1" strike="noStrike">
+                <a:solidFill>
+                  <a:srgbClr val="767171"/>
+                </a:solidFill>
+                <a:uFill>
+                  <a:solidFill>
+                    <a:srgbClr val="ffffff"/>
+                  </a:solidFill>
+                </a:uFill>
+                <a:latin typeface="Colibri"/>
+              </a:rPr>
+              <a:t>Principales étapes :</a:t>
+            </a:r>
+            <a:endParaRPr b="0" lang="fr-FR" sz="2000" spc="-1" strike="noStrike">
+              <a:solidFill>
+                <a:srgbClr val="767171"/>
+              </a:solidFill>
+              <a:uFill>
+                <a:solidFill>
+                  <a:srgbClr val="ffffff"/>
+                </a:solidFill>
+              </a:uFill>
+              <a:latin typeface="Colibri"/>
+            </a:endParaRPr>
+          </a:p>
+        </p:txBody>
+      </p:sp>
+    </p:spTree>
+  </p:cSld>
+  <p:timing>
+    <p:tnLst>
+      <p:par>
+        <p:cTn id="9" dur="indefinite" restart="never" nodeType="tmRoot">
+          <p:childTnLst>
+            <p:seq>
+              <p:cTn id="10" nodeType="mainSeq"/>
+              <p:prevCondLst>
+                <p:cond delay="0" evt="onPrev">
+                  <p:tgtEl>
+                    <p:sldTgt/>
+                  </p:tgtEl>
+                </p:cond>
+              </p:prevCondLst>
+              <p:nextCondLst>
+                <p:cond delay="0" evt="onNext">
+                  <p:tgtEl>
+                    <p:sldTgt/>
+                  </p:tgtEl>
+                </p:cond>
+              </p:nextCondLst>
+            </p:seq>
+          </p:childTnLst>
+        </p:cTn>
+      </p:par>
+    </p:tnLst>
+  </p:timing>
+</p:sld>
+</file>
+
+<file path=ppt/slides/slide6.xml><?xml version="1.0" encoding="utf-8"?>
+<p:sld xmlns:a="http://schemas.openxmlformats.org/drawingml/2006/main" xmlns:p="http://schemas.openxmlformats.org/presentationml/2006/main" xmlns:r="http://schemas.openxmlformats.org/officeDocument/2006/relationships" xmlns:p14="http://schemas.microsoft.com/office/powerpoint/2010/main" xmlns:p15="http://schemas.microsoft.com/office/powerpoint/2012/main" xmlns:mc="http://schemas.openxmlformats.org/markup-compatibility/2006">
+  <p:cSld>
+    <p:spTree>
+      <p:nvGrpSpPr>
+        <p:cNvPr id="1" name=""/>
+        <p:cNvGrpSpPr/>
+        <p:nvPr/>
+      </p:nvGrpSpPr>
+      <p:grpSpPr>
+        <a:xfrm>
+          <a:off x="0" y="0"/>
+          <a:ext cx="0" cy="0"/>
+          <a:chOff x="0" y="0"/>
+          <a:chExt cx="0" cy="0"/>
+        </a:xfrm>
+      </p:grpSpPr>
+      <p:sp>
+        <p:nvSpPr>
+          <p:cNvPr id="379" name="TextShape 1"/>
+          <p:cNvSpPr txBox="1"/>
+          <p:nvPr/>
+        </p:nvSpPr>
+        <p:spPr>
+          <a:xfrm>
+            <a:off x="830520" y="150480"/>
+            <a:ext cx="6171840" cy="277560"/>
+          </a:xfrm>
+          <a:prstGeom prst="rect">
+            <a:avLst/>
+          </a:prstGeom>
+          <a:noFill/>
+          <a:ln>
+            <a:noFill/>
+          </a:ln>
+        </p:spPr>
+        <p:txBody>
+          <a:bodyPr tIns="36000" bIns="36000" anchor="ctr"/>
+          <a:p>
+            <a:pPr>
+              <a:lnSpc>
+                <a:spcPct val="100000"/>
+              </a:lnSpc>
+            </a:pPr>
+            <a:r>
+              <a:rPr b="1" lang="fr-FR" sz="1600" spc="-1" strike="noStrike" cap="all">
+                <a:solidFill>
+                  <a:srgbClr val="767171"/>
+                </a:solidFill>
+                <a:uFill>
+                  <a:solidFill>
+                    <a:srgbClr val="ffffff"/>
+                  </a:solidFill>
+                </a:uFill>
+                <a:latin typeface="Calibri"/>
+              </a:rPr>
+              <a:t>études menées</a:t>
+            </a:r>
+            <a:endParaRPr b="1" lang="fr-FR" sz="1600" spc="-1" strike="noStrike" cap="all">
+              <a:solidFill>
+                <a:srgbClr val="767171"/>
+              </a:solidFill>
+              <a:uFill>
+                <a:solidFill>
+                  <a:srgbClr val="ffffff"/>
+                </a:solidFill>
+              </a:uFill>
+              <a:latin typeface="Calibri"/>
+            </a:endParaRPr>
+          </a:p>
+        </p:txBody>
+      </p:sp>
+      <p:sp>
+        <p:nvSpPr>
+          <p:cNvPr id="380" name="TextShape 2"/>
+          <p:cNvSpPr txBox="1"/>
+          <p:nvPr/>
+        </p:nvSpPr>
+        <p:spPr>
+          <a:xfrm>
+            <a:off x="6275880" y="5005080"/>
+            <a:ext cx="470520" cy="107280"/>
+          </a:xfrm>
+          <a:prstGeom prst="rect">
+            <a:avLst/>
+          </a:prstGeom>
+          <a:noFill/>
+          <a:ln>
+            <a:noFill/>
+          </a:ln>
+        </p:spPr>
+        <p:txBody>
+          <a:bodyPr lIns="90000" rIns="90000" tIns="0" bIns="0"/>
+          <a:p>
+            <a:pPr algn="ctr">
+              <a:lnSpc>
+                <a:spcPct val="100000"/>
+              </a:lnSpc>
+            </a:pPr>
+            <a:fld id="{F83EE8F3-C385-41B6-9F7E-66A9E6EB0864}" type="slidenum">
+              <a:rPr b="0" lang="fr-FR" sz="700" spc="-1" strike="noStrike">
+                <a:solidFill>
+                  <a:srgbClr val="ffffff"/>
+                </a:solidFill>
+                <a:uFill>
+                  <a:solidFill>
+                    <a:srgbClr val="ffffff"/>
+                  </a:solidFill>
+                </a:uFill>
+                <a:latin typeface="Arial"/>
+                <a:ea typeface="Arial"/>
+              </a:rPr>
+              <a:t>&lt;numéro&gt;</a:t>
+            </a:fld>
+            <a:endParaRPr b="0" lang="fr-FR" sz="700" spc="-1" strike="noStrike">
+              <a:solidFill>
+                <a:srgbClr val="000000"/>
+              </a:solidFill>
+              <a:uFill>
+                <a:solidFill>
+                  <a:srgbClr val="ffffff"/>
+                </a:solidFill>
+              </a:uFill>
+              <a:latin typeface="Times New Roman"/>
+            </a:endParaRPr>
+          </a:p>
+        </p:txBody>
+      </p:sp>
+      <p:sp>
+        <p:nvSpPr>
+          <p:cNvPr id="381" name="TextShape 3"/>
+          <p:cNvSpPr txBox="1"/>
+          <p:nvPr/>
+        </p:nvSpPr>
+        <p:spPr>
+          <a:xfrm>
+            <a:off x="720000" y="792000"/>
+            <a:ext cx="4176000" cy="385920"/>
+          </a:xfrm>
+          <a:prstGeom prst="rect">
+            <a:avLst/>
+          </a:prstGeom>
+          <a:noFill/>
+          <a:ln>
+            <a:noFill/>
+          </a:ln>
+        </p:spPr>
+        <p:txBody>
+          <a:bodyPr lIns="90000" rIns="90000" tIns="45000" bIns="45000"/>
+          <a:p>
+            <a:r>
+              <a:rPr b="0" lang="fr-FR" sz="2000" spc="-1" strike="noStrike">
+                <a:solidFill>
+                  <a:srgbClr val="767171"/>
+                </a:solidFill>
+                <a:uFill>
+                  <a:solidFill>
+                    <a:srgbClr val="ffffff"/>
+                  </a:solidFill>
+                </a:uFill>
+                <a:latin typeface="Colibri"/>
+              </a:rPr>
+              <a:t>Sparse Voxel Octree</a:t>
+            </a:r>
+            <a:endParaRPr b="0" lang="fr-FR" sz="2000" spc="-1" strike="noStrike">
+              <a:solidFill>
+                <a:srgbClr val="767171"/>
+              </a:solidFill>
+              <a:uFill>
+                <a:solidFill>
+                  <a:srgbClr val="ffffff"/>
+                </a:solidFill>
+              </a:uFill>
+              <a:latin typeface="Colibri"/>
+            </a:endParaRPr>
+          </a:p>
+        </p:txBody>
+      </p:sp>
+      <p:sp>
+        <p:nvSpPr>
+          <p:cNvPr id="382" name="TextShape 4"/>
+          <p:cNvSpPr txBox="1"/>
+          <p:nvPr/>
+        </p:nvSpPr>
+        <p:spPr>
+          <a:xfrm>
+            <a:off x="720000" y="1368000"/>
+            <a:ext cx="4824000" cy="849600"/>
+          </a:xfrm>
+          <a:prstGeom prst="rect">
+            <a:avLst/>
+          </a:prstGeom>
+          <a:noFill/>
+          <a:ln>
+            <a:noFill/>
+          </a:ln>
+        </p:spPr>
+        <p:txBody>
+          <a:bodyPr lIns="90000" rIns="90000" tIns="45000" bIns="45000"/>
+          <a:p>
+            <a:r>
+              <a:rPr b="0" lang="fr-FR" sz="1800" spc="-1" strike="noStrike">
+                <a:solidFill>
+                  <a:srgbClr val="767171"/>
+                </a:solidFill>
+                <a:uFill>
+                  <a:solidFill>
+                    <a:srgbClr val="ffffff"/>
+                  </a:solidFill>
+                </a:uFill>
+                <a:latin typeface="Arial"/>
+              </a:rPr>
+              <a:t>Arbre de voxels de niveau défini</a:t>
+            </a:r>
+            <a:endParaRPr b="0" lang="fr-FR" sz="1800" spc="-1" strike="noStrike">
+              <a:solidFill>
+                <a:srgbClr val="767171"/>
+              </a:solidFill>
+              <a:uFill>
+                <a:solidFill>
+                  <a:srgbClr val="ffffff"/>
+                </a:solidFill>
+              </a:uFill>
+              <a:latin typeface="Arial"/>
+            </a:endParaRPr>
+          </a:p>
+          <a:p>
+            <a:endParaRPr b="0" lang="fr-FR" sz="1800" spc="-1" strike="noStrike">
+              <a:solidFill>
+                <a:srgbClr val="767171"/>
+              </a:solidFill>
+              <a:uFill>
+                <a:solidFill>
+                  <a:srgbClr val="ffffff"/>
+                </a:solidFill>
+              </a:uFill>
+              <a:latin typeface="Arial"/>
+            </a:endParaRPr>
+          </a:p>
+          <a:p>
+            <a:r>
+              <a:rPr b="0" lang="fr-FR" sz="1800" spc="-1" strike="noStrike">
+                <a:solidFill>
+                  <a:srgbClr val="767171"/>
+                </a:solidFill>
+                <a:uFill>
+                  <a:solidFill>
+                    <a:srgbClr val="ffffff"/>
+                  </a:solidFill>
+                </a:uFill>
+                <a:latin typeface="Arial"/>
+              </a:rPr>
+              <a:t>Scène découpée en grilles</a:t>
+            </a:r>
+            <a:endParaRPr b="0" lang="fr-FR" sz="1800" spc="-1" strike="noStrike">
+              <a:solidFill>
+                <a:srgbClr val="767171"/>
+              </a:solidFill>
+              <a:uFill>
+                <a:solidFill>
+                  <a:srgbClr val="ffffff"/>
+                </a:solidFill>
+              </a:uFill>
+              <a:latin typeface="Arial"/>
+            </a:endParaRPr>
+          </a:p>
+        </p:txBody>
+      </p:sp>
+      <p:pic>
+        <p:nvPicPr>
+          <p:cNvPr id="383" name="" descr=""/>
+          <p:cNvPicPr/>
+          <p:nvPr/>
+        </p:nvPicPr>
+        <p:blipFill>
+          <a:blip r:embed="rId1"/>
+          <a:stretch/>
+        </p:blipFill>
+        <p:spPr>
+          <a:xfrm>
+            <a:off x="4896000" y="1224000"/>
+            <a:ext cx="1512000" cy="1512000"/>
+          </a:xfrm>
+          <a:prstGeom prst="rect">
+            <a:avLst/>
+          </a:prstGeom>
+          <a:ln>
+            <a:noFill/>
+          </a:ln>
+        </p:spPr>
+      </p:pic>
+      <p:pic>
+        <p:nvPicPr>
+          <p:cNvPr id="384" name="" descr=""/>
+          <p:cNvPicPr/>
+          <p:nvPr/>
+        </p:nvPicPr>
+        <p:blipFill>
+          <a:blip r:embed="rId2"/>
+          <a:stretch/>
+        </p:blipFill>
+        <p:spPr>
+          <a:xfrm>
+            <a:off x="4896000" y="2880000"/>
+            <a:ext cx="1512000" cy="1512000"/>
+          </a:xfrm>
+          <a:prstGeom prst="rect">
+            <a:avLst/>
+          </a:prstGeom>
+          <a:ln>
+            <a:noFill/>
+          </a:ln>
+        </p:spPr>
+      </p:pic>
+      <p:pic>
+        <p:nvPicPr>
+          <p:cNvPr id="385" name="" descr=""/>
+          <p:cNvPicPr/>
+          <p:nvPr/>
+        </p:nvPicPr>
+        <p:blipFill>
+          <a:blip r:embed="rId3"/>
+          <a:stretch/>
+        </p:blipFill>
+        <p:spPr>
+          <a:xfrm>
+            <a:off x="288000" y="2520000"/>
+            <a:ext cx="4369320" cy="1980720"/>
+          </a:xfrm>
+          <a:prstGeom prst="rect">
+            <a:avLst/>
+          </a:prstGeom>
+          <a:ln>
+            <a:noFill/>
+          </a:ln>
+        </p:spPr>
+      </p:pic>
+    </p:spTree>
+  </p:cSld>
+  <p:timing>
+    <p:tnLst>
+      <p:par>
+        <p:cTn id="11" dur="indefinite" restart="never" nodeType="tmRoot">
+          <p:childTnLst>
+            <p:seq>
+              <p:cTn id="12" nodeType="mainSeq"/>
+              <p:prevCondLst>
+                <p:cond delay="0" evt="onPrev">
+                  <p:tgtEl>
+                    <p:sldTgt/>
+                  </p:tgtEl>
+                </p:cond>
+              </p:prevCondLst>
+              <p:nextCondLst>
+                <p:cond delay="0" evt="onNext">
+                  <p:tgtEl>
+                    <p:sldTgt/>
+                  </p:tgtEl>
+                </p:cond>
+              </p:nextCondLst>
+            </p:seq>
+          </p:childTnLst>
+        </p:cTn>
+      </p:par>
+    </p:tnLst>
+  </p:timing>
+</p:sld>
+</file>
+
+<file path=ppt/slides/slide7.xml><?xml version="1.0" encoding="utf-8"?>
+<p:sld xmlns:a="http://schemas.openxmlformats.org/drawingml/2006/main" xmlns:p="http://schemas.openxmlformats.org/presentationml/2006/main" xmlns:r="http://schemas.openxmlformats.org/officeDocument/2006/relationships" xmlns:p14="http://schemas.microsoft.com/office/powerpoint/2010/main" xmlns:p15="http://schemas.microsoft.com/office/powerpoint/2012/main" xmlns:mc="http://schemas.openxmlformats.org/markup-compatibility/2006">
+  <p:cSld>
+    <p:spTree>
+      <p:nvGrpSpPr>
+        <p:cNvPr id="1" name=""/>
+        <p:cNvGrpSpPr/>
+        <p:nvPr/>
+      </p:nvGrpSpPr>
+      <p:grpSpPr>
+        <a:xfrm>
+          <a:off x="0" y="0"/>
+          <a:ext cx="0" cy="0"/>
+          <a:chOff x="0" y="0"/>
+          <a:chExt cx="0" cy="0"/>
+        </a:xfrm>
+      </p:grpSpPr>
+      <p:sp>
+        <p:nvSpPr>
+          <p:cNvPr id="386" name="TextShape 1"/>
+          <p:cNvSpPr txBox="1"/>
+          <p:nvPr/>
+        </p:nvSpPr>
+        <p:spPr>
+          <a:xfrm>
+            <a:off x="830520" y="150480"/>
+            <a:ext cx="6171840" cy="277560"/>
+          </a:xfrm>
+          <a:prstGeom prst="rect">
+            <a:avLst/>
+          </a:prstGeom>
+          <a:noFill/>
+          <a:ln>
+            <a:noFill/>
+          </a:ln>
+        </p:spPr>
+        <p:txBody>
+          <a:bodyPr tIns="36000" bIns="36000" anchor="ctr"/>
+          <a:p>
+            <a:pPr>
+              <a:lnSpc>
+                <a:spcPct val="100000"/>
+              </a:lnSpc>
+            </a:pPr>
+            <a:r>
+              <a:rPr b="1" lang="fr-FR" sz="1600" spc="-1" strike="noStrike" cap="all">
+                <a:solidFill>
+                  <a:srgbClr val="767171"/>
+                </a:solidFill>
+                <a:uFill>
+                  <a:solidFill>
+                    <a:srgbClr val="ffffff"/>
+                  </a:solidFill>
+                </a:uFill>
+                <a:latin typeface="Calibri"/>
+              </a:rPr>
+              <a:t>études menées</a:t>
+            </a:r>
+            <a:endParaRPr b="1" lang="fr-FR" sz="1600" spc="-1" strike="noStrike" cap="all">
+              <a:solidFill>
+                <a:srgbClr val="767171"/>
+              </a:solidFill>
+              <a:uFill>
+                <a:solidFill>
+                  <a:srgbClr val="ffffff"/>
+                </a:solidFill>
+              </a:uFill>
+              <a:latin typeface="Calibri"/>
+            </a:endParaRPr>
+          </a:p>
+        </p:txBody>
+      </p:sp>
+      <p:sp>
+        <p:nvSpPr>
+          <p:cNvPr id="387" name="TextShape 2"/>
+          <p:cNvSpPr txBox="1"/>
+          <p:nvPr/>
+        </p:nvSpPr>
+        <p:spPr>
+          <a:xfrm>
+            <a:off x="6275880" y="5005080"/>
+            <a:ext cx="470520" cy="107280"/>
+          </a:xfrm>
+          <a:prstGeom prst="rect">
+            <a:avLst/>
+          </a:prstGeom>
+          <a:noFill/>
+          <a:ln>
+            <a:noFill/>
+          </a:ln>
+        </p:spPr>
+        <p:txBody>
+          <a:bodyPr lIns="90000" rIns="90000" tIns="0" bIns="0"/>
+          <a:p>
+            <a:pPr algn="ctr">
+              <a:lnSpc>
+                <a:spcPct val="100000"/>
+              </a:lnSpc>
+            </a:pPr>
+            <a:fld id="{53BBF7C6-1CFF-4766-B0BD-7C6056F919DD}" type="slidenum">
+              <a:rPr b="0" lang="fr-FR" sz="700" spc="-1" strike="noStrike">
+                <a:solidFill>
+                  <a:srgbClr val="ffffff"/>
+                </a:solidFill>
+                <a:uFill>
+                  <a:solidFill>
+                    <a:srgbClr val="ffffff"/>
+                  </a:solidFill>
+                </a:uFill>
+                <a:latin typeface="Arial"/>
+                <a:ea typeface="Arial"/>
+              </a:rPr>
+              <a:t>&lt;numéro&gt;</a:t>
+            </a:fld>
+            <a:endParaRPr b="0" lang="fr-FR" sz="700" spc="-1" strike="noStrike">
+              <a:solidFill>
+                <a:srgbClr val="000000"/>
+              </a:solidFill>
+              <a:uFill>
+                <a:solidFill>
+                  <a:srgbClr val="ffffff"/>
+                </a:solidFill>
+              </a:uFill>
+              <a:latin typeface="Times New Roman"/>
+            </a:endParaRPr>
+          </a:p>
+        </p:txBody>
+      </p:sp>
+      <p:sp>
+        <p:nvSpPr>
+          <p:cNvPr id="388" name="TextShape 3"/>
+          <p:cNvSpPr txBox="1"/>
+          <p:nvPr/>
+        </p:nvSpPr>
+        <p:spPr>
+          <a:xfrm>
+            <a:off x="720000" y="792000"/>
+            <a:ext cx="5040000" cy="681480"/>
+          </a:xfrm>
+          <a:prstGeom prst="rect">
+            <a:avLst/>
+          </a:prstGeom>
+          <a:noFill/>
+          <a:ln>
+            <a:noFill/>
+          </a:ln>
+        </p:spPr>
+        <p:txBody>
+          <a:bodyPr lIns="90000" rIns="90000" tIns="45000" bIns="45000"/>
+          <a:p>
+            <a:r>
+              <a:rPr b="0" lang="fr-FR" sz="2000" spc="-1" strike="noStrike">
+                <a:solidFill>
+                  <a:srgbClr val="767171"/>
+                </a:solidFill>
+                <a:uFill>
+                  <a:solidFill>
+                    <a:srgbClr val="ffffff"/>
+                  </a:solidFill>
+                </a:uFill>
+                <a:latin typeface="Colibri"/>
+              </a:rPr>
+              <a:t>Sparse Voxel Directed Acyclic Graph</a:t>
+            </a:r>
+            <a:endParaRPr b="0" lang="fr-FR" sz="2000" spc="-1" strike="noStrike">
+              <a:solidFill>
+                <a:srgbClr val="767171"/>
+              </a:solidFill>
+              <a:uFill>
+                <a:solidFill>
+                  <a:srgbClr val="ffffff"/>
+                </a:solidFill>
+              </a:uFill>
+              <a:latin typeface="Colibri"/>
+            </a:endParaRPr>
+          </a:p>
+        </p:txBody>
+      </p:sp>
+      <p:sp>
+        <p:nvSpPr>
+          <p:cNvPr id="389" name="TextShape 4"/>
+          <p:cNvSpPr txBox="1"/>
+          <p:nvPr/>
+        </p:nvSpPr>
+        <p:spPr>
+          <a:xfrm>
+            <a:off x="720000" y="1368000"/>
+            <a:ext cx="4824000" cy="1355760"/>
+          </a:xfrm>
+          <a:prstGeom prst="rect">
+            <a:avLst/>
+          </a:prstGeom>
+          <a:noFill/>
+          <a:ln>
+            <a:noFill/>
+          </a:ln>
+        </p:spPr>
+        <p:txBody>
+          <a:bodyPr lIns="90000" rIns="90000" tIns="45000" bIns="45000"/>
+          <a:p>
+            <a:r>
+              <a:rPr b="0" lang="fr-FR" sz="1800" spc="-1" strike="noStrike">
+                <a:solidFill>
+                  <a:srgbClr val="767171"/>
+                </a:solidFill>
+                <a:uFill>
+                  <a:solidFill>
+                    <a:srgbClr val="ffffff"/>
+                  </a:solidFill>
+                </a:uFill>
+                <a:latin typeface="Arial"/>
+              </a:rPr>
+              <a:t>Octree compressé</a:t>
+            </a:r>
+            <a:endParaRPr b="0" lang="fr-FR" sz="1800" spc="-1" strike="noStrike">
+              <a:solidFill>
+                <a:srgbClr val="767171"/>
+              </a:solidFill>
+              <a:uFill>
+                <a:solidFill>
+                  <a:srgbClr val="ffffff"/>
+                </a:solidFill>
+              </a:uFill>
+              <a:latin typeface="Arial"/>
+            </a:endParaRPr>
+          </a:p>
+          <a:p>
+            <a:endParaRPr b="0" lang="fr-FR" sz="1800" spc="-1" strike="noStrike">
+              <a:solidFill>
+                <a:srgbClr val="767171"/>
+              </a:solidFill>
+              <a:uFill>
+                <a:solidFill>
+                  <a:srgbClr val="ffffff"/>
+                </a:solidFill>
+              </a:uFill>
+              <a:latin typeface="Arial"/>
+            </a:endParaRPr>
+          </a:p>
+          <a:p>
+            <a:r>
+              <a:rPr b="0" lang="fr-FR" sz="1800" spc="-1" strike="noStrike">
+                <a:solidFill>
+                  <a:srgbClr val="767171"/>
+                </a:solidFill>
+                <a:uFill>
+                  <a:solidFill>
+                    <a:srgbClr val="ffffff"/>
+                  </a:solidFill>
+                </a:uFill>
+                <a:latin typeface="Arial"/>
+              </a:rPr>
+              <a:t>Plusieurs parents pour un nœud possible</a:t>
+            </a:r>
+            <a:endParaRPr b="0" lang="fr-FR" sz="1800" spc="-1" strike="noStrike">
+              <a:solidFill>
+                <a:srgbClr val="767171"/>
+              </a:solidFill>
+              <a:uFill>
+                <a:solidFill>
+                  <a:srgbClr val="ffffff"/>
+                </a:solidFill>
+              </a:uFill>
+              <a:latin typeface="Arial"/>
+            </a:endParaRPr>
+          </a:p>
+          <a:p>
+            <a:endParaRPr b="0" lang="fr-FR" sz="1800" spc="-1" strike="noStrike">
+              <a:solidFill>
+                <a:srgbClr val="767171"/>
+              </a:solidFill>
+              <a:uFill>
+                <a:solidFill>
+                  <a:srgbClr val="ffffff"/>
+                </a:solidFill>
+              </a:uFill>
+              <a:latin typeface="Arial"/>
+            </a:endParaRPr>
+          </a:p>
+          <a:p>
+            <a:r>
+              <a:rPr b="0" lang="fr-FR" sz="1800" spc="-1" strike="noStrike">
+                <a:solidFill>
+                  <a:srgbClr val="767171"/>
+                </a:solidFill>
+                <a:uFill>
+                  <a:solidFill>
+                    <a:srgbClr val="ffffff"/>
+                  </a:solidFill>
+                </a:uFill>
+                <a:latin typeface="Arial"/>
+              </a:rPr>
+              <a:t>Suppression des nœuds identiques</a:t>
+            </a:r>
+            <a:endParaRPr b="0" lang="fr-FR" sz="1800" spc="-1" strike="noStrike">
+              <a:solidFill>
+                <a:srgbClr val="767171"/>
+              </a:solidFill>
+              <a:uFill>
+                <a:solidFill>
+                  <a:srgbClr val="ffffff"/>
+                </a:solidFill>
+              </a:uFill>
+              <a:latin typeface="Arial"/>
+            </a:endParaRPr>
+          </a:p>
+        </p:txBody>
+      </p:sp>
+      <p:pic>
+        <p:nvPicPr>
+          <p:cNvPr id="390" name="" descr=""/>
+          <p:cNvPicPr/>
+          <p:nvPr/>
+        </p:nvPicPr>
+        <p:blipFill>
+          <a:blip r:embed="rId1"/>
+          <a:stretch/>
+        </p:blipFill>
+        <p:spPr>
+          <a:xfrm>
+            <a:off x="805680" y="2934000"/>
+            <a:ext cx="2218320" cy="1386000"/>
+          </a:xfrm>
+          <a:prstGeom prst="rect">
+            <a:avLst/>
+          </a:prstGeom>
+          <a:ln>
+            <a:noFill/>
+          </a:ln>
+        </p:spPr>
+      </p:pic>
+      <p:pic>
+        <p:nvPicPr>
+          <p:cNvPr id="391" name="" descr=""/>
+          <p:cNvPicPr/>
+          <p:nvPr/>
+        </p:nvPicPr>
+        <p:blipFill>
+          <a:blip r:embed="rId2"/>
+          <a:stretch/>
+        </p:blipFill>
+        <p:spPr>
+          <a:xfrm>
+            <a:off x="4475160" y="3002400"/>
+            <a:ext cx="924840" cy="1317600"/>
+          </a:xfrm>
+          <a:prstGeom prst="rect">
+            <a:avLst/>
+          </a:prstGeom>
+          <a:ln>
+            <a:noFill/>
+          </a:ln>
+        </p:spPr>
+      </p:pic>
+      <p:sp>
+        <p:nvSpPr>
+          <p:cNvPr id="392" name="CustomShape 5"/>
+          <p:cNvSpPr/>
+          <p:nvPr/>
+        </p:nvSpPr>
+        <p:spPr>
+          <a:xfrm>
+            <a:off x="3240000" y="3600000"/>
+            <a:ext cx="1008000" cy="72000"/>
+          </a:xfrm>
+          <a:custGeom>
+            <a:avLst/>
+            <a:gdLst/>
+            <a:ahLst/>
+            <a:rect l="0" t="0" r="r" b="b"/>
+            <a:pathLst>
+              <a:path w="2802" h="201">
+                <a:moveTo>
+                  <a:pt x="0" y="50"/>
+                </a:moveTo>
+                <a:lnTo>
+                  <a:pt x="2100" y="50"/>
+                </a:lnTo>
+                <a:lnTo>
+                  <a:pt x="2100" y="0"/>
+                </a:lnTo>
+                <a:lnTo>
+                  <a:pt x="2801" y="100"/>
+                </a:lnTo>
+                <a:lnTo>
+                  <a:pt x="2100" y="200"/>
+                </a:lnTo>
+                <a:lnTo>
+                  <a:pt x="2100" y="150"/>
+                </a:lnTo>
+                <a:lnTo>
+                  <a:pt x="0" y="150"/>
+                </a:lnTo>
+                <a:lnTo>
+                  <a:pt x="0" y="50"/>
+                </a:lnTo>
+              </a:path>
+            </a:pathLst>
+          </a:custGeom>
+          <a:solidFill>
+            <a:srgbClr val="767171"/>
+          </a:solidFill>
+          <a:ln w="6480">
+            <a:solidFill>
+              <a:srgbClr val="767171"/>
+            </a:solidFill>
+            <a:round/>
+          </a:ln>
+        </p:spPr>
+        <p:style>
+          <a:lnRef idx="0"/>
+          <a:fillRef idx="0"/>
+          <a:effectRef idx="0"/>
+          <a:fontRef idx="minor"/>
+        </p:style>
+      </p:sp>
+    </p:spTree>
+  </p:cSld>
+  <p:timing>
+    <p:tnLst>
+      <p:par>
+        <p:cTn id="13" dur="indefinite" restart="never" nodeType="tmRoot">
+          <p:childTnLst>
+            <p:seq>
+              <p:cTn id="14" nodeType="mainSeq"/>
+              <p:prevCondLst>
+                <p:cond delay="0" evt="onPrev">
+                  <p:tgtEl>
+                    <p:sldTgt/>
+                  </p:tgtEl>
+                </p:cond>
+              </p:prevCondLst>
+              <p:nextCondLst>
+                <p:cond delay="0" evt="onNext">
+                  <p:tgtEl>
+                    <p:sldTgt/>
+                  </p:tgtEl>
+                </p:cond>
+              </p:nextCondLst>
+            </p:seq>
+          </p:childTnLst>
+        </p:cTn>
+      </p:par>
+    </p:tnLst>
+  </p:timing>
+</p:sld>
+</file>
+
+<file path=ppt/slides/slide8.xml><?xml version="1.0" encoding="utf-8"?>
+<p:sld xmlns:a="http://schemas.openxmlformats.org/drawingml/2006/main" xmlns:p="http://schemas.openxmlformats.org/presentationml/2006/main" xmlns:r="http://schemas.openxmlformats.org/officeDocument/2006/relationships" xmlns:p14="http://schemas.microsoft.com/office/powerpoint/2010/main" xmlns:p15="http://schemas.microsoft.com/office/powerpoint/2012/main" xmlns:mc="http://schemas.openxmlformats.org/markup-compatibility/2006">
+  <p:cSld>
+    <p:spTree>
+      <p:nvGrpSpPr>
+        <p:cNvPr id="1" name=""/>
+        <p:cNvGrpSpPr/>
+        <p:nvPr/>
+      </p:nvGrpSpPr>
+      <p:grpSpPr>
+        <a:xfrm>
+          <a:off x="0" y="0"/>
+          <a:ext cx="0" cy="0"/>
+          <a:chOff x="0" y="0"/>
+          <a:chExt cx="0" cy="0"/>
+        </a:xfrm>
+      </p:grpSpPr>
+      <p:sp>
+        <p:nvSpPr>
+          <p:cNvPr id="393" name="TextShape 1"/>
+          <p:cNvSpPr txBox="1"/>
+          <p:nvPr/>
+        </p:nvSpPr>
+        <p:spPr>
+          <a:xfrm>
+            <a:off x="830520" y="150480"/>
+            <a:ext cx="6171840" cy="277560"/>
+          </a:xfrm>
+          <a:prstGeom prst="rect">
+            <a:avLst/>
+          </a:prstGeom>
+          <a:noFill/>
+          <a:ln>
+            <a:noFill/>
+          </a:ln>
+        </p:spPr>
+        <p:txBody>
+          <a:bodyPr tIns="36000" bIns="36000" anchor="ctr"/>
+          <a:p>
+            <a:pPr>
+              <a:lnSpc>
+                <a:spcPct val="100000"/>
+              </a:lnSpc>
+            </a:pPr>
+            <a:r>
+              <a:rPr b="1" lang="fr-FR" sz="1600" spc="-1" strike="noStrike" cap="all">
+                <a:solidFill>
+                  <a:srgbClr val="767171"/>
+                </a:solidFill>
+                <a:uFill>
+                  <a:solidFill>
+                    <a:srgbClr val="ffffff"/>
+                  </a:solidFill>
+                </a:uFill>
+                <a:latin typeface="Calibri"/>
+              </a:rPr>
+              <a:t>études menées</a:t>
+            </a:r>
+            <a:endParaRPr b="1" lang="fr-FR" sz="1600" spc="-1" strike="noStrike" cap="all">
+              <a:solidFill>
+                <a:srgbClr val="767171"/>
+              </a:solidFill>
+              <a:uFill>
+                <a:solidFill>
+                  <a:srgbClr val="ffffff"/>
+                </a:solidFill>
+              </a:uFill>
+              <a:latin typeface="Calibri"/>
+            </a:endParaRPr>
+          </a:p>
+        </p:txBody>
+      </p:sp>
+      <p:sp>
+        <p:nvSpPr>
+          <p:cNvPr id="394" name="TextShape 2"/>
+          <p:cNvSpPr txBox="1"/>
+          <p:nvPr/>
+        </p:nvSpPr>
+        <p:spPr>
+          <a:xfrm>
+            <a:off x="6275880" y="5005080"/>
+            <a:ext cx="470520" cy="107280"/>
+          </a:xfrm>
+          <a:prstGeom prst="rect">
+            <a:avLst/>
+          </a:prstGeom>
+          <a:noFill/>
+          <a:ln>
+            <a:noFill/>
+          </a:ln>
+        </p:spPr>
+        <p:txBody>
+          <a:bodyPr lIns="90000" rIns="90000" tIns="0" bIns="0"/>
+          <a:p>
+            <a:pPr algn="ctr">
+              <a:lnSpc>
+                <a:spcPct val="100000"/>
+              </a:lnSpc>
+            </a:pPr>
+            <a:fld id="{BDC9A410-1FAA-476A-B42F-05DE4DF6107F}" type="slidenum">
+              <a:rPr b="0" lang="fr-FR" sz="700" spc="-1" strike="noStrike">
+                <a:solidFill>
+                  <a:srgbClr val="ffffff"/>
+                </a:solidFill>
+                <a:uFill>
+                  <a:solidFill>
+                    <a:srgbClr val="ffffff"/>
+                  </a:solidFill>
+                </a:uFill>
+                <a:latin typeface="Arial"/>
+                <a:ea typeface="Arial"/>
+              </a:rPr>
+              <a:t>&lt;numéro&gt;</a:t>
+            </a:fld>
+            <a:endParaRPr b="0" lang="fr-FR" sz="700" spc="-1" strike="noStrike">
+              <a:solidFill>
+                <a:srgbClr val="000000"/>
+              </a:solidFill>
+              <a:uFill>
+                <a:solidFill>
+                  <a:srgbClr val="ffffff"/>
+                </a:solidFill>
+              </a:uFill>
+              <a:latin typeface="Times New Roman"/>
+            </a:endParaRPr>
+          </a:p>
+        </p:txBody>
+      </p:sp>
+      <p:sp>
+        <p:nvSpPr>
+          <p:cNvPr id="395" name="TextShape 3"/>
+          <p:cNvSpPr txBox="1"/>
+          <p:nvPr/>
+        </p:nvSpPr>
+        <p:spPr>
+          <a:xfrm>
+            <a:off x="720000" y="792000"/>
+            <a:ext cx="5040000" cy="681480"/>
+          </a:xfrm>
+          <a:prstGeom prst="rect">
+            <a:avLst/>
+          </a:prstGeom>
+          <a:noFill/>
+          <a:ln>
+            <a:noFill/>
+          </a:ln>
+        </p:spPr>
+        <p:txBody>
+          <a:bodyPr lIns="90000" rIns="90000" tIns="45000" bIns="45000"/>
+          <a:p>
+            <a:r>
+              <a:rPr b="0" lang="fr-FR" sz="2000" spc="-1" strike="noStrike">
+                <a:solidFill>
+                  <a:srgbClr val="767171"/>
+                </a:solidFill>
+                <a:uFill>
+                  <a:solidFill>
+                    <a:srgbClr val="ffffff"/>
+                  </a:solidFill>
+                </a:uFill>
+                <a:latin typeface="Colibri"/>
+              </a:rPr>
+              <a:t>Adaptive Mesh Refinement</a:t>
+            </a:r>
+            <a:endParaRPr b="0" lang="fr-FR" sz="2000" spc="-1" strike="noStrike">
+              <a:solidFill>
+                <a:srgbClr val="767171"/>
+              </a:solidFill>
+              <a:uFill>
+                <a:solidFill>
+                  <a:srgbClr val="ffffff"/>
+                </a:solidFill>
+              </a:uFill>
+              <a:latin typeface="Colibri"/>
+            </a:endParaRPr>
+          </a:p>
+        </p:txBody>
+      </p:sp>
+      <p:sp>
+        <p:nvSpPr>
+          <p:cNvPr id="396" name="TextShape 4"/>
+          <p:cNvSpPr txBox="1"/>
+          <p:nvPr/>
+        </p:nvSpPr>
+        <p:spPr>
+          <a:xfrm>
+            <a:off x="1080000" y="1525680"/>
+            <a:ext cx="4824000" cy="1148760"/>
+          </a:xfrm>
+          <a:prstGeom prst="rect">
+            <a:avLst/>
+          </a:prstGeom>
+          <a:noFill/>
+          <a:ln>
+            <a:noFill/>
+          </a:ln>
+        </p:spPr>
+        <p:txBody>
+          <a:bodyPr lIns="90000" rIns="90000" tIns="45000" bIns="45000"/>
+          <a:p>
+            <a:r>
+              <a:rPr b="0" lang="fr-FR" sz="1500" spc="-1" strike="noStrike">
+                <a:solidFill>
+                  <a:srgbClr val="767171"/>
+                </a:solidFill>
+                <a:uFill>
+                  <a:solidFill>
+                    <a:srgbClr val="ffffff"/>
+                  </a:solidFill>
+                </a:uFill>
+                <a:latin typeface="Arial"/>
+              </a:rPr>
+              <a:t>Arbre de voxels</a:t>
+            </a:r>
+            <a:endParaRPr b="0" lang="fr-FR" sz="1500" spc="-1" strike="noStrike">
+              <a:solidFill>
+                <a:srgbClr val="767171"/>
+              </a:solidFill>
+              <a:uFill>
+                <a:solidFill>
+                  <a:srgbClr val="ffffff"/>
+                </a:solidFill>
+              </a:uFill>
+              <a:latin typeface="Arial"/>
+            </a:endParaRPr>
+          </a:p>
+          <a:p>
+            <a:endParaRPr b="0" lang="fr-FR" sz="1500" spc="-1" strike="noStrike">
+              <a:solidFill>
+                <a:srgbClr val="767171"/>
+              </a:solidFill>
+              <a:uFill>
+                <a:solidFill>
+                  <a:srgbClr val="ffffff"/>
+                </a:solidFill>
+              </a:uFill>
+              <a:latin typeface="Arial"/>
+            </a:endParaRPr>
+          </a:p>
+          <a:p>
+            <a:r>
+              <a:rPr b="0" lang="fr-FR" sz="1500" spc="-1" strike="noStrike">
+                <a:solidFill>
+                  <a:srgbClr val="767171"/>
+                </a:solidFill>
+                <a:uFill>
+                  <a:solidFill>
+                    <a:srgbClr val="ffffff"/>
+                  </a:solidFill>
+                </a:uFill>
+                <a:latin typeface="Arial"/>
+              </a:rPr>
+              <a:t>Niveau des voxels variable</a:t>
+            </a:r>
+            <a:endParaRPr b="0" lang="fr-FR" sz="1500" spc="-1" strike="noStrike">
+              <a:solidFill>
+                <a:srgbClr val="767171"/>
+              </a:solidFill>
+              <a:uFill>
+                <a:solidFill>
+                  <a:srgbClr val="ffffff"/>
+                </a:solidFill>
+              </a:uFill>
+              <a:latin typeface="Arial"/>
+            </a:endParaRPr>
+          </a:p>
+          <a:p>
+            <a:endParaRPr b="0" lang="fr-FR" sz="1500" spc="-1" strike="noStrike">
+              <a:solidFill>
+                <a:srgbClr val="767171"/>
+              </a:solidFill>
+              <a:uFill>
+                <a:solidFill>
+                  <a:srgbClr val="ffffff"/>
+                </a:solidFill>
+              </a:uFill>
+              <a:latin typeface="Arial"/>
+            </a:endParaRPr>
+          </a:p>
+          <a:p>
+            <a:r>
+              <a:rPr b="0" lang="fr-FR" sz="1500" spc="-1" strike="noStrike">
+                <a:solidFill>
+                  <a:srgbClr val="767171"/>
+                </a:solidFill>
+                <a:uFill>
+                  <a:solidFill>
+                    <a:srgbClr val="ffffff"/>
+                  </a:solidFill>
+                </a:uFill>
+                <a:latin typeface="Arial"/>
+              </a:rPr>
+              <a:t>Affinage adaptatif</a:t>
+            </a:r>
+            <a:endParaRPr b="0" lang="fr-FR" sz="1500" spc="-1" strike="noStrike">
+              <a:solidFill>
+                <a:srgbClr val="767171"/>
+              </a:solidFill>
+              <a:uFill>
+                <a:solidFill>
+                  <a:srgbClr val="ffffff"/>
+                </a:solidFill>
+              </a:uFill>
+              <a:latin typeface="Arial"/>
+            </a:endParaRPr>
+          </a:p>
+        </p:txBody>
+      </p:sp>
+      <p:pic>
+        <p:nvPicPr>
+          <p:cNvPr id="397" name="" descr=""/>
+          <p:cNvPicPr/>
+          <p:nvPr/>
+        </p:nvPicPr>
+        <p:blipFill>
+          <a:blip r:embed="rId1"/>
+          <a:stretch/>
+        </p:blipFill>
+        <p:spPr>
+          <a:xfrm>
+            <a:off x="3744000" y="1584000"/>
+            <a:ext cx="1080000" cy="1080000"/>
+          </a:xfrm>
+          <a:prstGeom prst="rect">
+            <a:avLst/>
+          </a:prstGeom>
+          <a:ln>
+            <a:noFill/>
+          </a:ln>
+        </p:spPr>
+      </p:pic>
+      <p:pic>
+        <p:nvPicPr>
+          <p:cNvPr id="398" name="" descr=""/>
+          <p:cNvPicPr/>
+          <p:nvPr/>
+        </p:nvPicPr>
+        <p:blipFill>
+          <a:blip r:embed="rId2"/>
+          <a:stretch/>
+        </p:blipFill>
+        <p:spPr>
+          <a:xfrm>
+            <a:off x="5256000" y="1584000"/>
+            <a:ext cx="1072800" cy="1090440"/>
+          </a:xfrm>
+          <a:prstGeom prst="rect">
+            <a:avLst/>
+          </a:prstGeom>
+          <a:ln>
+            <a:noFill/>
+          </a:ln>
+        </p:spPr>
+      </p:pic>
+      <p:pic>
+        <p:nvPicPr>
+          <p:cNvPr id="399" name="" descr=""/>
+          <p:cNvPicPr/>
+          <p:nvPr/>
+        </p:nvPicPr>
+        <p:blipFill>
+          <a:blip r:embed="rId3"/>
+          <a:stretch/>
+        </p:blipFill>
+        <p:spPr>
+          <a:xfrm>
+            <a:off x="504000" y="3384000"/>
+            <a:ext cx="1066680" cy="1066680"/>
+          </a:xfrm>
+          <a:prstGeom prst="rect">
+            <a:avLst/>
+          </a:prstGeom>
+          <a:ln>
+            <a:noFill/>
+          </a:ln>
+        </p:spPr>
+      </p:pic>
+      <p:pic>
+        <p:nvPicPr>
+          <p:cNvPr id="400" name="" descr=""/>
+          <p:cNvPicPr/>
+          <p:nvPr/>
+        </p:nvPicPr>
+        <p:blipFill>
+          <a:blip r:embed="rId4"/>
+          <a:stretch/>
+        </p:blipFill>
+        <p:spPr>
+          <a:xfrm>
+            <a:off x="1783440" y="3528000"/>
+            <a:ext cx="1096560" cy="862560"/>
+          </a:xfrm>
+          <a:prstGeom prst="rect">
+            <a:avLst/>
+          </a:prstGeom>
+          <a:ln>
+            <a:noFill/>
+          </a:ln>
+        </p:spPr>
+      </p:pic>
+      <p:sp>
+        <p:nvSpPr>
+          <p:cNvPr id="401" name="TextShape 5"/>
+          <p:cNvSpPr txBox="1"/>
+          <p:nvPr/>
+        </p:nvSpPr>
+        <p:spPr>
+          <a:xfrm>
+            <a:off x="3312000" y="3312000"/>
+            <a:ext cx="2952000" cy="1416600"/>
+          </a:xfrm>
+          <a:prstGeom prst="rect">
+            <a:avLst/>
+          </a:prstGeom>
+          <a:noFill/>
+          <a:ln>
+            <a:noFill/>
+          </a:ln>
+        </p:spPr>
+        <p:txBody>
+          <a:bodyPr lIns="90000" rIns="90000" tIns="45000" bIns="45000"/>
+          <a:p>
+            <a:r>
+              <a:rPr b="0" lang="fr-FR" sz="1500" spc="-1" strike="noStrike">
+                <a:solidFill>
+                  <a:srgbClr val="767171"/>
+                </a:solidFill>
+                <a:uFill>
+                  <a:solidFill>
+                    <a:srgbClr val="ffffff"/>
+                  </a:solidFill>
+                </a:uFill>
+                <a:latin typeface="Colibri"/>
+              </a:rPr>
+              <a:t>Diminuti</a:t>
+            </a:r>
+            <a:r>
+              <a:rPr b="0" lang="fr-FR" sz="1500" spc="-1" strike="noStrike">
+                <a:solidFill>
+                  <a:srgbClr val="767171"/>
+                </a:solidFill>
+                <a:uFill>
+                  <a:solidFill>
+                    <a:srgbClr val="ffffff"/>
+                  </a:solidFill>
+                </a:uFill>
+                <a:latin typeface="Colibri"/>
+              </a:rPr>
+              <a:t>on du </a:t>
+            </a:r>
+            <a:r>
+              <a:rPr b="0" lang="fr-FR" sz="1500" spc="-1" strike="noStrike">
+                <a:solidFill>
+                  <a:srgbClr val="767171"/>
+                </a:solidFill>
+                <a:uFill>
+                  <a:solidFill>
+                    <a:srgbClr val="ffffff"/>
+                  </a:solidFill>
+                </a:uFill>
+                <a:latin typeface="Colibri"/>
+              </a:rPr>
+              <a:t>niveau </a:t>
+            </a:r>
+            <a:r>
+              <a:rPr b="0" lang="fr-FR" sz="1500" spc="-1" strike="noStrike">
+                <a:solidFill>
+                  <a:srgbClr val="767171"/>
+                </a:solidFill>
+                <a:uFill>
+                  <a:solidFill>
+                    <a:srgbClr val="ffffff"/>
+                  </a:solidFill>
+                </a:uFill>
+                <a:latin typeface="Colibri"/>
+              </a:rPr>
+              <a:t>max</a:t>
+            </a:r>
+            <a:endParaRPr b="0" lang="fr-FR" sz="1500" spc="-1" strike="noStrike">
+              <a:solidFill>
+                <a:srgbClr val="767171"/>
+              </a:solidFill>
+              <a:uFill>
+                <a:solidFill>
+                  <a:srgbClr val="ffffff"/>
+                </a:solidFill>
+              </a:uFill>
+              <a:latin typeface="Colibri"/>
+            </a:endParaRPr>
+          </a:p>
+          <a:p>
+            <a:endParaRPr b="0" lang="fr-FR" sz="1500" spc="-1" strike="noStrike">
+              <a:solidFill>
+                <a:srgbClr val="767171"/>
+              </a:solidFill>
+              <a:uFill>
+                <a:solidFill>
+                  <a:srgbClr val="ffffff"/>
+                </a:solidFill>
+              </a:uFill>
+              <a:latin typeface="Colibri"/>
+            </a:endParaRPr>
+          </a:p>
+          <a:p>
+            <a:r>
+              <a:rPr b="0" lang="fr-FR" sz="1500" spc="-1" strike="noStrike">
+                <a:solidFill>
+                  <a:srgbClr val="767171"/>
+                </a:solidFill>
+                <a:uFill>
+                  <a:solidFill>
+                    <a:srgbClr val="ffffff"/>
+                  </a:solidFill>
+                </a:uFill>
+                <a:latin typeface="Colibri"/>
+              </a:rPr>
+              <a:t>Résultat </a:t>
+            </a:r>
+            <a:r>
+              <a:rPr b="0" lang="fr-FR" sz="1500" spc="-1" strike="noStrike">
+                <a:solidFill>
+                  <a:srgbClr val="767171"/>
+                </a:solidFill>
+                <a:uFill>
+                  <a:solidFill>
+                    <a:srgbClr val="ffffff"/>
+                  </a:solidFill>
+                </a:uFill>
+                <a:latin typeface="Colibri"/>
+              </a:rPr>
+              <a:t>plus </a:t>
+            </a:r>
+            <a:r>
+              <a:rPr b="0" lang="fr-FR" sz="1500" spc="-1" strike="noStrike">
+                <a:solidFill>
+                  <a:srgbClr val="767171"/>
+                </a:solidFill>
+                <a:uFill>
+                  <a:solidFill>
+                    <a:srgbClr val="ffffff"/>
+                  </a:solidFill>
+                </a:uFill>
+                <a:latin typeface="Colibri"/>
+              </a:rPr>
+              <a:t>grossier</a:t>
+            </a:r>
+            <a:endParaRPr b="0" lang="fr-FR" sz="1500" spc="-1" strike="noStrike">
+              <a:solidFill>
+                <a:srgbClr val="767171"/>
+              </a:solidFill>
+              <a:uFill>
+                <a:solidFill>
+                  <a:srgbClr val="ffffff"/>
+                </a:solidFill>
+              </a:uFill>
+              <a:latin typeface="Colibri"/>
+            </a:endParaRPr>
+          </a:p>
+          <a:p>
+            <a:endParaRPr b="0" lang="fr-FR" sz="1500" spc="-1" strike="noStrike">
+              <a:solidFill>
+                <a:srgbClr val="767171"/>
+              </a:solidFill>
+              <a:uFill>
+                <a:solidFill>
+                  <a:srgbClr val="ffffff"/>
+                </a:solidFill>
+              </a:uFill>
+              <a:latin typeface="Colibri"/>
+            </a:endParaRPr>
+          </a:p>
+          <a:p>
+            <a:r>
+              <a:rPr b="0" lang="fr-FR" sz="1500" spc="-1" strike="noStrike">
+                <a:solidFill>
+                  <a:srgbClr val="767171"/>
+                </a:solidFill>
+                <a:uFill>
+                  <a:solidFill>
+                    <a:srgbClr val="ffffff"/>
+                  </a:solidFill>
+                </a:uFill>
+                <a:latin typeface="Colibri"/>
+              </a:rPr>
+              <a:t>Volume </a:t>
+            </a:r>
+            <a:r>
+              <a:rPr b="0" lang="fr-FR" sz="1500" spc="-1" strike="noStrike">
+                <a:solidFill>
+                  <a:srgbClr val="767171"/>
+                </a:solidFill>
+                <a:uFill>
+                  <a:solidFill>
+                    <a:srgbClr val="ffffff"/>
+                  </a:solidFill>
+                </a:uFill>
+                <a:latin typeface="Colibri"/>
+              </a:rPr>
+              <a:t>et temps </a:t>
+            </a:r>
+            <a:r>
+              <a:rPr b="0" lang="fr-FR" sz="1500" spc="-1" strike="noStrike">
+                <a:solidFill>
+                  <a:srgbClr val="767171"/>
+                </a:solidFill>
+                <a:uFill>
+                  <a:solidFill>
+                    <a:srgbClr val="ffffff"/>
+                  </a:solidFill>
+                </a:uFill>
+                <a:latin typeface="Colibri"/>
+              </a:rPr>
+              <a:t>de rendu </a:t>
+            </a:r>
+            <a:r>
+              <a:rPr b="0" lang="fr-FR" sz="1500" spc="-1" strike="noStrike">
+                <a:solidFill>
+                  <a:srgbClr val="767171"/>
+                </a:solidFill>
+                <a:uFill>
+                  <a:solidFill>
+                    <a:srgbClr val="ffffff"/>
+                  </a:solidFill>
+                </a:uFill>
+                <a:latin typeface="Colibri"/>
+              </a:rPr>
+              <a:t>plus </a:t>
+            </a:r>
+            <a:r>
+              <a:rPr b="0" lang="fr-FR" sz="1500" spc="-1" strike="noStrike">
+                <a:solidFill>
+                  <a:srgbClr val="767171"/>
+                </a:solidFill>
+                <a:uFill>
+                  <a:solidFill>
+                    <a:srgbClr val="ffffff"/>
+                  </a:solidFill>
+                </a:uFill>
+                <a:latin typeface="Colibri"/>
+              </a:rPr>
+              <a:t>faibles</a:t>
+            </a:r>
+            <a:endParaRPr b="0" lang="fr-FR" sz="1500" spc="-1" strike="noStrike">
+              <a:solidFill>
+                <a:srgbClr val="767171"/>
+              </a:solidFill>
+              <a:uFill>
+                <a:solidFill>
+                  <a:srgbClr val="ffffff"/>
+                </a:solidFill>
+              </a:uFill>
+              <a:latin typeface="Colibri"/>
+            </a:endParaRPr>
+          </a:p>
+        </p:txBody>
+      </p:sp>
+    </p:spTree>
+  </p:cSld>
+  <p:timing>
+    <p:tnLst>
+      <p:par>
+        <p:cTn id="15" dur="indefinite" restart="never" nodeType="tmRoot">
+          <p:childTnLst>
+            <p:seq>
+              <p:cTn id="16" nodeType="mainSeq"/>
+              <p:prevCondLst>
+                <p:cond delay="0" evt="onPrev">
+                  <p:tgtEl>
+                    <p:sldTgt/>
+                  </p:tgtEl>
+                </p:cond>
+              </p:prevCondLst>
+              <p:nextCondLst>
+                <p:cond delay="0" evt="onNext">
+                  <p:tgtEl>
+                    <p:sldTgt/>
+                  </p:tgtEl>
+                </p:cond>
+              </p:nextCondLst>
+            </p:seq>
+          </p:childTnLst>
+        </p:cTn>
+      </p:par>
+    </p:tnLst>
+  </p:timing>
+</p:sld>
+</file>
+
+<file path=ppt/slides/slide9.xml><?xml version="1.0" encoding="utf-8"?>
+<p:sld xmlns:a="http://schemas.openxmlformats.org/drawingml/2006/main" xmlns:p="http://schemas.openxmlformats.org/presentationml/2006/main" xmlns:r="http://schemas.openxmlformats.org/officeDocument/2006/relationships" xmlns:p14="http://schemas.microsoft.com/office/powerpoint/2010/main" xmlns:p15="http://schemas.microsoft.com/office/powerpoint/2012/main" xmlns:mc="http://schemas.openxmlformats.org/markup-compatibility/2006">
+  <p:cSld>
+    <p:spTree>
+      <p:nvGrpSpPr>
+        <p:cNvPr id="1" name=""/>
+        <p:cNvGrpSpPr/>
+        <p:nvPr/>
+      </p:nvGrpSpPr>
+      <p:grpSpPr>
+        <a:xfrm>
+          <a:off x="0" y="0"/>
+          <a:ext cx="0" cy="0"/>
+          <a:chOff x="0" y="0"/>
+          <a:chExt cx="0" cy="0"/>
+        </a:xfrm>
+      </p:grpSpPr>
+      <p:sp>
+        <p:nvSpPr>
+          <p:cNvPr id="402" name="TextShape 1"/>
+          <p:cNvSpPr txBox="1"/>
+          <p:nvPr/>
+        </p:nvSpPr>
+        <p:spPr>
+          <a:xfrm>
+            <a:off x="830520" y="150480"/>
+            <a:ext cx="6171840" cy="277560"/>
+          </a:xfrm>
+          <a:prstGeom prst="rect">
+            <a:avLst/>
+          </a:prstGeom>
+          <a:noFill/>
+          <a:ln>
+            <a:noFill/>
+          </a:ln>
+        </p:spPr>
+        <p:txBody>
+          <a:bodyPr tIns="36000" bIns="36000" anchor="ctr"/>
+          <a:p>
+            <a:endParaRPr b="0" lang="en-US" sz="1800" spc="-1" strike="noStrike">
+              <a:solidFill>
+                <a:srgbClr val="3f3f3f"/>
+              </a:solidFill>
+              <a:uFill>
+                <a:solidFill>
+                  <a:srgbClr val="ffffff"/>
+                </a:solidFill>
+              </a:uFill>
+              <a:latin typeface="Arial Narrow"/>
+            </a:endParaRPr>
+          </a:p>
+        </p:txBody>
+      </p:sp>
+      <p:sp>
+        <p:nvSpPr>
+          <p:cNvPr id="403" name="TextShape 2"/>
+          <p:cNvSpPr txBox="1"/>
+          <p:nvPr/>
+        </p:nvSpPr>
+        <p:spPr>
+          <a:xfrm>
+            <a:off x="6275880" y="5005080"/>
+            <a:ext cx="470520" cy="107280"/>
+          </a:xfrm>
+          <a:prstGeom prst="rect">
+            <a:avLst/>
+          </a:prstGeom>
+          <a:noFill/>
+          <a:ln>
+            <a:noFill/>
+          </a:ln>
+        </p:spPr>
+        <p:txBody>
+          <a:bodyPr lIns="90000" rIns="90000" tIns="0" bIns="0"/>
+          <a:p>
+            <a:pPr algn="ctr">
+              <a:lnSpc>
+                <a:spcPct val="100000"/>
+              </a:lnSpc>
+            </a:pPr>
+            <a:fld id="{3A6C45A2-5391-4235-A9FD-FC261B95FD18}" type="slidenum">
+              <a:rPr b="0" lang="fr-FR" sz="700" spc="-1" strike="noStrike">
+                <a:solidFill>
+                  <a:srgbClr val="ffffff"/>
+                </a:solidFill>
+                <a:uFill>
+                  <a:solidFill>
+                    <a:srgbClr val="ffffff"/>
+                  </a:solidFill>
+                </a:uFill>
+                <a:latin typeface="Arial"/>
+                <a:ea typeface="Arial"/>
+              </a:rPr>
+              <a:t>&lt;numéro&gt;</a:t>
+            </a:fld>
+            <a:endParaRPr b="0" lang="fr-FR" sz="700" spc="-1" strike="noStrike">
+              <a:solidFill>
+                <a:srgbClr val="000000"/>
+              </a:solidFill>
+              <a:uFill>
+                <a:solidFill>
+                  <a:srgbClr val="ffffff"/>
+                </a:solidFill>
+              </a:uFill>
+              <a:latin typeface="Times New Roman"/>
+            </a:endParaRPr>
+          </a:p>
+        </p:txBody>
+      </p:sp>
       <p:graphicFrame>
         <p:nvGraphicFramePr>
-          <p:cNvPr id="370" name="Table 3"/>
+          <p:cNvPr id="404" name="Table 3"/>
           <p:cNvGraphicFramePr/>
           <p:nvPr/>
         </p:nvGraphicFramePr>
@@ -19797,7 +22847,7 @@
       </p:graphicFrame>
       <p:sp>
         <p:nvSpPr>
-          <p:cNvPr id="371" name="TextShape 4"/>
+          <p:cNvPr id="405" name="TextShape 4"/>
           <p:cNvSpPr txBox="1"/>
           <p:nvPr/>
         </p:nvSpPr>
@@ -19805,815 +22855,6 @@
           <a:xfrm>
             <a:off x="495720" y="800640"/>
             <a:ext cx="5942880" cy="382680"/>
-          </a:xfrm>
-          <a:prstGeom prst="rect">
-            <a:avLst/>
-          </a:prstGeom>
-          <a:noFill/>
-          <a:ln>
-            <a:noFill/>
-          </a:ln>
-        </p:spPr>
-        <p:txBody>
-          <a:bodyPr/>
-          <a:p>
-            <a:endParaRPr b="0" lang="en-US" sz="2000" spc="-1" strike="noStrike">
-              <a:solidFill>
-                <a:srgbClr val="767171"/>
-              </a:solidFill>
-              <a:uFill>
-                <a:solidFill>
-                  <a:srgbClr val="ffffff"/>
-                </a:solidFill>
-              </a:uFill>
-              <a:latin typeface="Calibri"/>
-            </a:endParaRPr>
-          </a:p>
-        </p:txBody>
-      </p:sp>
-    </p:spTree>
-  </p:cSld>
-  <p:timing>
-    <p:tnLst>
-      <p:par>
-        <p:cTn id="7" dur="indefinite" restart="never" nodeType="tmRoot">
-          <p:childTnLst>
-            <p:seq>
-              <p:cTn id="8" nodeType="mainSeq"/>
-              <p:prevCondLst>
-                <p:cond delay="0" evt="onPrev">
-                  <p:tgtEl>
-                    <p:sldTgt/>
-                  </p:tgtEl>
-                </p:cond>
-              </p:prevCondLst>
-              <p:nextCondLst>
-                <p:cond delay="0" evt="onNext">
-                  <p:tgtEl>
-                    <p:sldTgt/>
-                  </p:tgtEl>
-                </p:cond>
-              </p:nextCondLst>
-            </p:seq>
-          </p:childTnLst>
-        </p:cTn>
-      </p:par>
-    </p:tnLst>
-  </p:timing>
-</p:sld>
-</file>
-
-<file path=ppt/slides/slide5.xml><?xml version="1.0" encoding="utf-8"?>
-<p:sld xmlns:a="http://schemas.openxmlformats.org/drawingml/2006/main" xmlns:p="http://schemas.openxmlformats.org/presentationml/2006/main" xmlns:r="http://schemas.openxmlformats.org/officeDocument/2006/relationships" xmlns:p14="http://schemas.microsoft.com/office/powerpoint/2010/main" xmlns:p15="http://schemas.microsoft.com/office/powerpoint/2012/main" xmlns:mc="http://schemas.openxmlformats.org/markup-compatibility/2006">
-  <p:cSld>
-    <p:spTree>
-      <p:nvGrpSpPr>
-        <p:cNvPr id="1" name=""/>
-        <p:cNvGrpSpPr/>
-        <p:nvPr/>
-      </p:nvGrpSpPr>
-      <p:grpSpPr>
-        <a:xfrm>
-          <a:off x="0" y="0"/>
-          <a:ext cx="0" cy="0"/>
-          <a:chOff x="0" y="0"/>
-          <a:chExt cx="0" cy="0"/>
-        </a:xfrm>
-      </p:grpSpPr>
-      <p:sp>
-        <p:nvSpPr>
-          <p:cNvPr id="372" name="TextShape 1"/>
-          <p:cNvSpPr txBox="1"/>
-          <p:nvPr/>
-        </p:nvSpPr>
-        <p:spPr>
-          <a:xfrm>
-            <a:off x="830520" y="150480"/>
-            <a:ext cx="6171840" cy="277560"/>
-          </a:xfrm>
-          <a:prstGeom prst="rect">
-            <a:avLst/>
-          </a:prstGeom>
-          <a:noFill/>
-          <a:ln>
-            <a:noFill/>
-          </a:ln>
-        </p:spPr>
-        <p:txBody>
-          <a:bodyPr tIns="36000" bIns="36000" anchor="ctr"/>
-          <a:p>
-            <a:endParaRPr b="0" lang="en-US" sz="1800" spc="-1" strike="noStrike">
-              <a:solidFill>
-                <a:srgbClr val="3f3f3f"/>
-              </a:solidFill>
-              <a:uFill>
-                <a:solidFill>
-                  <a:srgbClr val="ffffff"/>
-                </a:solidFill>
-              </a:uFill>
-              <a:latin typeface="Arial Narrow"/>
-            </a:endParaRPr>
-          </a:p>
-        </p:txBody>
-      </p:sp>
-      <p:sp>
-        <p:nvSpPr>
-          <p:cNvPr id="373" name="TextShape 2"/>
-          <p:cNvSpPr txBox="1"/>
-          <p:nvPr/>
-        </p:nvSpPr>
-        <p:spPr>
-          <a:xfrm>
-            <a:off x="6275880" y="5005080"/>
-            <a:ext cx="470520" cy="107280"/>
-          </a:xfrm>
-          <a:prstGeom prst="rect">
-            <a:avLst/>
-          </a:prstGeom>
-          <a:noFill/>
-          <a:ln>
-            <a:noFill/>
-          </a:ln>
-        </p:spPr>
-        <p:txBody>
-          <a:bodyPr lIns="90000" rIns="90000" tIns="0" bIns="0"/>
-          <a:p>
-            <a:pPr algn="ctr">
-              <a:lnSpc>
-                <a:spcPct val="100000"/>
-              </a:lnSpc>
-            </a:pPr>
-            <a:fld id="{9805B412-4E10-4C94-A084-C781A22139A2}" type="slidenum">
-              <a:rPr b="0" lang="fr-FR" sz="700" spc="-1" strike="noStrike">
-                <a:solidFill>
-                  <a:srgbClr val="ffffff"/>
-                </a:solidFill>
-                <a:uFill>
-                  <a:solidFill>
-                    <a:srgbClr val="ffffff"/>
-                  </a:solidFill>
-                </a:uFill>
-                <a:latin typeface="Arial"/>
-                <a:ea typeface="Arial"/>
-              </a:rPr>
-              <a:t>&lt;numéro&gt;</a:t>
-            </a:fld>
-            <a:endParaRPr b="0" lang="fr-FR" sz="700" spc="-1" strike="noStrike">
-              <a:solidFill>
-                <a:srgbClr val="000000"/>
-              </a:solidFill>
-              <a:uFill>
-                <a:solidFill>
-                  <a:srgbClr val="ffffff"/>
-                </a:solidFill>
-              </a:uFill>
-              <a:latin typeface="Times New Roman"/>
-            </a:endParaRPr>
-          </a:p>
-        </p:txBody>
-      </p:sp>
-      <p:graphicFrame>
-        <p:nvGraphicFramePr>
-          <p:cNvPr id="374" name="Espace réservé du contenu 1"/>
-          <p:cNvGraphicFramePr/>
-          <p:nvPr/>
-        </p:nvGraphicFramePr>
-        <p:xfrm>
-          <a:off x="1873800" y="1595160"/>
-          <a:ext cx="2845440" cy="2041200"/>
-        </p:xfrm>
-        <a:graphic>
-          <a:graphicData uri="http://schemas.openxmlformats.org/drawingml/2006/chart">
-            <c:chart xmlns:c="http://schemas.openxmlformats.org/drawingml/2006/chart" xmlns:r="http://schemas.openxmlformats.org/officeDocument/2006/relationships" r:id="rId1"/>
-          </a:graphicData>
-        </a:graphic>
-      </p:graphicFrame>
-      <p:sp>
-        <p:nvSpPr>
-          <p:cNvPr id="375" name="TextShape 3"/>
-          <p:cNvSpPr txBox="1"/>
-          <p:nvPr/>
-        </p:nvSpPr>
-        <p:spPr>
-          <a:xfrm>
-            <a:off x="495720" y="800640"/>
-            <a:ext cx="5942880" cy="382680"/>
-          </a:xfrm>
-          <a:prstGeom prst="rect">
-            <a:avLst/>
-          </a:prstGeom>
-          <a:noFill/>
-          <a:ln>
-            <a:noFill/>
-          </a:ln>
-        </p:spPr>
-        <p:txBody>
-          <a:bodyPr/>
-          <a:p>
-            <a:endParaRPr b="0" lang="en-US" sz="2000" spc="-1" strike="noStrike">
-              <a:solidFill>
-                <a:srgbClr val="767171"/>
-              </a:solidFill>
-              <a:uFill>
-                <a:solidFill>
-                  <a:srgbClr val="ffffff"/>
-                </a:solidFill>
-              </a:uFill>
-              <a:latin typeface="Calibri"/>
-            </a:endParaRPr>
-          </a:p>
-        </p:txBody>
-      </p:sp>
-    </p:spTree>
-  </p:cSld>
-  <p:timing>
-    <p:tnLst>
-      <p:par>
-        <p:cTn id="9" dur="indefinite" restart="never" nodeType="tmRoot">
-          <p:childTnLst>
-            <p:seq>
-              <p:cTn id="10" nodeType="mainSeq"/>
-              <p:prevCondLst>
-                <p:cond delay="0" evt="onPrev">
-                  <p:tgtEl>
-                    <p:sldTgt/>
-                  </p:tgtEl>
-                </p:cond>
-              </p:prevCondLst>
-              <p:nextCondLst>
-                <p:cond delay="0" evt="onNext">
-                  <p:tgtEl>
-                    <p:sldTgt/>
-                  </p:tgtEl>
-                </p:cond>
-              </p:nextCondLst>
-            </p:seq>
-          </p:childTnLst>
-        </p:cTn>
-      </p:par>
-    </p:tnLst>
-  </p:timing>
-</p:sld>
-</file>
-
-<file path=ppt/slides/slide6.xml><?xml version="1.0" encoding="utf-8"?>
-<p:sld xmlns:a="http://schemas.openxmlformats.org/drawingml/2006/main" xmlns:p="http://schemas.openxmlformats.org/presentationml/2006/main" xmlns:r="http://schemas.openxmlformats.org/officeDocument/2006/relationships" xmlns:p14="http://schemas.microsoft.com/office/powerpoint/2010/main" xmlns:p15="http://schemas.microsoft.com/office/powerpoint/2012/main" xmlns:mc="http://schemas.openxmlformats.org/markup-compatibility/2006">
-  <p:cSld>
-    <p:spTree>
-      <p:nvGrpSpPr>
-        <p:cNvPr id="1" name=""/>
-        <p:cNvGrpSpPr/>
-        <p:nvPr/>
-      </p:nvGrpSpPr>
-      <p:grpSpPr>
-        <a:xfrm>
-          <a:off x="0" y="0"/>
-          <a:ext cx="0" cy="0"/>
-          <a:chOff x="0" y="0"/>
-          <a:chExt cx="0" cy="0"/>
-        </a:xfrm>
-      </p:grpSpPr>
-      <p:sp>
-        <p:nvSpPr>
-          <p:cNvPr id="376" name="TextShape 1"/>
-          <p:cNvSpPr txBox="1"/>
-          <p:nvPr/>
-        </p:nvSpPr>
-        <p:spPr>
-          <a:xfrm>
-            <a:off x="6275880" y="5005080"/>
-            <a:ext cx="470520" cy="107280"/>
-          </a:xfrm>
-          <a:prstGeom prst="rect">
-            <a:avLst/>
-          </a:prstGeom>
-          <a:noFill/>
-          <a:ln>
-            <a:noFill/>
-          </a:ln>
-        </p:spPr>
-        <p:txBody>
-          <a:bodyPr lIns="90000" rIns="90000" tIns="0" bIns="0"/>
-          <a:p>
-            <a:pPr algn="ctr">
-              <a:lnSpc>
-                <a:spcPct val="100000"/>
-              </a:lnSpc>
-            </a:pPr>
-            <a:fld id="{34B1B30C-726F-4B5A-AEFB-53C9868F2903}" type="slidenum">
-              <a:rPr b="0" lang="fr-FR" sz="700" spc="-1" strike="noStrike">
-                <a:solidFill>
-                  <a:srgbClr val="ffffff"/>
-                </a:solidFill>
-                <a:uFill>
-                  <a:solidFill>
-                    <a:srgbClr val="ffffff"/>
-                  </a:solidFill>
-                </a:uFill>
-                <a:latin typeface="Arial"/>
-                <a:ea typeface="Arial"/>
-              </a:rPr>
-              <a:t>&lt;numéro&gt;</a:t>
-            </a:fld>
-            <a:endParaRPr b="0" lang="fr-FR" sz="700" spc="-1" strike="noStrike">
-              <a:solidFill>
-                <a:srgbClr val="000000"/>
-              </a:solidFill>
-              <a:uFill>
-                <a:solidFill>
-                  <a:srgbClr val="ffffff"/>
-                </a:solidFill>
-              </a:uFill>
-              <a:latin typeface="Times New Roman"/>
-            </a:endParaRPr>
-          </a:p>
-        </p:txBody>
-      </p:sp>
-      <p:sp>
-        <p:nvSpPr>
-          <p:cNvPr id="377" name="TextShape 2"/>
-          <p:cNvSpPr txBox="1"/>
-          <p:nvPr/>
-        </p:nvSpPr>
-        <p:spPr>
-          <a:xfrm>
-            <a:off x="634320" y="3601080"/>
-            <a:ext cx="1203120" cy="276480"/>
-          </a:xfrm>
-          <a:prstGeom prst="rect">
-            <a:avLst/>
-          </a:prstGeom>
-          <a:noFill/>
-          <a:ln>
-            <a:noFill/>
-          </a:ln>
-        </p:spPr>
-        <p:txBody>
-          <a:bodyPr tIns="0" bIns="0"/>
-          <a:p>
-            <a:endParaRPr b="0" lang="en-US" sz="2000" spc="-1" strike="noStrike">
-              <a:solidFill>
-                <a:srgbClr val="767171"/>
-              </a:solidFill>
-              <a:uFill>
-                <a:solidFill>
-                  <a:srgbClr val="ffffff"/>
-                </a:solidFill>
-              </a:uFill>
-              <a:latin typeface="Calibri"/>
-            </a:endParaRPr>
-          </a:p>
-        </p:txBody>
-      </p:sp>
-    </p:spTree>
-  </p:cSld>
-  <p:timing>
-    <p:tnLst>
-      <p:par>
-        <p:cTn id="11" dur="indefinite" restart="never" nodeType="tmRoot">
-          <p:childTnLst>
-            <p:seq>
-              <p:cTn id="12" nodeType="mainSeq"/>
-              <p:prevCondLst>
-                <p:cond delay="0" evt="onPrev">
-                  <p:tgtEl>
-                    <p:sldTgt/>
-                  </p:tgtEl>
-                </p:cond>
-              </p:prevCondLst>
-              <p:nextCondLst>
-                <p:cond delay="0" evt="onNext">
-                  <p:tgtEl>
-                    <p:sldTgt/>
-                  </p:tgtEl>
-                </p:cond>
-              </p:nextCondLst>
-            </p:seq>
-          </p:childTnLst>
-        </p:cTn>
-      </p:par>
-    </p:tnLst>
-  </p:timing>
-</p:sld>
-</file>
-
-<file path=ppt/slides/slide7.xml><?xml version="1.0" encoding="utf-8"?>
-<p:sld xmlns:a="http://schemas.openxmlformats.org/drawingml/2006/main" xmlns:p="http://schemas.openxmlformats.org/presentationml/2006/main" xmlns:r="http://schemas.openxmlformats.org/officeDocument/2006/relationships" xmlns:p14="http://schemas.microsoft.com/office/powerpoint/2010/main" xmlns:p15="http://schemas.microsoft.com/office/powerpoint/2012/main" xmlns:mc="http://schemas.openxmlformats.org/markup-compatibility/2006">
-  <p:cSld>
-    <p:spTree>
-      <p:nvGrpSpPr>
-        <p:cNvPr id="1" name=""/>
-        <p:cNvGrpSpPr/>
-        <p:nvPr/>
-      </p:nvGrpSpPr>
-      <p:grpSpPr>
-        <a:xfrm>
-          <a:off x="0" y="0"/>
-          <a:ext cx="0" cy="0"/>
-          <a:chOff x="0" y="0"/>
-          <a:chExt cx="0" cy="0"/>
-        </a:xfrm>
-      </p:grpSpPr>
-      <p:sp>
-        <p:nvSpPr>
-          <p:cNvPr id="378" name="TextShape 1"/>
-          <p:cNvSpPr txBox="1"/>
-          <p:nvPr/>
-        </p:nvSpPr>
-        <p:spPr>
-          <a:xfrm>
-            <a:off x="6275880" y="5005080"/>
-            <a:ext cx="470520" cy="107280"/>
-          </a:xfrm>
-          <a:prstGeom prst="rect">
-            <a:avLst/>
-          </a:prstGeom>
-          <a:noFill/>
-          <a:ln>
-            <a:noFill/>
-          </a:ln>
-        </p:spPr>
-        <p:txBody>
-          <a:bodyPr lIns="90000" rIns="90000" tIns="0" bIns="0"/>
-          <a:p>
-            <a:pPr algn="ctr">
-              <a:lnSpc>
-                <a:spcPct val="100000"/>
-              </a:lnSpc>
-            </a:pPr>
-            <a:fld id="{26375E3B-E85D-4EC2-938F-A6273B10A102}" type="slidenum">
-              <a:rPr b="0" lang="fr-FR" sz="700" spc="-1" strike="noStrike">
-                <a:solidFill>
-                  <a:srgbClr val="ffffff"/>
-                </a:solidFill>
-                <a:uFill>
-                  <a:solidFill>
-                    <a:srgbClr val="ffffff"/>
-                  </a:solidFill>
-                </a:uFill>
-                <a:latin typeface="Arial"/>
-                <a:ea typeface="Arial"/>
-              </a:rPr>
-              <a:t>&lt;numéro&gt;</a:t>
-            </a:fld>
-            <a:endParaRPr b="0" lang="fr-FR" sz="700" spc="-1" strike="noStrike">
-              <a:solidFill>
-                <a:srgbClr val="000000"/>
-              </a:solidFill>
-              <a:uFill>
-                <a:solidFill>
-                  <a:srgbClr val="ffffff"/>
-                </a:solidFill>
-              </a:uFill>
-              <a:latin typeface="Times New Roman"/>
-            </a:endParaRPr>
-          </a:p>
-        </p:txBody>
-      </p:sp>
-      <p:sp>
-        <p:nvSpPr>
-          <p:cNvPr id="379" name="TextShape 2"/>
-          <p:cNvSpPr txBox="1"/>
-          <p:nvPr/>
-        </p:nvSpPr>
-        <p:spPr>
-          <a:xfrm>
-            <a:off x="634320" y="3601080"/>
-            <a:ext cx="1203120" cy="281880"/>
-          </a:xfrm>
-          <a:prstGeom prst="rect">
-            <a:avLst/>
-          </a:prstGeom>
-          <a:noFill/>
-          <a:ln>
-            <a:noFill/>
-          </a:ln>
-        </p:spPr>
-        <p:txBody>
-          <a:bodyPr tIns="0" bIns="0"/>
-          <a:p>
-            <a:endParaRPr b="0" lang="en-US" sz="2000" spc="-1" strike="noStrike">
-              <a:solidFill>
-                <a:srgbClr val="767171"/>
-              </a:solidFill>
-              <a:uFill>
-                <a:solidFill>
-                  <a:srgbClr val="ffffff"/>
-                </a:solidFill>
-              </a:uFill>
-              <a:latin typeface="Calibri"/>
-            </a:endParaRPr>
-          </a:p>
-        </p:txBody>
-      </p:sp>
-    </p:spTree>
-  </p:cSld>
-  <p:timing>
-    <p:tnLst>
-      <p:par>
-        <p:cTn id="13" dur="indefinite" restart="never" nodeType="tmRoot">
-          <p:childTnLst>
-            <p:seq>
-              <p:cTn id="14" nodeType="mainSeq"/>
-              <p:prevCondLst>
-                <p:cond delay="0" evt="onPrev">
-                  <p:tgtEl>
-                    <p:sldTgt/>
-                  </p:tgtEl>
-                </p:cond>
-              </p:prevCondLst>
-              <p:nextCondLst>
-                <p:cond delay="0" evt="onNext">
-                  <p:tgtEl>
-                    <p:sldTgt/>
-                  </p:tgtEl>
-                </p:cond>
-              </p:nextCondLst>
-            </p:seq>
-          </p:childTnLst>
-        </p:cTn>
-      </p:par>
-    </p:tnLst>
-  </p:timing>
-</p:sld>
-</file>
-
-<file path=ppt/slides/slide8.xml><?xml version="1.0" encoding="utf-8"?>
-<p:sld xmlns:a="http://schemas.openxmlformats.org/drawingml/2006/main" xmlns:p="http://schemas.openxmlformats.org/presentationml/2006/main" xmlns:r="http://schemas.openxmlformats.org/officeDocument/2006/relationships" xmlns:p14="http://schemas.microsoft.com/office/powerpoint/2010/main" xmlns:p15="http://schemas.microsoft.com/office/powerpoint/2012/main" xmlns:mc="http://schemas.openxmlformats.org/markup-compatibility/2006">
-  <p:cSld>
-    <p:spTree>
-      <p:nvGrpSpPr>
-        <p:cNvPr id="1" name=""/>
-        <p:cNvGrpSpPr/>
-        <p:nvPr/>
-      </p:nvGrpSpPr>
-      <p:grpSpPr>
-        <a:xfrm>
-          <a:off x="0" y="0"/>
-          <a:ext cx="0" cy="0"/>
-          <a:chOff x="0" y="0"/>
-          <a:chExt cx="0" cy="0"/>
-        </a:xfrm>
-      </p:grpSpPr>
-      <p:sp>
-        <p:nvSpPr>
-          <p:cNvPr id="380" name="TextShape 1"/>
-          <p:cNvSpPr txBox="1"/>
-          <p:nvPr/>
-        </p:nvSpPr>
-        <p:spPr>
-          <a:xfrm>
-            <a:off x="2452320" y="1711440"/>
-            <a:ext cx="3574080" cy="461160"/>
-          </a:xfrm>
-          <a:prstGeom prst="rect">
-            <a:avLst/>
-          </a:prstGeom>
-          <a:noFill/>
-          <a:ln>
-            <a:noFill/>
-          </a:ln>
-        </p:spPr>
-        <p:txBody>
-          <a:bodyPr tIns="36000" bIns="36000" anchor="ctr"/>
-          <a:p>
-            <a:endParaRPr b="0" lang="en-US" sz="1800" spc="-1" strike="noStrike">
-              <a:solidFill>
-                <a:srgbClr val="3f3f3f"/>
-              </a:solidFill>
-              <a:uFill>
-                <a:solidFill>
-                  <a:srgbClr val="ffffff"/>
-                </a:solidFill>
-              </a:uFill>
-              <a:latin typeface="Arial Narrow"/>
-            </a:endParaRPr>
-          </a:p>
-        </p:txBody>
-      </p:sp>
-      <p:sp>
-        <p:nvSpPr>
-          <p:cNvPr id="381" name="TextShape 2"/>
-          <p:cNvSpPr txBox="1"/>
-          <p:nvPr/>
-        </p:nvSpPr>
-        <p:spPr>
-          <a:xfrm>
-            <a:off x="743760" y="3302640"/>
-            <a:ext cx="5135760" cy="189000"/>
-          </a:xfrm>
-          <a:prstGeom prst="rect">
-            <a:avLst/>
-          </a:prstGeom>
-          <a:noFill/>
-          <a:ln>
-            <a:noFill/>
-          </a:ln>
-        </p:spPr>
-        <p:txBody>
-          <a:bodyPr/>
-          <a:p>
-            <a:endParaRPr b="0" lang="en-US" sz="2000" spc="-1" strike="noStrike">
-              <a:solidFill>
-                <a:srgbClr val="767171"/>
-              </a:solidFill>
-              <a:uFill>
-                <a:solidFill>
-                  <a:srgbClr val="ffffff"/>
-                </a:solidFill>
-              </a:uFill>
-              <a:latin typeface="Calibri"/>
-            </a:endParaRPr>
-          </a:p>
-        </p:txBody>
-      </p:sp>
-      <p:sp>
-        <p:nvSpPr>
-          <p:cNvPr id="382" name="TextShape 3"/>
-          <p:cNvSpPr txBox="1"/>
-          <p:nvPr/>
-        </p:nvSpPr>
-        <p:spPr>
-          <a:xfrm>
-            <a:off x="2452320" y="2355120"/>
-            <a:ext cx="3535200" cy="285840"/>
-          </a:xfrm>
-          <a:prstGeom prst="rect">
-            <a:avLst/>
-          </a:prstGeom>
-          <a:noFill/>
-          <a:ln>
-            <a:noFill/>
-          </a:ln>
-        </p:spPr>
-        <p:txBody>
-          <a:bodyPr/>
-          <a:p>
-            <a:endParaRPr b="0" lang="en-US" sz="2000" spc="-1" strike="noStrike">
-              <a:solidFill>
-                <a:srgbClr val="767171"/>
-              </a:solidFill>
-              <a:uFill>
-                <a:solidFill>
-                  <a:srgbClr val="ffffff"/>
-                </a:solidFill>
-              </a:uFill>
-              <a:latin typeface="Calibri"/>
-            </a:endParaRPr>
-          </a:p>
-        </p:txBody>
-      </p:sp>
-      <p:sp>
-        <p:nvSpPr>
-          <p:cNvPr id="383" name="TextShape 4"/>
-          <p:cNvSpPr txBox="1"/>
-          <p:nvPr/>
-        </p:nvSpPr>
-        <p:spPr>
-          <a:xfrm>
-            <a:off x="6386400" y="5005440"/>
-            <a:ext cx="471240" cy="107640"/>
-          </a:xfrm>
-          <a:prstGeom prst="rect">
-            <a:avLst/>
-          </a:prstGeom>
-          <a:noFill/>
-          <a:ln>
-            <a:noFill/>
-          </a:ln>
-        </p:spPr>
-        <p:txBody>
-          <a:bodyPr lIns="90000" rIns="90000" tIns="0" bIns="0"/>
-          <a:p>
-            <a:pPr algn="ctr">
-              <a:lnSpc>
-                <a:spcPct val="100000"/>
-              </a:lnSpc>
-            </a:pPr>
-            <a:fld id="{84E37F63-A198-4B32-BA28-06E5EE27F5FA}" type="slidenum">
-              <a:rPr b="0" lang="fr-FR" sz="700" spc="-1" strike="noStrike">
-                <a:solidFill>
-                  <a:srgbClr val="ffffff"/>
-                </a:solidFill>
-                <a:uFill>
-                  <a:solidFill>
-                    <a:srgbClr val="ffffff"/>
-                  </a:solidFill>
-                </a:uFill>
-                <a:latin typeface="Arial"/>
-                <a:ea typeface="Arial"/>
-              </a:rPr>
-              <a:t>&lt;numéro&gt;</a:t>
-            </a:fld>
-            <a:endParaRPr b="0" lang="fr-FR" sz="700" spc="-1" strike="noStrike">
-              <a:solidFill>
-                <a:srgbClr val="000000"/>
-              </a:solidFill>
-              <a:uFill>
-                <a:solidFill>
-                  <a:srgbClr val="ffffff"/>
-                </a:solidFill>
-              </a:uFill>
-              <a:latin typeface="Times New Roman"/>
-            </a:endParaRPr>
-          </a:p>
-        </p:txBody>
-      </p:sp>
-    </p:spTree>
-  </p:cSld>
-  <p:timing>
-    <p:tnLst>
-      <p:par>
-        <p:cTn id="15" dur="indefinite" restart="never" nodeType="tmRoot">
-          <p:childTnLst>
-            <p:seq>
-              <p:cTn id="16" nodeType="mainSeq"/>
-              <p:prevCondLst>
-                <p:cond delay="0" evt="onPrev">
-                  <p:tgtEl>
-                    <p:sldTgt/>
-                  </p:tgtEl>
-                </p:cond>
-              </p:prevCondLst>
-              <p:nextCondLst>
-                <p:cond delay="0" evt="onNext">
-                  <p:tgtEl>
-                    <p:sldTgt/>
-                  </p:tgtEl>
-                </p:cond>
-              </p:nextCondLst>
-            </p:seq>
-          </p:childTnLst>
-        </p:cTn>
-      </p:par>
-    </p:tnLst>
-  </p:timing>
-</p:sld>
-</file>
-
-<file path=ppt/slides/slide9.xml><?xml version="1.0" encoding="utf-8"?>
-<p:sld xmlns:a="http://schemas.openxmlformats.org/drawingml/2006/main" xmlns:p="http://schemas.openxmlformats.org/presentationml/2006/main" xmlns:r="http://schemas.openxmlformats.org/officeDocument/2006/relationships" xmlns:p14="http://schemas.microsoft.com/office/powerpoint/2010/main" xmlns:p15="http://schemas.microsoft.com/office/powerpoint/2012/main" xmlns:mc="http://schemas.openxmlformats.org/markup-compatibility/2006">
-  <p:cSld>
-    <p:spTree>
-      <p:nvGrpSpPr>
-        <p:cNvPr id="1" name=""/>
-        <p:cNvGrpSpPr/>
-        <p:nvPr/>
-      </p:nvGrpSpPr>
-      <p:grpSpPr>
-        <a:xfrm>
-          <a:off x="0" y="0"/>
-          <a:ext cx="0" cy="0"/>
-          <a:chOff x="0" y="0"/>
-          <a:chExt cx="0" cy="0"/>
-        </a:xfrm>
-      </p:grpSpPr>
-      <p:sp>
-        <p:nvSpPr>
-          <p:cNvPr id="384" name="TextShape 1"/>
-          <p:cNvSpPr txBox="1"/>
-          <p:nvPr/>
-        </p:nvSpPr>
-        <p:spPr>
-          <a:xfrm>
-            <a:off x="632520" y="3345840"/>
-            <a:ext cx="4929120" cy="430560"/>
-          </a:xfrm>
-          <a:prstGeom prst="rect">
-            <a:avLst/>
-          </a:prstGeom>
-          <a:noFill/>
-          <a:ln>
-            <a:noFill/>
-          </a:ln>
-        </p:spPr>
-        <p:txBody>
-          <a:bodyPr/>
-          <a:p>
-            <a:endParaRPr b="0" lang="en-US" sz="2000" spc="-1" strike="noStrike">
-              <a:solidFill>
-                <a:srgbClr val="767171"/>
-              </a:solidFill>
-              <a:uFill>
-                <a:solidFill>
-                  <a:srgbClr val="ffffff"/>
-                </a:solidFill>
-              </a:uFill>
-              <a:latin typeface="Calibri"/>
-            </a:endParaRPr>
-          </a:p>
-        </p:txBody>
-      </p:sp>
-      <p:sp>
-        <p:nvSpPr>
-          <p:cNvPr id="385" name="TextShape 2"/>
-          <p:cNvSpPr txBox="1"/>
-          <p:nvPr/>
-        </p:nvSpPr>
-        <p:spPr>
-          <a:xfrm>
-            <a:off x="632520" y="3841560"/>
-            <a:ext cx="2206080" cy="226080"/>
           </a:xfrm>
           <a:prstGeom prst="rect">
             <a:avLst/>

</xml_diff>